<commit_message>
Afbeelding toegevoed aan slides.
</commit_message>
<xml_diff>
--- a/Literatuurstudie/Literatuurstudie_ppt.pptx
+++ b/Literatuurstudie/Literatuurstudie_ppt.pptx
@@ -15,7 +15,7 @@
     <p:sldId id="261" r:id="rId3"/>
     <p:sldId id="268" r:id="rId4"/>
     <p:sldId id="269" r:id="rId5"/>
-    <p:sldId id="270" r:id="rId6"/>
+    <p:sldId id="284" r:id="rId6"/>
     <p:sldId id="271" r:id="rId7"/>
     <p:sldId id="283" r:id="rId8"/>
     <p:sldId id="279" r:id="rId9"/>
@@ -296,7 +296,7 @@
           <a:p>
             <a:fld id="{E152A6D4-CD3D-5148-8B70-A84796F20135}" type="slidenum">
               <a:rPr lang="nl-NL" smtClean="0"/>
-              <a:t>‹nr.›</a:t>
+              <a:t>‹#›</a:t>
             </a:fld>
             <a:endParaRPr lang="nl-NL"/>
           </a:p>
@@ -553,7 +553,7 @@
           <a:p>
             <a:fld id="{8954E32A-327F-AF4B-8E1F-209FBF93D26D}" type="slidenum">
               <a:rPr lang="nl-NL" smtClean="0"/>
-              <a:t>‹nr.›</a:t>
+              <a:t>‹#›</a:t>
             </a:fld>
             <a:endParaRPr lang="nl-NL"/>
           </a:p>
@@ -1429,7 +1429,7 @@
           <a:p>
             <a:fld id="{CF179DAE-D0A6-40C3-B8BC-6A97C268D03A}" type="slidenum">
               <a:rPr lang="nl-NL" smtClean="0"/>
-              <a:t>‹nr.›</a:t>
+              <a:t>‹#›</a:t>
             </a:fld>
             <a:endParaRPr lang="nl-NL"/>
           </a:p>
@@ -1712,7 +1712,7 @@
           <a:p>
             <a:fld id="{CF179DAE-D0A6-40C3-B8BC-6A97C268D03A}" type="slidenum">
               <a:rPr lang="nl-NL" smtClean="0"/>
-              <a:t>‹nr.›</a:t>
+              <a:t>‹#›</a:t>
             </a:fld>
             <a:endParaRPr lang="nl-NL"/>
           </a:p>
@@ -2042,7 +2042,7 @@
           <a:p>
             <a:fld id="{0A297500-7527-634B-90F4-69D0994C32B4}" type="slidenum">
               <a:rPr lang="nl-NL" smtClean="0"/>
-              <a:t>‹nr.›</a:t>
+              <a:t>‹#›</a:t>
             </a:fld>
             <a:endParaRPr lang="nl-NL"/>
           </a:p>
@@ -2361,7 +2361,7 @@
           <a:p>
             <a:fld id="{0A297500-7527-634B-90F4-69D0994C32B4}" type="slidenum">
               <a:rPr lang="nl-NL" smtClean="0"/>
-              <a:t>‹nr.›</a:t>
+              <a:t>‹#›</a:t>
             </a:fld>
             <a:endParaRPr lang="nl-NL"/>
           </a:p>
@@ -2682,7 +2682,7 @@
           <a:p>
             <a:fld id="{0A297500-7527-634B-90F4-69D0994C32B4}" type="slidenum">
               <a:rPr lang="nl-NL" smtClean="0"/>
-              <a:t>‹nr.›</a:t>
+              <a:t>‹#›</a:t>
             </a:fld>
             <a:endParaRPr lang="nl-NL"/>
           </a:p>
@@ -2824,7 +2824,7 @@
           <a:p>
             <a:fld id="{0A297500-7527-634B-90F4-69D0994C32B4}" type="slidenum">
               <a:rPr lang="nl-NL" smtClean="0"/>
-              <a:t>‹nr.›</a:t>
+              <a:t>‹#›</a:t>
             </a:fld>
             <a:endParaRPr lang="nl-NL"/>
           </a:p>
@@ -3308,7 +3308,7 @@
           <a:p>
             <a:fld id="{0A297500-7527-634B-90F4-69D0994C32B4}" type="slidenum">
               <a:rPr lang="nl-NL" smtClean="0"/>
-              <a:t>‹nr.›</a:t>
+              <a:t>‹#›</a:t>
             </a:fld>
             <a:endParaRPr lang="nl-NL"/>
           </a:p>
@@ -3429,7 +3429,7 @@
           <a:p>
             <a:fld id="{0A297500-7527-634B-90F4-69D0994C32B4}" type="slidenum">
               <a:rPr lang="nl-NL" smtClean="0"/>
-              <a:t>‹nr.›</a:t>
+              <a:t>‹#›</a:t>
             </a:fld>
             <a:endParaRPr lang="nl-NL"/>
           </a:p>
@@ -3550,7 +3550,7 @@
           <a:p>
             <a:fld id="{0A297500-7527-634B-90F4-69D0994C32B4}" type="slidenum">
               <a:rPr lang="nl-NL" smtClean="0"/>
-              <a:t>‹nr.›</a:t>
+              <a:t>‹#›</a:t>
             </a:fld>
             <a:endParaRPr lang="nl-NL"/>
           </a:p>
@@ -3732,7 +3732,7 @@
           <a:p>
             <a:fld id="{0A297500-7527-634B-90F4-69D0994C32B4}" type="slidenum">
               <a:rPr lang="nl-NL" smtClean="0"/>
-              <a:t>‹nr.›</a:t>
+              <a:t>‹#›</a:t>
             </a:fld>
             <a:endParaRPr lang="nl-NL"/>
           </a:p>
@@ -4052,7 +4052,7 @@
             <a:fld id="{0A297500-7527-634B-90F4-69D0994C32B4}" type="slidenum">
               <a:rPr lang="nl-NL" smtClean="0"/>
               <a:pPr/>
-              <a:t>‹nr.›</a:t>
+              <a:t>‹#›</a:t>
             </a:fld>
             <a:endParaRPr lang="nl-NL" dirty="0"/>
           </a:p>
@@ -4693,7 +4693,7 @@
             <a:fld id="{0A297500-7527-634B-90F4-69D0994C32B4}" type="slidenum">
               <a:rPr lang="nl-NL" smtClean="0"/>
               <a:pPr/>
-              <a:t>‹nr.›</a:t>
+              <a:t>‹#›</a:t>
             </a:fld>
             <a:endParaRPr lang="nl-NL" dirty="0"/>
           </a:p>
@@ -8434,7 +8434,7 @@
           <a:p>
             <a:r>
               <a:rPr lang="nl-BE" dirty="0"/>
-              <a:t>Input vector x</a:t>
+              <a:t>Input laag</a:t>
             </a:r>
           </a:p>
           <a:p>
@@ -8447,6 +8447,14 @@
             <a:r>
               <a:rPr lang="nl-BE" dirty="0"/>
               <a:t>Lineaire transformatie </a:t>
+            </a:r>
+            <a:r>
+              <a:rPr lang="nl-BE" dirty="0">
+                <a:highlight>
+                  <a:srgbClr val="FFFF00"/>
+                </a:highlight>
+              </a:rPr>
+              <a:t>+ bias</a:t>
             </a:r>
           </a:p>
           <a:p>
@@ -8690,10 +8698,10 @@
       </p:grpSpPr>
       <p:sp>
         <p:nvSpPr>
-          <p:cNvPr id="3" name="Tijdelijke aanduiding voor voettekst 2">
+          <p:cNvPr id="3" name="Footer Placeholder 2">
             <a:extLst>
               <a:ext uri="{FF2B5EF4-FFF2-40B4-BE49-F238E27FC236}">
-                <a16:creationId xmlns:a16="http://schemas.microsoft.com/office/drawing/2014/main" id="{0ABF6EF6-37C5-4208-8914-48048066FBC0}"/>
+                <a16:creationId xmlns:a16="http://schemas.microsoft.com/office/drawing/2014/main" id="{8BCC9FB4-3EFE-43EE-81C9-3E64DB3B51E5}"/>
               </a:ext>
             </a:extLst>
           </p:cNvPr>
@@ -8718,10 +8726,10 @@
       </p:sp>
       <p:sp>
         <p:nvSpPr>
-          <p:cNvPr id="4" name="Tijdelijke aanduiding voor dianummer 3">
+          <p:cNvPr id="4" name="Slide Number Placeholder 3">
             <a:extLst>
               <a:ext uri="{FF2B5EF4-FFF2-40B4-BE49-F238E27FC236}">
-                <a16:creationId xmlns:a16="http://schemas.microsoft.com/office/drawing/2014/main" id="{2F4C612F-BB20-4889-96AC-55E6AC0C1707}"/>
+                <a16:creationId xmlns:a16="http://schemas.microsoft.com/office/drawing/2014/main" id="{0D6B5CDE-F600-4A6A-A3BC-05806696DEEB}"/>
               </a:ext>
             </a:extLst>
           </p:cNvPr>
@@ -8747,10 +8755,10 @@
       </p:sp>
       <p:sp>
         <p:nvSpPr>
-          <p:cNvPr id="10" name="Tijdelijke aanduiding voor inhoud 9">
+          <p:cNvPr id="5" name="Title 4">
             <a:extLst>
               <a:ext uri="{FF2B5EF4-FFF2-40B4-BE49-F238E27FC236}">
-                <a16:creationId xmlns:a16="http://schemas.microsoft.com/office/drawing/2014/main" id="{C92D71C4-EC72-49E8-B20A-97572F4B820D}"/>
+                <a16:creationId xmlns:a16="http://schemas.microsoft.com/office/drawing/2014/main" id="{0CC819A1-CA0A-4472-9A13-4160F3E74B92}"/>
               </a:ext>
             </a:extLst>
           </p:cNvPr>
@@ -8758,986 +8766,281 @@
             <a:spLocks noGrp="1"/>
           </p:cNvSpPr>
           <p:nvPr>
-            <p:ph idx="1"/>
+            <p:ph type="title"/>
           </p:nvPr>
         </p:nvSpPr>
         <p:spPr>
           <a:xfrm>
-            <a:off x="436526" y="355101"/>
-            <a:ext cx="3678027" cy="4464000"/>
+            <a:off x="5442856" y="207036"/>
+            <a:ext cx="6174343" cy="1152000"/>
           </a:xfrm>
         </p:spPr>
         <p:txBody>
           <a:bodyPr/>
           <a:lstStyle/>
           <a:p>
-            <a:r>
-              <a:rPr lang="nl-BE" dirty="0"/>
+            <a:endParaRPr lang="en-GB" dirty="0"/>
+          </a:p>
+        </p:txBody>
+      </p:sp>
+      <p:sp>
+        <p:nvSpPr>
+          <p:cNvPr id="11" name="Content Placeholder 10">
+            <a:extLst>
+              <a:ext uri="{FF2B5EF4-FFF2-40B4-BE49-F238E27FC236}">
+                <a16:creationId xmlns:a16="http://schemas.microsoft.com/office/drawing/2014/main" id="{764493C5-CA00-4BE3-8A52-A57220C83572}"/>
+              </a:ext>
+            </a:extLst>
+          </p:cNvPr>
+          <p:cNvSpPr>
+            <a:spLocks noGrp="1"/>
+          </p:cNvSpPr>
+          <p:nvPr>
+            <p:ph idx="1"/>
+          </p:nvPr>
+        </p:nvSpPr>
+        <p:spPr>
+          <a:xfrm>
+            <a:off x="665571" y="883250"/>
+            <a:ext cx="11041200" cy="5686400"/>
+          </a:xfrm>
+        </p:spPr>
+        <p:txBody>
+          <a:bodyPr/>
+          <a:lstStyle/>
+          <a:p>
+            <a:r>
+              <a:rPr lang="en-GB" dirty="0"/>
               <a:t>Input vector: x</a:t>
             </a:r>
           </a:p>
           <a:p>
             <a:r>
-              <a:rPr lang="nl-BE" dirty="0"/>
-              <a:t>Gewichtsmatrix: W</a:t>
-            </a:r>
-          </a:p>
-          <a:p>
-            <a:r>
-              <a:rPr lang="nl-BE" dirty="0"/>
+              <a:rPr lang="en-GB" dirty="0" err="1"/>
+              <a:t>Gewichtsmatrix</a:t>
+            </a:r>
+            <a:r>
+              <a:rPr lang="en-GB" dirty="0"/>
+              <a:t>: W</a:t>
+            </a:r>
+          </a:p>
+          <a:p>
+            <a:r>
+              <a:rPr lang="en-GB" dirty="0"/>
               <a:t>Bias vector: b</a:t>
             </a:r>
           </a:p>
           <a:p>
             <a:r>
-              <a:rPr lang="nl-BE" dirty="0"/>
-              <a:t>Niet-lineaire trans.: f(x)</a:t>
-            </a:r>
-          </a:p>
-          <a:p>
-            <a:r>
-              <a:rPr lang="nl-BE" dirty="0"/>
-              <a:t>Output: F(x)</a:t>
-            </a:r>
+              <a:rPr lang="en-GB" dirty="0" err="1"/>
+              <a:t>Niet-lineaire</a:t>
+            </a:r>
+            <a:r>
+              <a:rPr lang="en-GB" dirty="0"/>
+              <a:t> transf. : f(x)</a:t>
+            </a:r>
+          </a:p>
+          <a:p>
+            <a:r>
+              <a:rPr lang="en-GB" dirty="0"/>
+              <a:t>Output </a:t>
+            </a:r>
+            <a:r>
+              <a:rPr lang="en-GB" dirty="0" err="1"/>
+              <a:t>netwerk</a:t>
+            </a:r>
+            <a:r>
+              <a:rPr lang="en-GB" dirty="0"/>
+              <a:t>: F(x)</a:t>
+            </a:r>
+          </a:p>
+          <a:p>
+            <a:endParaRPr lang="en-GB" dirty="0"/>
+          </a:p>
+          <a:p>
+            <a:endParaRPr lang="en-GB" dirty="0"/>
+          </a:p>
+          <a:p>
+            <a:endParaRPr lang="en-GB" dirty="0"/>
+          </a:p>
+          <a:p>
+            <a:endParaRPr lang="en-GB" dirty="0"/>
+          </a:p>
+          <a:p>
+            <a:endParaRPr lang="en-GB" dirty="0"/>
           </a:p>
         </p:txBody>
       </p:sp>
       <p:pic>
         <p:nvPicPr>
-          <p:cNvPr id="12" name="Picture 4" descr="Neural Network Models in R | Machine learning tutorial, Machine learning  book, Deep learning">
+          <p:cNvPr id="27" name="Picture 26">
             <a:extLst>
               <a:ext uri="{FF2B5EF4-FFF2-40B4-BE49-F238E27FC236}">
-                <a16:creationId xmlns:a16="http://schemas.microsoft.com/office/drawing/2014/main" id="{E880E687-5C9C-4E01-B4A5-18057598A872}"/>
+                <a16:creationId xmlns:a16="http://schemas.microsoft.com/office/drawing/2014/main" id="{D5C0B33C-7973-4C3E-954A-312E818BE446}"/>
               </a:ext>
             </a:extLst>
           </p:cNvPr>
           <p:cNvPicPr>
-            <a:picLocks noChangeAspect="1" noChangeArrowheads="1"/>
+            <a:picLocks noChangeAspect="1"/>
           </p:cNvPicPr>
           <p:nvPr/>
         </p:nvPicPr>
         <p:blipFill rotWithShape="1">
-          <a:blip r:embed="rId2">
-            <a:extLst>
-              <a:ext uri="{28A0092B-C50C-407E-A947-70E740481C1C}">
-                <a14:useLocalDpi xmlns:a14="http://schemas.microsoft.com/office/drawing/2010/main" val="0"/>
-              </a:ext>
-            </a:extLst>
-          </a:blip>
-          <a:srcRect b="12034"/>
+          <a:blip r:embed="rId2"/>
+          <a:srcRect l="7803" t="3754" r="7066"/>
           <a:stretch/>
         </p:blipFill>
-        <p:spPr bwMode="auto">
+        <p:spPr>
           <a:xfrm>
-            <a:off x="4745040" y="224171"/>
-            <a:ext cx="5813229" cy="2519030"/>
+            <a:off x="4281714" y="-1"/>
+            <a:ext cx="7910286" cy="5962211"/>
           </a:xfrm>
           <a:prstGeom prst="rect">
             <a:avLst/>
           </a:prstGeom>
-          <a:noFill/>
-          <a:extLst>
-            <a:ext uri="{909E8E84-426E-40DD-AFC4-6F175D3DCCD1}">
-              <a14:hiddenFill xmlns:a14="http://schemas.microsoft.com/office/drawing/2010/main">
-                <a:solidFill>
-                  <a:srgbClr val="FFFFFF"/>
-                </a:solidFill>
-              </a14:hiddenFill>
-            </a:ext>
-          </a:extLst>
         </p:spPr>
       </p:pic>
-      <mc:AlternateContent xmlns:mc="http://schemas.openxmlformats.org/markup-compatibility/2006" xmlns:a14="http://schemas.microsoft.com/office/drawing/2010/main">
-        <mc:Choice Requires="a14">
-          <p:sp>
-            <p:nvSpPr>
-              <p:cNvPr id="17" name="Tekstvak 16">
-                <a:extLst>
-                  <a:ext uri="{FF2B5EF4-FFF2-40B4-BE49-F238E27FC236}">
-                    <a16:creationId xmlns:a16="http://schemas.microsoft.com/office/drawing/2014/main" id="{DF276FDB-D447-4579-8AE0-80C0A2B3D84E}"/>
-                  </a:ext>
-                </a:extLst>
-              </p:cNvPr>
-              <p:cNvSpPr txBox="1"/>
-              <p:nvPr/>
-            </p:nvSpPr>
-            <p:spPr>
-              <a:xfrm>
-                <a:off x="603609" y="3550724"/>
-                <a:ext cx="283316" cy="369332"/>
-              </a:xfrm>
-              <a:prstGeom prst="rect">
-                <a:avLst/>
-              </a:prstGeom>
-              <a:noFill/>
-            </p:spPr>
-            <p:txBody>
-              <a:bodyPr wrap="square" lIns="0" tIns="0" rIns="0" bIns="0" rtlCol="0">
-                <a:spAutoFit/>
-              </a:bodyPr>
-              <a:lstStyle/>
-              <a:p>
-                <a:pPr/>
-                <a14:m>
-                  <m:oMathPara xmlns:m="http://schemas.openxmlformats.org/officeDocument/2006/math">
-                    <m:oMathParaPr>
-                      <m:jc m:val="centerGroup"/>
-                    </m:oMathParaPr>
-                    <m:oMath xmlns:m="http://schemas.openxmlformats.org/officeDocument/2006/math">
-                      <m:r>
-                        <a:rPr lang="nl-BE" sz="2400" i="1">
-                          <a:latin typeface="Cambria Math" panose="02040503050406030204" pitchFamily="18" charset="0"/>
-                        </a:rPr>
-                        <m:t>𝑥</m:t>
-                      </m:r>
-                    </m:oMath>
-                  </m:oMathPara>
-                </a14:m>
-                <a:endParaRPr lang="nl-BE" sz="2400" dirty="0"/>
-              </a:p>
-            </p:txBody>
-          </p:sp>
-        </mc:Choice>
-        <mc:Fallback xmlns="">
-          <p:sp>
-            <p:nvSpPr>
-              <p:cNvPr id="17" name="Tekstvak 16">
-                <a:extLst>
-                  <a:ext uri="{FF2B5EF4-FFF2-40B4-BE49-F238E27FC236}">
-                    <a16:creationId xmlns:a16="http://schemas.microsoft.com/office/drawing/2014/main" id="{DF276FDB-D447-4579-8AE0-80C0A2B3D84E}"/>
-                  </a:ext>
-                </a:extLst>
-              </p:cNvPr>
-              <p:cNvSpPr txBox="1">
-                <a:spLocks noRot="1" noChangeAspect="1" noMove="1" noResize="1" noEditPoints="1" noAdjustHandles="1" noChangeArrowheads="1" noChangeShapeType="1" noTextEdit="1"/>
-              </p:cNvSpPr>
-              <p:nvPr/>
-            </p:nvSpPr>
-            <p:spPr>
-              <a:xfrm>
-                <a:off x="603609" y="3550724"/>
-                <a:ext cx="283316" cy="369332"/>
-              </a:xfrm>
-              <a:prstGeom prst="rect">
-                <a:avLst/>
-              </a:prstGeom>
-              <a:blipFill>
-                <a:blip r:embed="rId3"/>
-                <a:stretch>
-                  <a:fillRect l="-6522" r="-6522" b="-1639"/>
-                </a:stretch>
-              </a:blipFill>
-            </p:spPr>
-            <p:txBody>
-              <a:bodyPr/>
-              <a:lstStyle/>
-              <a:p>
-                <a:r>
-                  <a:rPr lang="nl-BE">
-                    <a:noFill/>
-                  </a:rPr>
-                  <a:t> </a:t>
-                </a:r>
-              </a:p>
-            </p:txBody>
-          </p:sp>
-        </mc:Fallback>
-      </mc:AlternateContent>
-      <mc:AlternateContent xmlns:mc="http://schemas.openxmlformats.org/markup-compatibility/2006" xmlns:a14="http://schemas.microsoft.com/office/drawing/2010/main">
-        <mc:Choice Requires="a14">
-          <p:sp>
-            <p:nvSpPr>
-              <p:cNvPr id="19" name="Tekstvak 18">
-                <a:extLst>
-                  <a:ext uri="{FF2B5EF4-FFF2-40B4-BE49-F238E27FC236}">
-                    <a16:creationId xmlns:a16="http://schemas.microsoft.com/office/drawing/2014/main" id="{9E1010C2-2A6B-4EEE-9C31-224D7658EAA4}"/>
-                  </a:ext>
-                </a:extLst>
-              </p:cNvPr>
-              <p:cNvSpPr txBox="1"/>
-              <p:nvPr/>
-            </p:nvSpPr>
-            <p:spPr>
-              <a:xfrm>
-                <a:off x="603609" y="4113891"/>
-                <a:ext cx="1744743" cy="369332"/>
-              </a:xfrm>
-              <a:prstGeom prst="rect">
-                <a:avLst/>
-              </a:prstGeom>
-              <a:noFill/>
-            </p:spPr>
-            <p:txBody>
-              <a:bodyPr wrap="square" lIns="0" tIns="0" rIns="0" bIns="0" rtlCol="0">
-                <a:spAutoFit/>
-              </a:bodyPr>
-              <a:lstStyle/>
-              <a:p>
-                <a:pPr/>
-                <a14:m>
-                  <m:oMathPara xmlns:m="http://schemas.openxmlformats.org/officeDocument/2006/math">
-                    <m:oMathParaPr>
-                      <m:jc m:val="centerGroup"/>
-                    </m:oMathParaPr>
-                    <m:oMath xmlns:m="http://schemas.openxmlformats.org/officeDocument/2006/math">
-                      <m:r>
-                        <a:rPr lang="nl-BE" sz="2400" i="1">
-                          <a:latin typeface="Cambria Math" panose="02040503050406030204" pitchFamily="18" charset="0"/>
-                        </a:rPr>
-                        <m:t>𝑓</m:t>
-                      </m:r>
-                      <m:r>
-                        <a:rPr lang="nl-BE" sz="2400" i="1">
-                          <a:latin typeface="Cambria Math" panose="02040503050406030204" pitchFamily="18" charset="0"/>
-                        </a:rPr>
-                        <m:t>(</m:t>
-                      </m:r>
-                      <m:r>
-                        <a:rPr lang="nl-BE" sz="2400" i="1">
-                          <a:latin typeface="Cambria Math" panose="02040503050406030204" pitchFamily="18" charset="0"/>
-                        </a:rPr>
-                        <m:t>𝑊</m:t>
-                      </m:r>
-                      <m:r>
-                        <a:rPr lang="nl-BE" sz="2400" i="1" baseline="30000">
-                          <a:latin typeface="Cambria Math" panose="02040503050406030204" pitchFamily="18" charset="0"/>
-                        </a:rPr>
-                        <m:t>1 </m:t>
-                      </m:r>
-                      <m:r>
-                        <a:rPr lang="nl-BE" sz="2400" i="1">
-                          <a:latin typeface="Cambria Math" panose="02040503050406030204" pitchFamily="18" charset="0"/>
-                        </a:rPr>
-                        <m:t>𝑥</m:t>
-                      </m:r>
-                      <m:r>
-                        <a:rPr lang="nl-BE" sz="2400" i="1">
-                          <a:latin typeface="Cambria Math" panose="02040503050406030204" pitchFamily="18" charset="0"/>
-                        </a:rPr>
-                        <m:t>+</m:t>
-                      </m:r>
-                      <m:r>
-                        <a:rPr lang="nl-BE" sz="2400" i="1">
-                          <a:latin typeface="Cambria Math" panose="02040503050406030204" pitchFamily="18" charset="0"/>
-                        </a:rPr>
-                        <m:t>𝑏</m:t>
-                      </m:r>
-                      <m:r>
-                        <a:rPr lang="nl-BE" sz="2400" i="1" baseline="30000">
-                          <a:latin typeface="Cambria Math" panose="02040503050406030204" pitchFamily="18" charset="0"/>
-                        </a:rPr>
-                        <m:t>1</m:t>
-                      </m:r>
-                      <m:r>
-                        <a:rPr lang="nl-BE" sz="2400" i="1">
-                          <a:latin typeface="Cambria Math" panose="02040503050406030204" pitchFamily="18" charset="0"/>
-                        </a:rPr>
-                        <m:t>)</m:t>
-                      </m:r>
-                    </m:oMath>
-                  </m:oMathPara>
-                </a14:m>
-                <a:endParaRPr lang="nl-BE" sz="2400" dirty="0"/>
-              </a:p>
-            </p:txBody>
-          </p:sp>
-        </mc:Choice>
-        <mc:Fallback xmlns="">
-          <p:sp>
-            <p:nvSpPr>
-              <p:cNvPr id="19" name="Tekstvak 18">
-                <a:extLst>
-                  <a:ext uri="{FF2B5EF4-FFF2-40B4-BE49-F238E27FC236}">
-                    <a16:creationId xmlns:a16="http://schemas.microsoft.com/office/drawing/2014/main" id="{9E1010C2-2A6B-4EEE-9C31-224D7658EAA4}"/>
-                  </a:ext>
-                </a:extLst>
-              </p:cNvPr>
-              <p:cNvSpPr txBox="1">
-                <a:spLocks noRot="1" noChangeAspect="1" noMove="1" noResize="1" noEditPoints="1" noAdjustHandles="1" noChangeArrowheads="1" noChangeShapeType="1" noTextEdit="1"/>
-              </p:cNvSpPr>
-              <p:nvPr/>
-            </p:nvSpPr>
-            <p:spPr>
-              <a:xfrm>
-                <a:off x="603609" y="4113891"/>
-                <a:ext cx="1744743" cy="369332"/>
-              </a:xfrm>
-              <a:prstGeom prst="rect">
-                <a:avLst/>
-              </a:prstGeom>
-              <a:blipFill>
-                <a:blip r:embed="rId4"/>
-                <a:stretch>
-                  <a:fillRect l="-6294" r="-6993" b="-38333"/>
-                </a:stretch>
-              </a:blipFill>
-            </p:spPr>
-            <p:txBody>
-              <a:bodyPr/>
-              <a:lstStyle/>
-              <a:p>
-                <a:r>
-                  <a:rPr lang="nl-BE">
-                    <a:noFill/>
-                  </a:rPr>
-                  <a:t> </a:t>
-                </a:r>
-              </a:p>
-            </p:txBody>
-          </p:sp>
-        </mc:Fallback>
-      </mc:AlternateContent>
-      <p:cxnSp>
-        <p:nvCxnSpPr>
-          <p:cNvPr id="21" name="Verbindingslijn: gebogen 20">
+      <p:pic>
+        <p:nvPicPr>
+          <p:cNvPr id="25" name="Picture 24" descr="Diagram&#10;&#10;Description automatically generated">
             <a:extLst>
               <a:ext uri="{FF2B5EF4-FFF2-40B4-BE49-F238E27FC236}">
-                <a16:creationId xmlns:a16="http://schemas.microsoft.com/office/drawing/2014/main" id="{5ECB2B09-6DB4-46FA-9A16-560C06BE8111}"/>
+                <a16:creationId xmlns:a16="http://schemas.microsoft.com/office/drawing/2014/main" id="{E1E17FDB-4C05-4256-BEBD-98192EE1F9C3}"/>
               </a:ext>
             </a:extLst>
           </p:cNvPr>
-          <p:cNvCxnSpPr>
-            <a:cxnSpLocks/>
-          </p:cNvCxnSpPr>
+          <p:cNvPicPr>
+            <a:picLocks noChangeAspect="1"/>
+          </p:cNvPicPr>
           <p:nvPr/>
-        </p:nvCxnSpPr>
+        </p:nvPicPr>
+        <p:blipFill rotWithShape="1">
+          <a:blip r:embed="rId3"/>
+          <a:srcRect b="5498"/>
+          <a:stretch/>
+        </p:blipFill>
         <p:spPr>
-          <a:xfrm rot="10800000" flipV="1">
-            <a:off x="1054007" y="2587100"/>
-            <a:ext cx="4352494" cy="1204502"/>
+          <a:xfrm>
+            <a:off x="0" y="0"/>
+            <a:ext cx="12192000" cy="6181703"/>
           </a:xfrm>
-          <a:prstGeom prst="bentConnector3">
-            <a:avLst>
-              <a:gd name="adj1" fmla="val -176"/>
-            </a:avLst>
+          <a:prstGeom prst="rect">
+            <a:avLst/>
           </a:prstGeom>
-          <a:ln>
-            <a:solidFill>
-              <a:schemeClr val="tx1">
-                <a:lumMod val="50000"/>
-              </a:schemeClr>
-            </a:solidFill>
-            <a:tailEnd type="triangle"/>
-          </a:ln>
         </p:spPr>
-        <p:style>
-          <a:lnRef idx="2">
-            <a:schemeClr val="dk1"/>
-          </a:lnRef>
-          <a:fillRef idx="0">
-            <a:schemeClr val="dk1"/>
-          </a:fillRef>
-          <a:effectRef idx="1">
-            <a:schemeClr val="dk1"/>
-          </a:effectRef>
-          <a:fontRef idx="minor">
-            <a:schemeClr val="tx1"/>
-          </a:fontRef>
-        </p:style>
-      </p:cxnSp>
-      <p:cxnSp>
-        <p:nvCxnSpPr>
-          <p:cNvPr id="25" name="Verbindingslijn: gebogen 24">
-            <a:extLst>
-              <a:ext uri="{FF2B5EF4-FFF2-40B4-BE49-F238E27FC236}">
-                <a16:creationId xmlns:a16="http://schemas.microsoft.com/office/drawing/2014/main" id="{0B6F44D1-162E-4712-98CD-DF5312BC8E1F}"/>
-              </a:ext>
-            </a:extLst>
-          </p:cNvPr>
-          <p:cNvCxnSpPr>
-            <a:cxnSpLocks/>
-          </p:cNvCxnSpPr>
-          <p:nvPr/>
-        </p:nvCxnSpPr>
-        <p:spPr>
-          <a:xfrm flipH="1">
-            <a:off x="2515435" y="2923773"/>
-            <a:ext cx="4074783" cy="1374783"/>
-          </a:xfrm>
-          <a:prstGeom prst="bentConnector3">
-            <a:avLst>
-              <a:gd name="adj1" fmla="val -150"/>
-            </a:avLst>
-          </a:prstGeom>
-          <a:ln>
-            <a:solidFill>
-              <a:schemeClr val="tx1">
-                <a:lumMod val="50000"/>
-              </a:schemeClr>
-            </a:solidFill>
-            <a:tailEnd type="triangle"/>
-          </a:ln>
-        </p:spPr>
-        <p:style>
-          <a:lnRef idx="2">
-            <a:schemeClr val="dk1"/>
-          </a:lnRef>
-          <a:fillRef idx="0">
-            <a:schemeClr val="dk1"/>
-          </a:fillRef>
-          <a:effectRef idx="1">
-            <a:schemeClr val="dk1"/>
-          </a:effectRef>
-          <a:fontRef idx="minor">
-            <a:schemeClr val="tx1"/>
-          </a:fontRef>
-        </p:style>
-      </p:cxnSp>
-      <p:cxnSp>
-        <p:nvCxnSpPr>
-          <p:cNvPr id="28" name="Verbindingslijn: gebogen 27">
-            <a:extLst>
-              <a:ext uri="{FF2B5EF4-FFF2-40B4-BE49-F238E27FC236}">
-                <a16:creationId xmlns:a16="http://schemas.microsoft.com/office/drawing/2014/main" id="{50548967-9649-4CBE-85F1-A0D49876F956}"/>
-              </a:ext>
-            </a:extLst>
-          </p:cNvPr>
-          <p:cNvCxnSpPr>
-            <a:cxnSpLocks/>
-          </p:cNvCxnSpPr>
-          <p:nvPr/>
-        </p:nvCxnSpPr>
-        <p:spPr>
-          <a:xfrm flipH="1">
-            <a:off x="4181411" y="3036020"/>
-            <a:ext cx="3592279" cy="1845166"/>
-          </a:xfrm>
-          <a:prstGeom prst="bentConnector3">
-            <a:avLst>
-              <a:gd name="adj1" fmla="val -64"/>
-            </a:avLst>
-          </a:prstGeom>
-          <a:ln>
-            <a:solidFill>
-              <a:schemeClr val="tx1">
-                <a:lumMod val="50000"/>
-              </a:schemeClr>
-            </a:solidFill>
-            <a:tailEnd type="triangle"/>
-          </a:ln>
-        </p:spPr>
-        <p:style>
-          <a:lnRef idx="2">
-            <a:schemeClr val="dk1"/>
-          </a:lnRef>
-          <a:fillRef idx="0">
-            <a:schemeClr val="dk1"/>
-          </a:fillRef>
-          <a:effectRef idx="1">
-            <a:schemeClr val="dk1"/>
-          </a:effectRef>
-          <a:fontRef idx="minor">
-            <a:schemeClr val="tx1"/>
-          </a:fontRef>
-        </p:style>
-      </p:cxnSp>
-      <mc:AlternateContent xmlns:mc="http://schemas.openxmlformats.org/markup-compatibility/2006" xmlns:a14="http://schemas.microsoft.com/office/drawing/2010/main">
-        <mc:Choice Requires="a14">
-          <p:sp>
-            <p:nvSpPr>
-              <p:cNvPr id="32" name="Tekstvak 31">
-                <a:extLst>
-                  <a:ext uri="{FF2B5EF4-FFF2-40B4-BE49-F238E27FC236}">
-                    <a16:creationId xmlns:a16="http://schemas.microsoft.com/office/drawing/2014/main" id="{7D9566BE-A385-4401-9F0E-A94D0D6BEE71}"/>
-                  </a:ext>
-                </a:extLst>
-              </p:cNvPr>
-              <p:cNvSpPr txBox="1"/>
-              <p:nvPr/>
-            </p:nvSpPr>
-            <p:spPr>
-              <a:xfrm>
-                <a:off x="149872" y="4643604"/>
-                <a:ext cx="4169040" cy="369332"/>
-              </a:xfrm>
-              <a:prstGeom prst="rect">
-                <a:avLst/>
-              </a:prstGeom>
-              <a:noFill/>
-            </p:spPr>
-            <p:txBody>
-              <a:bodyPr wrap="square" lIns="0" tIns="0" rIns="0" bIns="0" rtlCol="0">
-                <a:spAutoFit/>
-              </a:bodyPr>
-              <a:lstStyle/>
-              <a:p>
-                <a:pPr/>
-                <a14:m>
-                  <m:oMathPara xmlns:m="http://schemas.openxmlformats.org/officeDocument/2006/math">
-                    <m:oMathParaPr>
-                      <m:jc m:val="centerGroup"/>
-                    </m:oMathParaPr>
-                    <m:oMath xmlns:m="http://schemas.openxmlformats.org/officeDocument/2006/math">
-                      <m:r>
-                        <a:rPr lang="nl-BE" sz="2400" b="0" i="1" smtClean="0">
-                          <a:latin typeface="Cambria Math" panose="02040503050406030204" pitchFamily="18" charset="0"/>
-                        </a:rPr>
-                        <m:t>𝑓</m:t>
-                      </m:r>
-                      <m:r>
-                        <a:rPr lang="nl-BE" sz="2400" b="0" i="1" smtClean="0">
-                          <a:latin typeface="Cambria Math" panose="02040503050406030204" pitchFamily="18" charset="0"/>
-                        </a:rPr>
-                        <m:t>(</m:t>
-                      </m:r>
-                      <m:r>
-                        <a:rPr lang="nl-BE" sz="2400" b="0" i="1" smtClean="0">
-                          <a:latin typeface="Cambria Math" panose="02040503050406030204" pitchFamily="18" charset="0"/>
-                        </a:rPr>
-                        <m:t>𝑊</m:t>
-                      </m:r>
-                      <m:r>
-                        <a:rPr lang="nl-BE" sz="2400" b="0" i="1" baseline="30000" smtClean="0">
-                          <a:latin typeface="Cambria Math" panose="02040503050406030204" pitchFamily="18" charset="0"/>
-                        </a:rPr>
-                        <m:t>2</m:t>
-                      </m:r>
-                      <m:r>
-                        <a:rPr lang="nl-BE" sz="2400" i="1">
-                          <a:latin typeface="Cambria Math" panose="02040503050406030204" pitchFamily="18" charset="0"/>
-                        </a:rPr>
-                        <m:t>𝑓</m:t>
-                      </m:r>
-                      <m:d>
-                        <m:dPr>
-                          <m:ctrlPr>
-                            <a:rPr lang="nl-BE" sz="2400" i="1">
-                              <a:latin typeface="Cambria Math" panose="02040503050406030204" pitchFamily="18" charset="0"/>
-                            </a:rPr>
-                          </m:ctrlPr>
-                        </m:dPr>
-                        <m:e>
-                          <m:r>
-                            <a:rPr lang="nl-BE" sz="2400" i="1">
-                              <a:latin typeface="Cambria Math" panose="02040503050406030204" pitchFamily="18" charset="0"/>
-                            </a:rPr>
-                            <m:t>𝑊</m:t>
-                          </m:r>
-                          <m:r>
-                            <a:rPr lang="nl-BE" sz="2400" i="1" baseline="30000">
-                              <a:latin typeface="Cambria Math" panose="02040503050406030204" pitchFamily="18" charset="0"/>
-                            </a:rPr>
-                            <m:t>1 </m:t>
-                          </m:r>
-                          <m:r>
-                            <a:rPr lang="nl-BE" sz="2400" i="1">
-                              <a:latin typeface="Cambria Math" panose="02040503050406030204" pitchFamily="18" charset="0"/>
-                            </a:rPr>
-                            <m:t>𝑥</m:t>
-                          </m:r>
-                          <m:r>
-                            <a:rPr lang="nl-BE" sz="2400" i="1">
-                              <a:latin typeface="Cambria Math" panose="02040503050406030204" pitchFamily="18" charset="0"/>
-                            </a:rPr>
-                            <m:t>+</m:t>
-                          </m:r>
-                          <m:r>
-                            <a:rPr lang="nl-BE" sz="2400" i="1">
-                              <a:latin typeface="Cambria Math" panose="02040503050406030204" pitchFamily="18" charset="0"/>
-                            </a:rPr>
-                            <m:t>𝑏</m:t>
-                          </m:r>
-                          <m:r>
-                            <a:rPr lang="nl-BE" sz="2400" i="1" baseline="30000">
-                              <a:latin typeface="Cambria Math" panose="02040503050406030204" pitchFamily="18" charset="0"/>
-                            </a:rPr>
-                            <m:t>1</m:t>
-                          </m:r>
-                        </m:e>
-                      </m:d>
-                      <m:r>
-                        <a:rPr lang="nl-BE" sz="2400" b="0" i="1" smtClean="0">
-                          <a:latin typeface="Cambria Math" panose="02040503050406030204" pitchFamily="18" charset="0"/>
-                        </a:rPr>
-                        <m:t>+</m:t>
-                      </m:r>
-                      <m:r>
-                        <a:rPr lang="nl-BE" sz="2400" b="0" i="1" smtClean="0">
-                          <a:latin typeface="Cambria Math" panose="02040503050406030204" pitchFamily="18" charset="0"/>
-                        </a:rPr>
-                        <m:t>𝑏</m:t>
-                      </m:r>
-                      <m:r>
-                        <a:rPr lang="nl-BE" sz="2400" b="0" i="1" baseline="30000" smtClean="0">
-                          <a:latin typeface="Cambria Math" panose="02040503050406030204" pitchFamily="18" charset="0"/>
-                        </a:rPr>
-                        <m:t>2</m:t>
-                      </m:r>
-                      <m:r>
-                        <a:rPr lang="nl-BE" sz="2400" b="0" i="1" smtClean="0">
-                          <a:latin typeface="Cambria Math" panose="02040503050406030204" pitchFamily="18" charset="0"/>
-                        </a:rPr>
-                        <m:t>)</m:t>
-                      </m:r>
-                    </m:oMath>
-                  </m:oMathPara>
-                </a14:m>
-                <a:endParaRPr lang="nl-BE" sz="2400" dirty="0"/>
-              </a:p>
-            </p:txBody>
-          </p:sp>
-        </mc:Choice>
-        <mc:Fallback xmlns="">
-          <p:sp>
-            <p:nvSpPr>
-              <p:cNvPr id="32" name="Tekstvak 31">
-                <a:extLst>
-                  <a:ext uri="{FF2B5EF4-FFF2-40B4-BE49-F238E27FC236}">
-                    <a16:creationId xmlns:a16="http://schemas.microsoft.com/office/drawing/2014/main" id="{7D9566BE-A385-4401-9F0E-A94D0D6BEE71}"/>
-                  </a:ext>
-                </a:extLst>
-              </p:cNvPr>
-              <p:cNvSpPr txBox="1">
-                <a:spLocks noRot="1" noChangeAspect="1" noMove="1" noResize="1" noEditPoints="1" noAdjustHandles="1" noChangeArrowheads="1" noChangeShapeType="1" noTextEdit="1"/>
-              </p:cNvSpPr>
-              <p:nvPr/>
-            </p:nvSpPr>
-            <p:spPr>
-              <a:xfrm>
-                <a:off x="149872" y="4643604"/>
-                <a:ext cx="4169040" cy="369332"/>
-              </a:xfrm>
-              <a:prstGeom prst="rect">
-                <a:avLst/>
-              </a:prstGeom>
-              <a:blipFill>
-                <a:blip r:embed="rId5"/>
-                <a:stretch>
-                  <a:fillRect b="-38333"/>
-                </a:stretch>
-              </a:blipFill>
-            </p:spPr>
-            <p:txBody>
-              <a:bodyPr/>
-              <a:lstStyle/>
-              <a:p>
-                <a:r>
-                  <a:rPr lang="nl-BE">
-                    <a:noFill/>
-                  </a:rPr>
-                  <a:t> </a:t>
-                </a:r>
-              </a:p>
-            </p:txBody>
-          </p:sp>
-        </mc:Fallback>
-      </mc:AlternateContent>
-      <mc:AlternateContent xmlns:mc="http://schemas.openxmlformats.org/markup-compatibility/2006" xmlns:a14="http://schemas.microsoft.com/office/drawing/2010/main">
-        <mc:Choice Requires="a14">
-          <p:sp>
-            <p:nvSpPr>
-              <p:cNvPr id="38" name="Tekstvak 37">
-                <a:extLst>
-                  <a:ext uri="{FF2B5EF4-FFF2-40B4-BE49-F238E27FC236}">
-                    <a16:creationId xmlns:a16="http://schemas.microsoft.com/office/drawing/2014/main" id="{945ADE3D-E952-49E1-A258-FDDC7BD37418}"/>
-                  </a:ext>
-                </a:extLst>
-              </p:cNvPr>
-              <p:cNvSpPr txBox="1"/>
-              <p:nvPr/>
-            </p:nvSpPr>
-            <p:spPr>
-              <a:xfrm>
-                <a:off x="603609" y="5126289"/>
-                <a:ext cx="6153275" cy="369332"/>
-              </a:xfrm>
-              <a:prstGeom prst="rect">
-                <a:avLst/>
-              </a:prstGeom>
-              <a:noFill/>
-            </p:spPr>
-            <p:txBody>
-              <a:bodyPr wrap="square" lIns="0" tIns="0" rIns="0" bIns="0" rtlCol="0">
-                <a:spAutoFit/>
-              </a:bodyPr>
-              <a:lstStyle/>
-              <a:p>
-                <a14:m>
-                  <m:oMath xmlns:m="http://schemas.openxmlformats.org/officeDocument/2006/math">
-                    <m:r>
-                      <a:rPr lang="nl-BE" sz="2400" b="0" i="1" smtClean="0">
-                        <a:latin typeface="Cambria Math" panose="02040503050406030204" pitchFamily="18" charset="0"/>
-                      </a:rPr>
-                      <m:t>𝐹</m:t>
-                    </m:r>
-                    <m:d>
-                      <m:dPr>
-                        <m:ctrlPr>
-                          <a:rPr lang="nl-BE" sz="2400" b="0" i="1" smtClean="0">
-                            <a:latin typeface="Cambria Math" panose="02040503050406030204" pitchFamily="18" charset="0"/>
-                          </a:rPr>
-                        </m:ctrlPr>
-                      </m:dPr>
-                      <m:e>
-                        <m:r>
-                          <a:rPr lang="nl-BE" sz="2400" b="0" i="1" smtClean="0">
-                            <a:latin typeface="Cambria Math" panose="02040503050406030204" pitchFamily="18" charset="0"/>
-                          </a:rPr>
-                          <m:t>𝑥</m:t>
-                        </m:r>
-                      </m:e>
-                    </m:d>
-                    <m:r>
-                      <a:rPr lang="nl-BE" sz="2400" b="0" i="1" smtClean="0">
-                        <a:latin typeface="Cambria Math" panose="02040503050406030204" pitchFamily="18" charset="0"/>
-                      </a:rPr>
-                      <m:t>=</m:t>
-                    </m:r>
-                    <m:r>
-                      <a:rPr lang="nl-BE" sz="2400" b="0" i="1" smtClean="0">
-                        <a:latin typeface="Cambria Math" panose="02040503050406030204" pitchFamily="18" charset="0"/>
-                      </a:rPr>
-                      <m:t>𝑓</m:t>
-                    </m:r>
-                    <m:r>
-                      <a:rPr lang="nl-BE" sz="2400" b="0" i="1" smtClean="0">
-                        <a:latin typeface="Cambria Math" panose="02040503050406030204" pitchFamily="18" charset="0"/>
-                      </a:rPr>
-                      <m:t>(</m:t>
-                    </m:r>
-                    <m:r>
-                      <a:rPr lang="nl-BE" sz="2400" b="0" i="1" smtClean="0">
-                        <a:latin typeface="Cambria Math" panose="02040503050406030204" pitchFamily="18" charset="0"/>
-                      </a:rPr>
-                      <m:t>𝑊</m:t>
-                    </m:r>
-                    <m:r>
-                      <a:rPr lang="nl-BE" sz="2400" b="0" i="1" baseline="30000" smtClean="0">
-                        <a:latin typeface="Cambria Math" panose="02040503050406030204" pitchFamily="18" charset="0"/>
-                      </a:rPr>
-                      <m:t>3</m:t>
-                    </m:r>
-                    <m:r>
-                      <a:rPr lang="nl-BE" sz="2400" b="0" i="1" smtClean="0">
-                        <a:latin typeface="Cambria Math" panose="02040503050406030204" pitchFamily="18" charset="0"/>
-                      </a:rPr>
-                      <m:t>𝑓</m:t>
-                    </m:r>
-                    <m:d>
-                      <m:dPr>
-                        <m:ctrlPr>
-                          <a:rPr lang="nl-BE" sz="2400" b="0" i="1" smtClean="0">
-                            <a:latin typeface="Cambria Math" panose="02040503050406030204" pitchFamily="18" charset="0"/>
-                          </a:rPr>
-                        </m:ctrlPr>
-                      </m:dPr>
-                      <m:e>
-                        <m:r>
-                          <a:rPr lang="nl-BE" sz="2400" b="0" i="1" smtClean="0">
-                            <a:latin typeface="Cambria Math" panose="02040503050406030204" pitchFamily="18" charset="0"/>
-                          </a:rPr>
-                          <m:t>𝑊</m:t>
-                        </m:r>
-                        <m:r>
-                          <a:rPr lang="nl-BE" sz="2400" b="0" i="1" baseline="30000" smtClean="0">
-                            <a:latin typeface="Cambria Math" panose="02040503050406030204" pitchFamily="18" charset="0"/>
-                          </a:rPr>
-                          <m:t>2</m:t>
-                        </m:r>
-                        <m:r>
-                          <a:rPr lang="nl-BE" sz="2400" i="1">
-                            <a:latin typeface="Cambria Math" panose="02040503050406030204" pitchFamily="18" charset="0"/>
-                          </a:rPr>
-                          <m:t>𝑓</m:t>
-                        </m:r>
-                        <m:d>
-                          <m:dPr>
-                            <m:ctrlPr>
-                              <a:rPr lang="nl-BE" sz="2400" i="1">
-                                <a:latin typeface="Cambria Math" panose="02040503050406030204" pitchFamily="18" charset="0"/>
-                              </a:rPr>
-                            </m:ctrlPr>
-                          </m:dPr>
-                          <m:e>
-                            <m:r>
-                              <a:rPr lang="nl-BE" sz="2400" i="1">
-                                <a:latin typeface="Cambria Math" panose="02040503050406030204" pitchFamily="18" charset="0"/>
-                              </a:rPr>
-                              <m:t>𝑊</m:t>
-                            </m:r>
-                            <m:r>
-                              <a:rPr lang="nl-BE" sz="2400" i="1" baseline="30000">
-                                <a:latin typeface="Cambria Math" panose="02040503050406030204" pitchFamily="18" charset="0"/>
-                              </a:rPr>
-                              <m:t>1 </m:t>
-                            </m:r>
-                            <m:r>
-                              <a:rPr lang="nl-BE" sz="2400" i="1">
-                                <a:latin typeface="Cambria Math" panose="02040503050406030204" pitchFamily="18" charset="0"/>
-                              </a:rPr>
-                              <m:t>𝑥</m:t>
-                            </m:r>
-                            <m:r>
-                              <a:rPr lang="nl-BE" sz="2400" i="1">
-                                <a:latin typeface="Cambria Math" panose="02040503050406030204" pitchFamily="18" charset="0"/>
-                              </a:rPr>
-                              <m:t>+</m:t>
-                            </m:r>
-                            <m:r>
-                              <a:rPr lang="nl-BE" sz="2400" i="1">
-                                <a:latin typeface="Cambria Math" panose="02040503050406030204" pitchFamily="18" charset="0"/>
-                              </a:rPr>
-                              <m:t>𝑏</m:t>
-                            </m:r>
-                            <m:r>
-                              <a:rPr lang="nl-BE" sz="2400" i="1" baseline="30000">
-                                <a:latin typeface="Cambria Math" panose="02040503050406030204" pitchFamily="18" charset="0"/>
-                              </a:rPr>
-                              <m:t>1</m:t>
-                            </m:r>
-                          </m:e>
-                        </m:d>
-                        <m:r>
-                          <a:rPr lang="nl-BE" sz="2400" b="0" i="1" smtClean="0">
-                            <a:latin typeface="Cambria Math" panose="02040503050406030204" pitchFamily="18" charset="0"/>
-                          </a:rPr>
-                          <m:t>+</m:t>
-                        </m:r>
-                        <m:r>
-                          <a:rPr lang="nl-BE" sz="2400" b="0" i="1" smtClean="0">
-                            <a:latin typeface="Cambria Math" panose="02040503050406030204" pitchFamily="18" charset="0"/>
-                          </a:rPr>
-                          <m:t>𝑏</m:t>
-                        </m:r>
-                        <m:r>
-                          <a:rPr lang="nl-BE" sz="2400" b="0" i="1" baseline="30000" smtClean="0">
-                            <a:latin typeface="Cambria Math" panose="02040503050406030204" pitchFamily="18" charset="0"/>
-                          </a:rPr>
-                          <m:t>2</m:t>
-                        </m:r>
-                      </m:e>
-                    </m:d>
-                    <m:r>
-                      <a:rPr lang="nl-BE" sz="2400" b="0" i="1" smtClean="0">
-                        <a:latin typeface="Cambria Math" panose="02040503050406030204" pitchFamily="18" charset="0"/>
-                      </a:rPr>
-                      <m:t>+</m:t>
-                    </m:r>
-                    <m:r>
-                      <a:rPr lang="nl-BE" sz="2400" b="0" i="1" smtClean="0">
-                        <a:latin typeface="Cambria Math" panose="02040503050406030204" pitchFamily="18" charset="0"/>
-                      </a:rPr>
-                      <m:t>𝑏</m:t>
-                    </m:r>
-                    <m:r>
-                      <a:rPr lang="nl-BE" sz="2400" b="0" i="1" baseline="30000" smtClean="0">
-                        <a:latin typeface="Cambria Math" panose="02040503050406030204" pitchFamily="18" charset="0"/>
-                      </a:rPr>
-                      <m:t>3</m:t>
-                    </m:r>
-                  </m:oMath>
-                </a14:m>
-                <a:r>
-                  <a:rPr lang="nl-BE" sz="2400" dirty="0"/>
-                  <a:t>)</a:t>
-                </a:r>
-              </a:p>
-            </p:txBody>
-          </p:sp>
-        </mc:Choice>
-        <mc:Fallback xmlns="">
-          <p:sp>
-            <p:nvSpPr>
-              <p:cNvPr id="38" name="Tekstvak 37">
-                <a:extLst>
-                  <a:ext uri="{FF2B5EF4-FFF2-40B4-BE49-F238E27FC236}">
-                    <a16:creationId xmlns:a16="http://schemas.microsoft.com/office/drawing/2014/main" id="{945ADE3D-E952-49E1-A258-FDDC7BD37418}"/>
-                  </a:ext>
-                </a:extLst>
-              </p:cNvPr>
-              <p:cNvSpPr txBox="1">
-                <a:spLocks noRot="1" noChangeAspect="1" noMove="1" noResize="1" noEditPoints="1" noAdjustHandles="1" noChangeArrowheads="1" noChangeShapeType="1" noTextEdit="1"/>
-              </p:cNvSpPr>
-              <p:nvPr/>
-            </p:nvSpPr>
-            <p:spPr>
-              <a:xfrm>
-                <a:off x="603609" y="5126289"/>
-                <a:ext cx="6153275" cy="369332"/>
-              </a:xfrm>
-              <a:prstGeom prst="rect">
-                <a:avLst/>
-              </a:prstGeom>
-              <a:blipFill>
-                <a:blip r:embed="rId6"/>
-                <a:stretch>
-                  <a:fillRect l="-1685" t="-24590" b="-49180"/>
-                </a:stretch>
-              </a:blipFill>
-            </p:spPr>
-            <p:txBody>
-              <a:bodyPr/>
-              <a:lstStyle/>
-              <a:p>
-                <a:r>
-                  <a:rPr lang="nl-BE">
-                    <a:noFill/>
-                  </a:rPr>
-                  <a:t> </a:t>
-                </a:r>
-              </a:p>
-            </p:txBody>
-          </p:sp>
-        </mc:Fallback>
-      </mc:AlternateContent>
-      <p:cxnSp>
-        <p:nvCxnSpPr>
-          <p:cNvPr id="39" name="Verbindingslijn: gebogen 38">
-            <a:extLst>
-              <a:ext uri="{FF2B5EF4-FFF2-40B4-BE49-F238E27FC236}">
-                <a16:creationId xmlns:a16="http://schemas.microsoft.com/office/drawing/2014/main" id="{F9EA993F-B9A5-4D6F-A06E-D2827CAED997}"/>
-              </a:ext>
-            </a:extLst>
-          </p:cNvPr>
-          <p:cNvCxnSpPr>
-            <a:cxnSpLocks/>
-          </p:cNvCxnSpPr>
-          <p:nvPr/>
-        </p:nvCxnSpPr>
-        <p:spPr>
-          <a:xfrm flipH="1">
-            <a:off x="6440153" y="2984519"/>
-            <a:ext cx="2517997" cy="2368769"/>
-          </a:xfrm>
-          <a:prstGeom prst="bentConnector3">
-            <a:avLst>
-              <a:gd name="adj1" fmla="val 96"/>
-            </a:avLst>
-          </a:prstGeom>
-          <a:ln>
-            <a:solidFill>
-              <a:schemeClr val="tx1">
-                <a:lumMod val="50000"/>
-              </a:schemeClr>
-            </a:solidFill>
-            <a:tailEnd type="triangle"/>
-          </a:ln>
-        </p:spPr>
-        <p:style>
-          <a:lnRef idx="2">
-            <a:schemeClr val="dk1"/>
-          </a:lnRef>
-          <a:fillRef idx="0">
-            <a:schemeClr val="dk1"/>
-          </a:fillRef>
-          <a:effectRef idx="1">
-            <a:schemeClr val="dk1"/>
-          </a:effectRef>
-          <a:fontRef idx="minor">
-            <a:schemeClr val="tx1"/>
-          </a:fontRef>
-        </p:style>
-      </p:cxnSp>
+      </p:pic>
     </p:spTree>
     <p:extLst>
       <p:ext uri="{BB962C8B-B14F-4D97-AF65-F5344CB8AC3E}">
-        <p14:creationId xmlns:p14="http://schemas.microsoft.com/office/powerpoint/2010/main" val="1356563418"/>
+        <p14:creationId xmlns:p14="http://schemas.microsoft.com/office/powerpoint/2010/main" val="2994911464"/>
       </p:ext>
     </p:extLst>
   </p:cSld>
   <p:clrMapOvr>
     <a:masterClrMapping/>
   </p:clrMapOvr>
+  <p:timing>
+    <p:tnLst>
+      <p:par>
+        <p:cTn id="1" dur="indefinite" restart="never" nodeType="tmRoot">
+          <p:childTnLst>
+            <p:seq concurrent="1" nextAc="seek">
+              <p:cTn id="2" dur="indefinite" nodeType="mainSeq">
+                <p:childTnLst>
+                  <p:par>
+                    <p:cTn id="3" fill="hold">
+                      <p:stCondLst>
+                        <p:cond delay="indefinite"/>
+                      </p:stCondLst>
+                      <p:childTnLst>
+                        <p:par>
+                          <p:cTn id="4" fill="hold">
+                            <p:stCondLst>
+                              <p:cond delay="0"/>
+                            </p:stCondLst>
+                            <p:childTnLst>
+                              <p:par>
+                                <p:cTn id="5" presetID="1" presetClass="entr" presetSubtype="0" fill="hold" nodeType="clickEffect">
+                                  <p:stCondLst>
+                                    <p:cond delay="0"/>
+                                  </p:stCondLst>
+                                  <p:childTnLst>
+                                    <p:set>
+                                      <p:cBhvr>
+                                        <p:cTn id="6" dur="1" fill="hold">
+                                          <p:stCondLst>
+                                            <p:cond delay="0"/>
+                                          </p:stCondLst>
+                                        </p:cTn>
+                                        <p:tgtEl>
+                                          <p:spTgt spid="25"/>
+                                        </p:tgtEl>
+                                        <p:attrNameLst>
+                                          <p:attrName>style.visibility</p:attrName>
+                                        </p:attrNameLst>
+                                      </p:cBhvr>
+                                      <p:to>
+                                        <p:strVal val="visible"/>
+                                      </p:to>
+                                    </p:set>
+                                  </p:childTnLst>
+                                </p:cTn>
+                              </p:par>
+                              <p:par>
+                                <p:cTn id="7" presetID="1" presetClass="exit" presetSubtype="0" fill="hold" nodeType="withEffect">
+                                  <p:stCondLst>
+                                    <p:cond delay="0"/>
+                                  </p:stCondLst>
+                                  <p:childTnLst>
+                                    <p:set>
+                                      <p:cBhvr>
+                                        <p:cTn id="8" dur="1" fill="hold">
+                                          <p:stCondLst>
+                                            <p:cond delay="0"/>
+                                          </p:stCondLst>
+                                        </p:cTn>
+                                        <p:tgtEl>
+                                          <p:spTgt spid="27"/>
+                                        </p:tgtEl>
+                                        <p:attrNameLst>
+                                          <p:attrName>style.visibility</p:attrName>
+                                        </p:attrNameLst>
+                                      </p:cBhvr>
+                                      <p:to>
+                                        <p:strVal val="hidden"/>
+                                      </p:to>
+                                    </p:set>
+                                  </p:childTnLst>
+                                </p:cTn>
+                              </p:par>
+                            </p:childTnLst>
+                          </p:cTn>
+                        </p:par>
+                      </p:childTnLst>
+                    </p:cTn>
+                  </p:par>
+                </p:childTnLst>
+              </p:cTn>
+              <p:prevCondLst>
+                <p:cond evt="onPrev" delay="0">
+                  <p:tgtEl>
+                    <p:sldTgt/>
+                  </p:tgtEl>
+                </p:cond>
+              </p:prevCondLst>
+              <p:nextCondLst>
+                <p:cond evt="onNext" delay="0">
+                  <p:tgtEl>
+                    <p:sldTgt/>
+                  </p:tgtEl>
+                </p:cond>
+              </p:nextCondLst>
+            </p:seq>
+          </p:childTnLst>
+        </p:cTn>
+      </p:par>
+    </p:tnLst>
+  </p:timing>
 </p:sld>
 </file>
 

</xml_diff>

<commit_message>
Slides wat getweakt (voorlopige versie).
</commit_message>
<xml_diff>
--- a/Literatuurstudie/Literatuurstudie_ppt.pptx
+++ b/Literatuurstudie/Literatuurstudie_ppt.pptx
@@ -6,29 +6,32 @@
     <p:sldMasterId id="2147483694" r:id="rId2"/>
   </p:sldMasterIdLst>
   <p:notesMasterIdLst>
-    <p:notesMasterId r:id="rId20"/>
+    <p:notesMasterId r:id="rId23"/>
   </p:notesMasterIdLst>
   <p:handoutMasterIdLst>
-    <p:handoutMasterId r:id="rId21"/>
+    <p:handoutMasterId r:id="rId24"/>
   </p:handoutMasterIdLst>
   <p:sldIdLst>
     <p:sldId id="261" r:id="rId3"/>
     <p:sldId id="268" r:id="rId4"/>
     <p:sldId id="269" r:id="rId5"/>
-    <p:sldId id="284" r:id="rId6"/>
-    <p:sldId id="271" r:id="rId7"/>
-    <p:sldId id="283" r:id="rId8"/>
-    <p:sldId id="279" r:id="rId9"/>
-    <p:sldId id="281" r:id="rId10"/>
-    <p:sldId id="282" r:id="rId11"/>
-    <p:sldId id="276" r:id="rId12"/>
-    <p:sldId id="278" r:id="rId13"/>
-    <p:sldId id="275" r:id="rId14"/>
-    <p:sldId id="272" r:id="rId15"/>
-    <p:sldId id="273" r:id="rId16"/>
-    <p:sldId id="274" r:id="rId17"/>
-    <p:sldId id="287" r:id="rId18"/>
-    <p:sldId id="285" r:id="rId19"/>
+    <p:sldId id="288" r:id="rId6"/>
+    <p:sldId id="284" r:id="rId7"/>
+    <p:sldId id="289" r:id="rId8"/>
+    <p:sldId id="271" r:id="rId9"/>
+    <p:sldId id="283" r:id="rId10"/>
+    <p:sldId id="290" r:id="rId11"/>
+    <p:sldId id="279" r:id="rId12"/>
+    <p:sldId id="281" r:id="rId13"/>
+    <p:sldId id="282" r:id="rId14"/>
+    <p:sldId id="276" r:id="rId15"/>
+    <p:sldId id="278" r:id="rId16"/>
+    <p:sldId id="275" r:id="rId17"/>
+    <p:sldId id="272" r:id="rId18"/>
+    <p:sldId id="273" r:id="rId19"/>
+    <p:sldId id="274" r:id="rId20"/>
+    <p:sldId id="287" r:id="rId21"/>
+    <p:sldId id="285" r:id="rId22"/>
   </p:sldIdLst>
   <p:sldSz cx="12192000" cy="6858000"/>
   <p:notesSz cx="6858000" cy="9144000"/>
@@ -230,7 +233,7 @@
           <a:p>
             <a:fld id="{8F591CCF-F6FD-734B-854A-5BC033593B1E}" type="datetimeFigureOut">
               <a:rPr lang="nl-NL" smtClean="0"/>
-              <a:t>9-11-2020</a:t>
+              <a:t>10-11-2020</a:t>
             </a:fld>
             <a:endParaRPr lang="nl-NL"/>
           </a:p>
@@ -296,7 +299,7 @@
           <a:p>
             <a:fld id="{E152A6D4-CD3D-5148-8B70-A84796F20135}" type="slidenum">
               <a:rPr lang="nl-NL" smtClean="0"/>
-              <a:t>‹nr.›</a:t>
+              <a:t>‹#›</a:t>
             </a:fld>
             <a:endParaRPr lang="nl-NL"/>
           </a:p>
@@ -395,7 +398,7 @@
           <a:p>
             <a:fld id="{23C66214-DB21-4647-B5DA-0D17CA592867}" type="datetimeFigureOut">
               <a:rPr lang="nl-NL" smtClean="0"/>
-              <a:t>9-11-2020</a:t>
+              <a:t>10-11-2020</a:t>
             </a:fld>
             <a:endParaRPr lang="nl-NL"/>
           </a:p>
@@ -553,7 +556,7 @@
           <a:p>
             <a:fld id="{8954E32A-327F-AF4B-8E1F-209FBF93D26D}" type="slidenum">
               <a:rPr lang="nl-NL" smtClean="0"/>
-              <a:t>‹nr.›</a:t>
+              <a:t>‹#›</a:t>
             </a:fld>
             <a:endParaRPr lang="nl-NL"/>
           </a:p>
@@ -1384,7 +1387,7 @@
           <a:p>
             <a:fld id="{AC3C5412-F5E6-4727-B44A-B2B5A84DB14A}" type="datetime1">
               <a:rPr lang="nl-BE" smtClean="0"/>
-              <a:t>9/11/2020</a:t>
+              <a:t>10/11/2020</a:t>
             </a:fld>
             <a:endParaRPr lang="nl-NL"/>
           </a:p>
@@ -1429,7 +1432,7 @@
           <a:p>
             <a:fld id="{CF179DAE-D0A6-40C3-B8BC-6A97C268D03A}" type="slidenum">
               <a:rPr lang="nl-NL" smtClean="0"/>
-              <a:t>‹nr.›</a:t>
+              <a:t>‹#›</a:t>
             </a:fld>
             <a:endParaRPr lang="nl-NL"/>
           </a:p>
@@ -1667,7 +1670,7 @@
           <a:p>
             <a:fld id="{E76EA1B4-471F-4916-AE0F-2FD9B1494989}" type="datetime1">
               <a:rPr lang="nl-BE" smtClean="0"/>
-              <a:t>9/11/2020</a:t>
+              <a:t>10/11/2020</a:t>
             </a:fld>
             <a:endParaRPr lang="nl-NL"/>
           </a:p>
@@ -1712,7 +1715,7 @@
           <a:p>
             <a:fld id="{CF179DAE-D0A6-40C3-B8BC-6A97C268D03A}" type="slidenum">
               <a:rPr lang="nl-NL" smtClean="0"/>
-              <a:t>‹nr.›</a:t>
+              <a:t>‹#›</a:t>
             </a:fld>
             <a:endParaRPr lang="nl-NL"/>
           </a:p>
@@ -1997,7 +2000,7 @@
           <a:p>
             <a:fld id="{0FDEE988-C9D1-4B41-906C-78E5525EC368}" type="datetime1">
               <a:rPr lang="nl-BE" smtClean="0"/>
-              <a:t>9/11/2020</a:t>
+              <a:t>10/11/2020</a:t>
             </a:fld>
             <a:endParaRPr lang="nl-NL"/>
           </a:p>
@@ -2042,7 +2045,7 @@
           <a:p>
             <a:fld id="{0A297500-7527-634B-90F4-69D0994C32B4}" type="slidenum">
               <a:rPr lang="nl-NL" smtClean="0"/>
-              <a:t>‹nr.›</a:t>
+              <a:t>‹#›</a:t>
             </a:fld>
             <a:endParaRPr lang="nl-NL"/>
           </a:p>
@@ -2316,7 +2319,7 @@
           <a:p>
             <a:fld id="{A4C630F9-6046-48DD-8107-A903A5265F2A}" type="datetime1">
               <a:rPr lang="nl-BE" smtClean="0"/>
-              <a:t>9/11/2020</a:t>
+              <a:t>10/11/2020</a:t>
             </a:fld>
             <a:endParaRPr lang="nl-NL" dirty="0"/>
           </a:p>
@@ -2361,7 +2364,7 @@
           <a:p>
             <a:fld id="{0A297500-7527-634B-90F4-69D0994C32B4}" type="slidenum">
               <a:rPr lang="nl-NL" smtClean="0"/>
-              <a:t>‹nr.›</a:t>
+              <a:t>‹#›</a:t>
             </a:fld>
             <a:endParaRPr lang="nl-NL"/>
           </a:p>
@@ -2637,7 +2640,7 @@
           <a:p>
             <a:fld id="{AB142135-2AF6-41F5-9559-B5C94669121A}" type="datetime1">
               <a:rPr lang="nl-BE" smtClean="0"/>
-              <a:t>9/11/2020</a:t>
+              <a:t>10/11/2020</a:t>
             </a:fld>
             <a:endParaRPr lang="nl-NL" dirty="0"/>
           </a:p>
@@ -2682,7 +2685,7 @@
           <a:p>
             <a:fld id="{0A297500-7527-634B-90F4-69D0994C32B4}" type="slidenum">
               <a:rPr lang="nl-NL" smtClean="0"/>
-              <a:t>‹nr.›</a:t>
+              <a:t>‹#›</a:t>
             </a:fld>
             <a:endParaRPr lang="nl-NL"/>
           </a:p>
@@ -2779,7 +2782,7 @@
           <a:p>
             <a:fld id="{D7817D78-F253-471B-BF0C-B3EA74829726}" type="datetime1">
               <a:rPr lang="nl-BE" smtClean="0"/>
-              <a:t>9/11/2020</a:t>
+              <a:t>10/11/2020</a:t>
             </a:fld>
             <a:endParaRPr lang="nl-NL"/>
           </a:p>
@@ -2824,7 +2827,7 @@
           <a:p>
             <a:fld id="{0A297500-7527-634B-90F4-69D0994C32B4}" type="slidenum">
               <a:rPr lang="nl-NL" smtClean="0"/>
-              <a:t>‹nr.›</a:t>
+              <a:t>‹#›</a:t>
             </a:fld>
             <a:endParaRPr lang="nl-NL"/>
           </a:p>
@@ -3263,7 +3266,7 @@
           <a:p>
             <a:fld id="{94374391-CFDB-4833-B504-DEFBE92512D1}" type="datetime1">
               <a:rPr lang="nl-BE" smtClean="0"/>
-              <a:t>9/11/2020</a:t>
+              <a:t>10/11/2020</a:t>
             </a:fld>
             <a:endParaRPr lang="nl-NL" dirty="0"/>
           </a:p>
@@ -3308,7 +3311,7 @@
           <a:p>
             <a:fld id="{0A297500-7527-634B-90F4-69D0994C32B4}" type="slidenum">
               <a:rPr lang="nl-NL" smtClean="0"/>
-              <a:t>‹nr.›</a:t>
+              <a:t>‹#›</a:t>
             </a:fld>
             <a:endParaRPr lang="nl-NL"/>
           </a:p>
@@ -3384,7 +3387,7 @@
           <a:p>
             <a:fld id="{D41C31F0-2B75-48AE-AEBC-9657DD1B0AB7}" type="datetime1">
               <a:rPr lang="nl-BE" smtClean="0"/>
-              <a:t>9/11/2020</a:t>
+              <a:t>10/11/2020</a:t>
             </a:fld>
             <a:endParaRPr lang="nl-NL"/>
           </a:p>
@@ -3429,7 +3432,7 @@
           <a:p>
             <a:fld id="{0A297500-7527-634B-90F4-69D0994C32B4}" type="slidenum">
               <a:rPr lang="nl-NL" smtClean="0"/>
-              <a:t>‹nr.›</a:t>
+              <a:t>‹#›</a:t>
             </a:fld>
             <a:endParaRPr lang="nl-NL"/>
           </a:p>
@@ -3505,7 +3508,7 @@
           <a:p>
             <a:fld id="{53F19495-32E9-486F-877E-DF8DCF8228E7}" type="datetime1">
               <a:rPr lang="nl-BE" smtClean="0"/>
-              <a:t>9/11/2020</a:t>
+              <a:t>10/11/2020</a:t>
             </a:fld>
             <a:endParaRPr lang="nl-NL"/>
           </a:p>
@@ -3550,7 +3553,7 @@
           <a:p>
             <a:fld id="{0A297500-7527-634B-90F4-69D0994C32B4}" type="slidenum">
               <a:rPr lang="nl-NL" smtClean="0"/>
-              <a:t>‹nr.›</a:t>
+              <a:t>‹#›</a:t>
             </a:fld>
             <a:endParaRPr lang="nl-NL"/>
           </a:p>
@@ -3687,7 +3690,7 @@
           <a:p>
             <a:fld id="{804A002D-00A0-4BF6-93D8-8D999BC8C748}" type="datetime1">
               <a:rPr lang="nl-BE" smtClean="0"/>
-              <a:t>9/11/2020</a:t>
+              <a:t>10/11/2020</a:t>
             </a:fld>
             <a:endParaRPr lang="nl-NL" dirty="0"/>
           </a:p>
@@ -3732,7 +3735,7 @@
           <a:p>
             <a:fld id="{0A297500-7527-634B-90F4-69D0994C32B4}" type="slidenum">
               <a:rPr lang="nl-NL" smtClean="0"/>
-              <a:t>‹nr.›</a:t>
+              <a:t>‹#›</a:t>
             </a:fld>
             <a:endParaRPr lang="nl-NL"/>
           </a:p>
@@ -3971,7 +3974,7 @@
           <a:p>
             <a:fld id="{75FF7ED8-F103-41E3-857E-CDC769C97DAE}" type="datetime1">
               <a:rPr lang="nl-BE" smtClean="0"/>
-              <a:t>9/11/2020</a:t>
+              <a:t>10/11/2020</a:t>
             </a:fld>
             <a:endParaRPr lang="nl-NL" dirty="0"/>
           </a:p>
@@ -4052,7 +4055,7 @@
             <a:fld id="{0A297500-7527-634B-90F4-69D0994C32B4}" type="slidenum">
               <a:rPr lang="nl-NL" smtClean="0"/>
               <a:pPr/>
-              <a:t>‹nr.›</a:t>
+              <a:t>‹#›</a:t>
             </a:fld>
             <a:endParaRPr lang="nl-NL" dirty="0"/>
           </a:p>
@@ -4612,7 +4615,7 @@
           <a:p>
             <a:fld id="{9F542F44-42ED-4221-90FD-ACE0C331DBA2}" type="datetime1">
               <a:rPr lang="nl-BE" smtClean="0"/>
-              <a:t>9/11/2020</a:t>
+              <a:t>10/11/2020</a:t>
             </a:fld>
             <a:endParaRPr lang="nl-NL" dirty="0"/>
           </a:p>
@@ -4693,7 +4696,7 @@
             <a:fld id="{0A297500-7527-634B-90F4-69D0994C32B4}" type="slidenum">
               <a:rPr lang="nl-NL" smtClean="0"/>
               <a:pPr/>
-              <a:t>‹nr.›</a:t>
+              <a:t>‹#›</a:t>
             </a:fld>
             <a:endParaRPr lang="nl-NL" dirty="0"/>
           </a:p>
@@ -5177,6 +5180,1201 @@
           <a:chExt cx="0" cy="0"/>
         </a:xfrm>
       </p:grpSpPr>
+      <p:pic>
+        <p:nvPicPr>
+          <p:cNvPr id="7" name="Tijdelijke aanduiding voor inhoud 6" descr="Afbeelding met object, klok&#10;&#10;Automatisch gegenereerde beschrijving">
+            <a:extLst>
+              <a:ext uri="{FF2B5EF4-FFF2-40B4-BE49-F238E27FC236}">
+                <a16:creationId xmlns:a16="http://schemas.microsoft.com/office/drawing/2014/main" id="{098C9996-9859-4907-8AB3-D6C9AAD11B3B}"/>
+              </a:ext>
+            </a:extLst>
+          </p:cNvPr>
+          <p:cNvPicPr>
+            <a:picLocks noGrp="1" noChangeAspect="1"/>
+          </p:cNvPicPr>
+          <p:nvPr>
+            <p:ph idx="1"/>
+          </p:nvPr>
+        </p:nvPicPr>
+        <p:blipFill>
+          <a:blip r:embed="rId2"/>
+          <a:stretch>
+            <a:fillRect/>
+          </a:stretch>
+        </p:blipFill>
+        <p:spPr>
+          <a:xfrm>
+            <a:off x="4387537" y="1359036"/>
+            <a:ext cx="4282811" cy="876376"/>
+          </a:xfrm>
+        </p:spPr>
+      </p:pic>
+      <p:sp>
+        <p:nvSpPr>
+          <p:cNvPr id="3" name="Footer Placeholder 2">
+            <a:extLst>
+              <a:ext uri="{FF2B5EF4-FFF2-40B4-BE49-F238E27FC236}">
+                <a16:creationId xmlns:a16="http://schemas.microsoft.com/office/drawing/2014/main" id="{AD4A58AD-6893-4457-9C08-36D3A74E64CF}"/>
+              </a:ext>
+            </a:extLst>
+          </p:cNvPr>
+          <p:cNvSpPr>
+            <a:spLocks noGrp="1"/>
+          </p:cNvSpPr>
+          <p:nvPr>
+            <p:ph type="ftr" sz="quarter" idx="11"/>
+          </p:nvPr>
+        </p:nvSpPr>
+        <p:spPr/>
+        <p:txBody>
+          <a:bodyPr/>
+          <a:lstStyle/>
+          <a:p>
+            <a:r>
+              <a:rPr lang="nl-NL"/>
+              <a:t>Faculteit wetenschappen</a:t>
+            </a:r>
+          </a:p>
+        </p:txBody>
+      </p:sp>
+      <p:sp>
+        <p:nvSpPr>
+          <p:cNvPr id="4" name="Slide Number Placeholder 3">
+            <a:extLst>
+              <a:ext uri="{FF2B5EF4-FFF2-40B4-BE49-F238E27FC236}">
+                <a16:creationId xmlns:a16="http://schemas.microsoft.com/office/drawing/2014/main" id="{DD83837B-2251-47C6-BE10-838E9BD61BB3}"/>
+              </a:ext>
+            </a:extLst>
+          </p:cNvPr>
+          <p:cNvSpPr>
+            <a:spLocks noGrp="1"/>
+          </p:cNvSpPr>
+          <p:nvPr>
+            <p:ph type="sldNum" sz="quarter" idx="12"/>
+          </p:nvPr>
+        </p:nvSpPr>
+        <p:spPr/>
+        <p:txBody>
+          <a:bodyPr/>
+          <a:lstStyle/>
+          <a:p>
+            <a:fld id="{0A297500-7527-634B-90F4-69D0994C32B4}" type="slidenum">
+              <a:rPr lang="nl-NL" smtClean="0"/>
+              <a:t>10</a:t>
+            </a:fld>
+            <a:endParaRPr lang="nl-NL"/>
+          </a:p>
+        </p:txBody>
+      </p:sp>
+      <p:sp>
+        <p:nvSpPr>
+          <p:cNvPr id="5" name="Title 4">
+            <a:extLst>
+              <a:ext uri="{FF2B5EF4-FFF2-40B4-BE49-F238E27FC236}">
+                <a16:creationId xmlns:a16="http://schemas.microsoft.com/office/drawing/2014/main" id="{B94175B6-911A-4751-85AD-91F81DF2E2A7}"/>
+              </a:ext>
+            </a:extLst>
+          </p:cNvPr>
+          <p:cNvSpPr>
+            <a:spLocks noGrp="1"/>
+          </p:cNvSpPr>
+          <p:nvPr>
+            <p:ph type="title"/>
+          </p:nvPr>
+        </p:nvSpPr>
+        <p:spPr/>
+        <p:txBody>
+          <a:bodyPr/>
+          <a:lstStyle/>
+          <a:p>
+            <a:r>
+              <a:rPr lang="en-US" dirty="0">
+                <a:latin typeface="Arial"/>
+                <a:cs typeface="Arial"/>
+              </a:rPr>
+              <a:t>Gradient descent</a:t>
+            </a:r>
+            <a:endParaRPr lang="en-US" dirty="0"/>
+          </a:p>
+        </p:txBody>
+      </p:sp>
+      <p:pic>
+        <p:nvPicPr>
+          <p:cNvPr id="9" name="Afbeelding 8" descr="Afbeelding met object, klok&#10;&#10;Automatisch gegenereerde beschrijving">
+            <a:extLst>
+              <a:ext uri="{FF2B5EF4-FFF2-40B4-BE49-F238E27FC236}">
+                <a16:creationId xmlns:a16="http://schemas.microsoft.com/office/drawing/2014/main" id="{2A20A3EC-82E5-4072-A66D-1906084E9BD8}"/>
+              </a:ext>
+            </a:extLst>
+          </p:cNvPr>
+          <p:cNvPicPr>
+            <a:picLocks noChangeAspect="1"/>
+          </p:cNvPicPr>
+          <p:nvPr/>
+        </p:nvPicPr>
+        <p:blipFill>
+          <a:blip r:embed="rId3"/>
+          <a:stretch>
+            <a:fillRect/>
+          </a:stretch>
+        </p:blipFill>
+        <p:spPr>
+          <a:xfrm>
+            <a:off x="4387537" y="4518507"/>
+            <a:ext cx="3543607" cy="533446"/>
+          </a:xfrm>
+          <a:prstGeom prst="rect">
+            <a:avLst/>
+          </a:prstGeom>
+        </p:spPr>
+      </p:pic>
+      <p:pic>
+        <p:nvPicPr>
+          <p:cNvPr id="11" name="Afbeelding 10" descr="Afbeelding met object, klok&#10;&#10;Automatisch gegenereerde beschrijving">
+            <a:extLst>
+              <a:ext uri="{FF2B5EF4-FFF2-40B4-BE49-F238E27FC236}">
+                <a16:creationId xmlns:a16="http://schemas.microsoft.com/office/drawing/2014/main" id="{35197AA6-FF6A-407F-A098-A08B1BFF58C1}"/>
+              </a:ext>
+            </a:extLst>
+          </p:cNvPr>
+          <p:cNvPicPr>
+            <a:picLocks noChangeAspect="1"/>
+          </p:cNvPicPr>
+          <p:nvPr/>
+        </p:nvPicPr>
+        <p:blipFill>
+          <a:blip r:embed="rId4"/>
+          <a:stretch>
+            <a:fillRect/>
+          </a:stretch>
+        </p:blipFill>
+        <p:spPr>
+          <a:xfrm>
+            <a:off x="4387537" y="5326727"/>
+            <a:ext cx="3292125" cy="838273"/>
+          </a:xfrm>
+          <a:prstGeom prst="rect">
+            <a:avLst/>
+          </a:prstGeom>
+        </p:spPr>
+      </p:pic>
+      <p:sp>
+        <p:nvSpPr>
+          <p:cNvPr id="16" name="Tijdelijke aanduiding voor inhoud 1">
+            <a:extLst>
+              <a:ext uri="{FF2B5EF4-FFF2-40B4-BE49-F238E27FC236}">
+                <a16:creationId xmlns:a16="http://schemas.microsoft.com/office/drawing/2014/main" id="{31B9B699-3D60-45C2-BCEB-88ED7797CECE}"/>
+              </a:ext>
+            </a:extLst>
+          </p:cNvPr>
+          <p:cNvSpPr txBox="1">
+            <a:spLocks/>
+          </p:cNvSpPr>
+          <p:nvPr/>
+        </p:nvSpPr>
+        <p:spPr>
+          <a:xfrm>
+            <a:off x="576000" y="1656000"/>
+            <a:ext cx="11041200" cy="4464000"/>
+          </a:xfrm>
+          <a:prstGeom prst="rect">
+            <a:avLst/>
+          </a:prstGeom>
+        </p:spPr>
+        <p:txBody>
+          <a:bodyPr vert="horz" lIns="91440" tIns="45720" rIns="91440" bIns="45720" rtlCol="0">
+            <a:normAutofit fontScale="92500" lnSpcReduction="10000"/>
+          </a:bodyPr>
+          <a:lstStyle>
+            <a:lvl1pPr marL="228600" indent="-228600" algn="l" defTabSz="914400" rtl="0" eaLnBrk="1" latinLnBrk="0" hangingPunct="1">
+              <a:lnSpc>
+                <a:spcPct val="100000"/>
+              </a:lnSpc>
+              <a:spcBef>
+                <a:spcPts val="1000"/>
+              </a:spcBef>
+              <a:buFont typeface="Arial"/>
+              <a:buChar char="•"/>
+              <a:defRPr sz="2400" kern="1200" baseline="0">
+                <a:solidFill>
+                  <a:schemeClr val="tx1"/>
+                </a:solidFill>
+                <a:latin typeface="Arial" charset="0"/>
+                <a:ea typeface="+mn-ea"/>
+                <a:cs typeface="+mn-cs"/>
+              </a:defRPr>
+            </a:lvl1pPr>
+            <a:lvl2pPr marL="685800" indent="-228600" algn="l" defTabSz="914400" rtl="0" eaLnBrk="1" latinLnBrk="0" hangingPunct="1">
+              <a:lnSpc>
+                <a:spcPct val="100000"/>
+              </a:lnSpc>
+              <a:spcBef>
+                <a:spcPts val="500"/>
+              </a:spcBef>
+              <a:buFont typeface="Arial"/>
+              <a:buChar char="•"/>
+              <a:defRPr sz="2400" kern="1200" baseline="0">
+                <a:solidFill>
+                  <a:schemeClr val="tx1"/>
+                </a:solidFill>
+                <a:latin typeface="Arial" charset="0"/>
+                <a:ea typeface="+mn-ea"/>
+                <a:cs typeface="+mn-cs"/>
+              </a:defRPr>
+            </a:lvl2pPr>
+            <a:lvl3pPr marL="1143000" indent="-228600" algn="l" defTabSz="914400" rtl="0" eaLnBrk="1" latinLnBrk="0" hangingPunct="1">
+              <a:lnSpc>
+                <a:spcPct val="100000"/>
+              </a:lnSpc>
+              <a:spcBef>
+                <a:spcPts val="500"/>
+              </a:spcBef>
+              <a:buFont typeface="Arial"/>
+              <a:buChar char="•"/>
+              <a:defRPr sz="2000" kern="1200" baseline="0">
+                <a:solidFill>
+                  <a:schemeClr val="tx1"/>
+                </a:solidFill>
+                <a:latin typeface="Arial" charset="0"/>
+                <a:ea typeface="+mn-ea"/>
+                <a:cs typeface="+mn-cs"/>
+              </a:defRPr>
+            </a:lvl3pPr>
+            <a:lvl4pPr marL="1600200" indent="-228600" algn="l" defTabSz="914400" rtl="0" eaLnBrk="1" latinLnBrk="0" hangingPunct="1">
+              <a:lnSpc>
+                <a:spcPct val="100000"/>
+              </a:lnSpc>
+              <a:spcBef>
+                <a:spcPts val="500"/>
+              </a:spcBef>
+              <a:buFont typeface="Arial"/>
+              <a:buChar char="•"/>
+              <a:defRPr sz="1800" kern="1200" baseline="0">
+                <a:solidFill>
+                  <a:schemeClr val="tx1"/>
+                </a:solidFill>
+                <a:latin typeface="Arial" charset="0"/>
+                <a:ea typeface="+mn-ea"/>
+                <a:cs typeface="+mn-cs"/>
+              </a:defRPr>
+            </a:lvl4pPr>
+            <a:lvl5pPr marL="2057400" indent="-228600" algn="l" defTabSz="914400" rtl="0" eaLnBrk="1" latinLnBrk="0" hangingPunct="1">
+              <a:lnSpc>
+                <a:spcPct val="100000"/>
+              </a:lnSpc>
+              <a:spcBef>
+                <a:spcPts val="500"/>
+              </a:spcBef>
+              <a:buFont typeface="Arial"/>
+              <a:buChar char="•"/>
+              <a:defRPr sz="1800" kern="1200" baseline="0">
+                <a:solidFill>
+                  <a:schemeClr val="tx1"/>
+                </a:solidFill>
+                <a:latin typeface="Arial" charset="0"/>
+                <a:ea typeface="+mn-ea"/>
+                <a:cs typeface="+mn-cs"/>
+              </a:defRPr>
+            </a:lvl5pPr>
+            <a:lvl6pPr marL="2514600" indent="-228600" algn="l" defTabSz="914400" rtl="0" eaLnBrk="1" latinLnBrk="0" hangingPunct="1">
+              <a:lnSpc>
+                <a:spcPct val="90000"/>
+              </a:lnSpc>
+              <a:spcBef>
+                <a:spcPts val="500"/>
+              </a:spcBef>
+              <a:buFont typeface="Arial"/>
+              <a:buChar char="•"/>
+              <a:defRPr sz="1800" kern="1200">
+                <a:solidFill>
+                  <a:schemeClr val="tx1"/>
+                </a:solidFill>
+                <a:latin typeface="+mn-lt"/>
+                <a:ea typeface="+mn-ea"/>
+                <a:cs typeface="+mn-cs"/>
+              </a:defRPr>
+            </a:lvl6pPr>
+            <a:lvl7pPr marL="2971800" indent="-228600" algn="l" defTabSz="914400" rtl="0" eaLnBrk="1" latinLnBrk="0" hangingPunct="1">
+              <a:lnSpc>
+                <a:spcPct val="90000"/>
+              </a:lnSpc>
+              <a:spcBef>
+                <a:spcPts val="500"/>
+              </a:spcBef>
+              <a:buFont typeface="Arial"/>
+              <a:buChar char="•"/>
+              <a:defRPr sz="1800" kern="1200">
+                <a:solidFill>
+                  <a:schemeClr val="tx1"/>
+                </a:solidFill>
+                <a:latin typeface="+mn-lt"/>
+                <a:ea typeface="+mn-ea"/>
+                <a:cs typeface="+mn-cs"/>
+              </a:defRPr>
+            </a:lvl7pPr>
+            <a:lvl8pPr marL="3429000" indent="-228600" algn="l" defTabSz="914400" rtl="0" eaLnBrk="1" latinLnBrk="0" hangingPunct="1">
+              <a:lnSpc>
+                <a:spcPct val="90000"/>
+              </a:lnSpc>
+              <a:spcBef>
+                <a:spcPts val="500"/>
+              </a:spcBef>
+              <a:buFont typeface="Arial"/>
+              <a:buChar char="•"/>
+              <a:defRPr sz="1800" kern="1200">
+                <a:solidFill>
+                  <a:schemeClr val="tx1"/>
+                </a:solidFill>
+                <a:latin typeface="+mn-lt"/>
+                <a:ea typeface="+mn-ea"/>
+                <a:cs typeface="+mn-cs"/>
+              </a:defRPr>
+            </a:lvl8pPr>
+            <a:lvl9pPr marL="3886200" indent="-228600" algn="l" defTabSz="914400" rtl="0" eaLnBrk="1" latinLnBrk="0" hangingPunct="1">
+              <a:lnSpc>
+                <a:spcPct val="90000"/>
+              </a:lnSpc>
+              <a:spcBef>
+                <a:spcPts val="500"/>
+              </a:spcBef>
+              <a:buFont typeface="Arial"/>
+              <a:buChar char="•"/>
+              <a:defRPr sz="1800" kern="1200">
+                <a:solidFill>
+                  <a:schemeClr val="tx1"/>
+                </a:solidFill>
+                <a:latin typeface="+mn-lt"/>
+                <a:ea typeface="+mn-ea"/>
+                <a:cs typeface="+mn-cs"/>
+              </a:defRPr>
+            </a:lvl9pPr>
+          </a:lstStyle>
+          <a:p>
+            <a:r>
+              <a:rPr lang="nl-BE" dirty="0"/>
+              <a:t>Mogelijke kostfunctie:</a:t>
+            </a:r>
+          </a:p>
+          <a:p>
+            <a:endParaRPr lang="nl-BE" dirty="0"/>
+          </a:p>
+          <a:p>
+            <a:r>
+              <a:rPr lang="nl-BE" dirty="0"/>
+              <a:t>Datapunten: x</a:t>
+            </a:r>
+            <a:r>
+              <a:rPr lang="nl-BE" baseline="30000" dirty="0"/>
+              <a:t>{i}</a:t>
+            </a:r>
+          </a:p>
+          <a:p>
+            <a:r>
+              <a:rPr lang="nl-BE" dirty="0"/>
+              <a:t>Correct resultaat: y(x</a:t>
+            </a:r>
+            <a:r>
+              <a:rPr lang="nl-BE" baseline="30000" dirty="0"/>
+              <a:t>{i}</a:t>
+            </a:r>
+            <a:r>
+              <a:rPr lang="nl-BE" dirty="0"/>
+              <a:t>)</a:t>
+            </a:r>
+          </a:p>
+          <a:p>
+            <a:r>
+              <a:rPr lang="nl-BE" dirty="0"/>
+              <a:t>Resultaat model: a</a:t>
+            </a:r>
+            <a:r>
+              <a:rPr lang="nl-BE" baseline="30000" dirty="0"/>
+              <a:t>[L]</a:t>
+            </a:r>
+            <a:r>
+              <a:rPr lang="nl-BE" dirty="0"/>
+              <a:t>(x</a:t>
+            </a:r>
+            <a:r>
+              <a:rPr lang="nl-BE" baseline="30000" dirty="0"/>
+              <a:t>{i}</a:t>
+            </a:r>
+            <a:r>
+              <a:rPr lang="nl-BE" dirty="0"/>
+              <a:t>)</a:t>
+            </a:r>
+          </a:p>
+          <a:p>
+            <a:endParaRPr lang="nl-BE" dirty="0"/>
+          </a:p>
+          <a:p>
+            <a:endParaRPr lang="nl-BE" dirty="0"/>
+          </a:p>
+          <a:p>
+            <a:r>
+              <a:rPr lang="nl-BE" dirty="0"/>
+              <a:t>Deel-functies: </a:t>
+            </a:r>
+          </a:p>
+          <a:p>
+            <a:endParaRPr lang="nl-BE" dirty="0"/>
+          </a:p>
+          <a:p>
+            <a:r>
+              <a:rPr lang="nl-BE" dirty="0"/>
+              <a:t>Berekening gradiënt:</a:t>
+            </a:r>
+          </a:p>
+          <a:p>
+            <a:endParaRPr lang="nl-BE" dirty="0"/>
+          </a:p>
+        </p:txBody>
+      </p:sp>
+    </p:spTree>
+    <p:extLst>
+      <p:ext uri="{BB962C8B-B14F-4D97-AF65-F5344CB8AC3E}">
+        <p14:creationId xmlns:p14="http://schemas.microsoft.com/office/powerpoint/2010/main" val="2014040813"/>
+      </p:ext>
+    </p:extLst>
+  </p:cSld>
+  <p:clrMapOvr>
+    <a:masterClrMapping/>
+  </p:clrMapOvr>
+</p:sld>
+</file>
+
+<file path=ppt/slides/slide11.xml><?xml version="1.0" encoding="utf-8"?>
+<p:sld xmlns:a="http://schemas.openxmlformats.org/drawingml/2006/main" xmlns:r="http://schemas.openxmlformats.org/officeDocument/2006/relationships" xmlns:p="http://schemas.openxmlformats.org/presentationml/2006/main">
+  <p:cSld>
+    <p:spTree>
+      <p:nvGrpSpPr>
+        <p:cNvPr id="1" name=""/>
+        <p:cNvGrpSpPr/>
+        <p:nvPr/>
+      </p:nvGrpSpPr>
+      <p:grpSpPr>
+        <a:xfrm>
+          <a:off x="0" y="0"/>
+          <a:ext cx="0" cy="0"/>
+          <a:chOff x="0" y="0"/>
+          <a:chExt cx="0" cy="0"/>
+        </a:xfrm>
+      </p:grpSpPr>
+      <mc:AlternateContent xmlns:mc="http://schemas.openxmlformats.org/markup-compatibility/2006">
+        <mc:Choice xmlns:a14="http://schemas.microsoft.com/office/drawing/2010/main" Requires="a14">
+          <p:sp>
+            <p:nvSpPr>
+              <p:cNvPr id="2" name="Tijdelijke aanduiding voor inhoud 1">
+                <a:extLst>
+                  <a:ext uri="{FF2B5EF4-FFF2-40B4-BE49-F238E27FC236}">
+                    <a16:creationId xmlns:a16="http://schemas.microsoft.com/office/drawing/2014/main" id="{FDB9BA6B-C0B2-4928-93B9-B7D845242D12}"/>
+                  </a:ext>
+                </a:extLst>
+              </p:cNvPr>
+              <p:cNvSpPr>
+                <a:spLocks noGrp="1"/>
+              </p:cNvSpPr>
+              <p:nvPr>
+                <p:ph idx="1"/>
+              </p:nvPr>
+            </p:nvSpPr>
+            <p:spPr/>
+            <p:txBody>
+              <a:bodyPr/>
+              <a:lstStyle/>
+              <a:p>
+                <a:r>
+                  <a:rPr lang="nl-BE" dirty="0"/>
+                  <a:t>Groot Netwerk </a:t>
+                </a:r>
+                <a14:m>
+                  <m:oMath xmlns:m="http://schemas.openxmlformats.org/officeDocument/2006/math">
+                    <m:r>
+                      <a:rPr lang="nl-BE" i="1">
+                        <a:latin typeface="Cambria Math" panose="02040503050406030204" pitchFamily="18" charset="0"/>
+                      </a:rPr>
+                      <m:t>→ </m:t>
+                    </m:r>
+                  </m:oMath>
+                </a14:m>
+                <a:r>
+                  <a:rPr lang="nl-BE" dirty="0"/>
+                  <a:t>Veel parameters </a:t>
+                </a:r>
+                <a14:m>
+                  <m:oMath xmlns:m="http://schemas.openxmlformats.org/officeDocument/2006/math">
+                    <m:r>
+                      <a:rPr lang="nl-BE" i="1">
+                        <a:latin typeface="Cambria Math" panose="02040503050406030204" pitchFamily="18" charset="0"/>
+                      </a:rPr>
+                      <m:t>→ </m:t>
+                    </m:r>
+                    <m:r>
+                      <m:rPr>
+                        <m:sty m:val="p"/>
+                      </m:rPr>
+                      <a:rPr lang="nl-BE" sz="2400" b="0" i="1" smtClean="0">
+                        <a:latin typeface="Cambria Math" panose="02040503050406030204" pitchFamily="18" charset="0"/>
+                        <a:ea typeface="Cambria Math" panose="02040503050406030204" pitchFamily="18" charset="0"/>
+                      </a:rPr>
+                      <m:t>∇</m:t>
+                    </m:r>
+                    <m:r>
+                      <a:rPr lang="nl-BE" sz="2400" b="0" i="1" smtClean="0">
+                        <a:latin typeface="Cambria Math" panose="02040503050406030204" pitchFamily="18" charset="0"/>
+                        <a:ea typeface="Cambria Math" panose="02040503050406030204" pitchFamily="18" charset="0"/>
+                      </a:rPr>
+                      <m:t>𝐶𝑜𝑠𝑡</m:t>
+                    </m:r>
+                    <m:r>
+                      <a:rPr lang="nl-BE" sz="2400" b="0" i="1" smtClean="0">
+                        <a:latin typeface="Cambria Math" panose="02040503050406030204" pitchFamily="18" charset="0"/>
+                        <a:ea typeface="Cambria Math" panose="02040503050406030204" pitchFamily="18" charset="0"/>
+                      </a:rPr>
+                      <m:t>(</m:t>
+                    </m:r>
+                    <m:r>
+                      <a:rPr lang="nl-BE" sz="2400" b="0" i="1" smtClean="0">
+                        <a:latin typeface="Cambria Math" panose="02040503050406030204" pitchFamily="18" charset="0"/>
+                        <a:ea typeface="Cambria Math" panose="02040503050406030204" pitchFamily="18" charset="0"/>
+                      </a:rPr>
+                      <m:t>𝑝</m:t>
+                    </m:r>
+                    <m:r>
+                      <a:rPr lang="nl-BE" sz="2400" b="0" i="1" smtClean="0">
+                        <a:latin typeface="Cambria Math" panose="02040503050406030204" pitchFamily="18" charset="0"/>
+                        <a:ea typeface="Cambria Math" panose="02040503050406030204" pitchFamily="18" charset="0"/>
+                      </a:rPr>
+                      <m:t>)</m:t>
+                    </m:r>
+                  </m:oMath>
+                </a14:m>
+                <a:r>
+                  <a:rPr lang="nl-BE" sz="2400" dirty="0"/>
+                  <a:t> grote dimensie</a:t>
+                </a:r>
+              </a:p>
+              <a:p>
+                <a:pPr marL="0" indent="0">
+                  <a:buNone/>
+                </a:pPr>
+                <a:r>
+                  <a:rPr lang="nl-BE" sz="2400" b="0" dirty="0"/>
+                  <a:t>                           </a:t>
+                </a:r>
+                <a14:m>
+                  <m:oMath xmlns:m="http://schemas.openxmlformats.org/officeDocument/2006/math">
+                    <m:r>
+                      <a:rPr lang="nl-BE" sz="2400" b="0" i="1" smtClean="0">
+                        <a:latin typeface="Cambria Math" panose="02040503050406030204" pitchFamily="18" charset="0"/>
+                      </a:rPr>
+                      <m:t>→ </m:t>
+                    </m:r>
+                  </m:oMath>
+                </a14:m>
+                <a:r>
+                  <a:rPr lang="nl-BE" dirty="0"/>
+                  <a:t>Veel datapunten </a:t>
+                </a:r>
+                <a14:m>
+                  <m:oMath xmlns:m="http://schemas.openxmlformats.org/officeDocument/2006/math">
+                    <m:r>
+                      <a:rPr lang="nl-BE" i="1">
+                        <a:latin typeface="Cambria Math" panose="02040503050406030204" pitchFamily="18" charset="0"/>
+                      </a:rPr>
+                      <m:t>→</m:t>
+                    </m:r>
+                    <m:r>
+                      <m:rPr>
+                        <m:sty m:val="p"/>
+                      </m:rPr>
+                      <a:rPr lang="en-GB" b="0" i="0" smtClean="0">
+                        <a:latin typeface="Cambria Math" panose="02040503050406030204" pitchFamily="18" charset="0"/>
+                      </a:rPr>
+                      <m:t>N</m:t>
+                    </m:r>
+                    <m:r>
+                      <a:rPr lang="en-GB" b="0" i="0" smtClean="0">
+                        <a:latin typeface="Cambria Math" panose="02040503050406030204" pitchFamily="18" charset="0"/>
+                      </a:rPr>
+                      <m:t> </m:t>
+                    </m:r>
+                    <m:r>
+                      <m:rPr>
+                        <m:sty m:val="p"/>
+                      </m:rPr>
+                      <a:rPr lang="en-GB" b="0" i="0" smtClean="0">
+                        <a:latin typeface="+mn-lt"/>
+                      </a:rPr>
+                      <m:t>groot</m:t>
+                    </m:r>
+                  </m:oMath>
+                </a14:m>
+                <a:endParaRPr lang="nl-BE" dirty="0">
+                  <a:latin typeface="+mn-lt"/>
+                </a:endParaRPr>
+              </a:p>
+              <a:p>
+                <a:pPr marL="0" indent="0">
+                  <a:buNone/>
+                </a:pPr>
+                <a:endParaRPr lang="nl-BE" dirty="0"/>
+              </a:p>
+              <a:p>
+                <a:pPr marL="0" indent="0">
+                  <a:buNone/>
+                </a:pPr>
+                <a:r>
+                  <a:rPr lang="nl-BE" dirty="0"/>
+                  <a:t>  </a:t>
+                </a:r>
+              </a:p>
+              <a:p>
+                <a:r>
+                  <a:rPr lang="nl-BE" dirty="0"/>
+                  <a:t>Oplossing?</a:t>
+                </a:r>
+              </a:p>
+            </p:txBody>
+          </p:sp>
+        </mc:Choice>
+        <mc:Fallback>
+          <p:sp>
+            <p:nvSpPr>
+              <p:cNvPr id="2" name="Tijdelijke aanduiding voor inhoud 1">
+                <a:extLst>
+                  <a:ext uri="{FF2B5EF4-FFF2-40B4-BE49-F238E27FC236}">
+                    <a16:creationId xmlns:a16="http://schemas.microsoft.com/office/drawing/2014/main" id="{FDB9BA6B-C0B2-4928-93B9-B7D845242D12}"/>
+                  </a:ext>
+                </a:extLst>
+              </p:cNvPr>
+              <p:cNvSpPr>
+                <a:spLocks noGrp="1" noRot="1" noChangeAspect="1" noMove="1" noResize="1" noEditPoints="1" noAdjustHandles="1" noChangeArrowheads="1" noChangeShapeType="1" noTextEdit="1"/>
+              </p:cNvSpPr>
+              <p:nvPr>
+                <p:ph idx="1"/>
+              </p:nvPr>
+            </p:nvSpPr>
+            <p:spPr>
+              <a:blipFill>
+                <a:blip r:embed="rId2"/>
+                <a:stretch>
+                  <a:fillRect l="-717" t="-956"/>
+                </a:stretch>
+              </a:blipFill>
+            </p:spPr>
+            <p:txBody>
+              <a:bodyPr/>
+              <a:lstStyle/>
+              <a:p>
+                <a:r>
+                  <a:rPr lang="en-GB">
+                    <a:noFill/>
+                  </a:rPr>
+                  <a:t> </a:t>
+                </a:r>
+              </a:p>
+            </p:txBody>
+          </p:sp>
+        </mc:Fallback>
+      </mc:AlternateContent>
+      <p:sp>
+        <p:nvSpPr>
+          <p:cNvPr id="3" name="Tijdelijke aanduiding voor voettekst 2">
+            <a:extLst>
+              <a:ext uri="{FF2B5EF4-FFF2-40B4-BE49-F238E27FC236}">
+                <a16:creationId xmlns:a16="http://schemas.microsoft.com/office/drawing/2014/main" id="{F4FE6DA4-8F7B-48E6-A543-4DE1B81EAC7A}"/>
+              </a:ext>
+            </a:extLst>
+          </p:cNvPr>
+          <p:cNvSpPr>
+            <a:spLocks noGrp="1"/>
+          </p:cNvSpPr>
+          <p:nvPr>
+            <p:ph type="ftr" sz="quarter" idx="11"/>
+          </p:nvPr>
+        </p:nvSpPr>
+        <p:spPr/>
+        <p:txBody>
+          <a:bodyPr/>
+          <a:lstStyle/>
+          <a:p>
+            <a:r>
+              <a:rPr lang="nl-NL"/>
+              <a:t>Faculteit wetenschappen</a:t>
+            </a:r>
+          </a:p>
+        </p:txBody>
+      </p:sp>
+      <p:sp>
+        <p:nvSpPr>
+          <p:cNvPr id="4" name="Tijdelijke aanduiding voor dianummer 3">
+            <a:extLst>
+              <a:ext uri="{FF2B5EF4-FFF2-40B4-BE49-F238E27FC236}">
+                <a16:creationId xmlns:a16="http://schemas.microsoft.com/office/drawing/2014/main" id="{52346FD5-4FAE-40BE-B96D-DA5F7B838F8B}"/>
+              </a:ext>
+            </a:extLst>
+          </p:cNvPr>
+          <p:cNvSpPr>
+            <a:spLocks noGrp="1"/>
+          </p:cNvSpPr>
+          <p:nvPr>
+            <p:ph type="sldNum" sz="quarter" idx="12"/>
+          </p:nvPr>
+        </p:nvSpPr>
+        <p:spPr/>
+        <p:txBody>
+          <a:bodyPr/>
+          <a:lstStyle/>
+          <a:p>
+            <a:fld id="{0A297500-7527-634B-90F4-69D0994C32B4}" type="slidenum">
+              <a:rPr lang="nl-NL" smtClean="0"/>
+              <a:t>11</a:t>
+            </a:fld>
+            <a:endParaRPr lang="nl-NL"/>
+          </a:p>
+        </p:txBody>
+      </p:sp>
+      <p:sp>
+        <p:nvSpPr>
+          <p:cNvPr id="5" name="Titel 4">
+            <a:extLst>
+              <a:ext uri="{FF2B5EF4-FFF2-40B4-BE49-F238E27FC236}">
+                <a16:creationId xmlns:a16="http://schemas.microsoft.com/office/drawing/2014/main" id="{2226A8D9-1F0C-461B-8683-0631BAE5856D}"/>
+              </a:ext>
+            </a:extLst>
+          </p:cNvPr>
+          <p:cNvSpPr>
+            <a:spLocks noGrp="1"/>
+          </p:cNvSpPr>
+          <p:nvPr>
+            <p:ph type="title"/>
+          </p:nvPr>
+        </p:nvSpPr>
+        <p:spPr/>
+        <p:txBody>
+          <a:bodyPr/>
+          <a:lstStyle/>
+          <a:p>
+            <a:r>
+              <a:rPr lang="nl-BE" dirty="0" err="1"/>
+              <a:t>Gradient</a:t>
+            </a:r>
+            <a:r>
+              <a:rPr lang="nl-BE" dirty="0"/>
+              <a:t> </a:t>
+            </a:r>
+            <a:r>
+              <a:rPr lang="nl-BE" dirty="0" err="1"/>
+              <a:t>descent</a:t>
+            </a:r>
+            <a:endParaRPr lang="nl-BE" dirty="0"/>
+          </a:p>
+        </p:txBody>
+      </p:sp>
+      <p:pic>
+        <p:nvPicPr>
+          <p:cNvPr id="7" name="Afbeelding 6" descr="Afbeelding met object, klok&#10;&#10;Automatisch gegenereerde beschrijving">
+            <a:extLst>
+              <a:ext uri="{FF2B5EF4-FFF2-40B4-BE49-F238E27FC236}">
+                <a16:creationId xmlns:a16="http://schemas.microsoft.com/office/drawing/2014/main" id="{FF13E501-C5E3-4FD7-8D51-A9E8829362CF}"/>
+              </a:ext>
+            </a:extLst>
+          </p:cNvPr>
+          <p:cNvPicPr>
+            <a:picLocks noChangeAspect="1"/>
+          </p:cNvPicPr>
+          <p:nvPr/>
+        </p:nvPicPr>
+        <p:blipFill>
+          <a:blip r:embed="rId3"/>
+          <a:stretch>
+            <a:fillRect/>
+          </a:stretch>
+        </p:blipFill>
+        <p:spPr>
+          <a:xfrm>
+            <a:off x="900000" y="3703899"/>
+            <a:ext cx="4464638" cy="1136830"/>
+          </a:xfrm>
+          <a:prstGeom prst="rect">
+            <a:avLst/>
+          </a:prstGeom>
+        </p:spPr>
+      </p:pic>
+      <p:cxnSp>
+        <p:nvCxnSpPr>
+          <p:cNvPr id="9" name="Rechte verbindingslijn met pijl 8">
+            <a:extLst>
+              <a:ext uri="{FF2B5EF4-FFF2-40B4-BE49-F238E27FC236}">
+                <a16:creationId xmlns:a16="http://schemas.microsoft.com/office/drawing/2014/main" id="{54F13279-6BE0-4BB5-9263-FB56909DC4B5}"/>
+              </a:ext>
+            </a:extLst>
+          </p:cNvPr>
+          <p:cNvCxnSpPr/>
+          <p:nvPr/>
+        </p:nvCxnSpPr>
+        <p:spPr>
+          <a:xfrm>
+            <a:off x="5671595" y="4237931"/>
+            <a:ext cx="2280213" cy="0"/>
+          </a:xfrm>
+          <a:prstGeom prst="straightConnector1">
+            <a:avLst/>
+          </a:prstGeom>
+          <a:ln>
+            <a:tailEnd type="triangle"/>
+          </a:ln>
+        </p:spPr>
+        <p:style>
+          <a:lnRef idx="3">
+            <a:schemeClr val="accent2"/>
+          </a:lnRef>
+          <a:fillRef idx="0">
+            <a:schemeClr val="accent2"/>
+          </a:fillRef>
+          <a:effectRef idx="2">
+            <a:schemeClr val="accent2"/>
+          </a:effectRef>
+          <a:fontRef idx="minor">
+            <a:schemeClr val="tx1"/>
+          </a:fontRef>
+        </p:style>
+      </p:cxnSp>
+      <p:pic>
+        <p:nvPicPr>
+          <p:cNvPr id="1026" name="Picture 2" descr="Computer Fire Isolated. Burning Computer. Data Processor Vector Stock  Vector - Illustration of flame, fire: 143629275">
+            <a:extLst>
+              <a:ext uri="{FF2B5EF4-FFF2-40B4-BE49-F238E27FC236}">
+                <a16:creationId xmlns:a16="http://schemas.microsoft.com/office/drawing/2014/main" id="{D887E6EC-1C19-442A-906B-C69D0C29C224}"/>
+              </a:ext>
+            </a:extLst>
+          </p:cNvPr>
+          <p:cNvPicPr>
+            <a:picLocks noChangeAspect="1" noChangeArrowheads="1"/>
+          </p:cNvPicPr>
+          <p:nvPr/>
+        </p:nvPicPr>
+        <p:blipFill>
+          <a:blip r:embed="rId4">
+            <a:extLst>
+              <a:ext uri="{28A0092B-C50C-407E-A947-70E740481C1C}">
+                <a14:useLocalDpi xmlns:a14="http://schemas.microsoft.com/office/drawing/2010/main" val="0"/>
+              </a:ext>
+            </a:extLst>
+          </a:blip>
+          <a:srcRect/>
+          <a:stretch>
+            <a:fillRect/>
+          </a:stretch>
+        </p:blipFill>
+        <p:spPr bwMode="auto">
+          <a:xfrm>
+            <a:off x="8070004" y="2323628"/>
+            <a:ext cx="3429000" cy="3429000"/>
+          </a:xfrm>
+          <a:prstGeom prst="rect">
+            <a:avLst/>
+          </a:prstGeom>
+          <a:noFill/>
+          <a:extLst>
+            <a:ext uri="{909E8E84-426E-40DD-AFC4-6F175D3DCCD1}">
+              <a14:hiddenFill xmlns:a14="http://schemas.microsoft.com/office/drawing/2010/main">
+                <a:solidFill>
+                  <a:srgbClr val="FFFFFF"/>
+                </a:solidFill>
+              </a14:hiddenFill>
+            </a:ext>
+          </a:extLst>
+        </p:spPr>
+      </p:pic>
+    </p:spTree>
+    <p:extLst>
+      <p:ext uri="{BB962C8B-B14F-4D97-AF65-F5344CB8AC3E}">
+        <p14:creationId xmlns:p14="http://schemas.microsoft.com/office/powerpoint/2010/main" val="649465542"/>
+      </p:ext>
+    </p:extLst>
+  </p:cSld>
+  <p:clrMapOvr>
+    <a:masterClrMapping/>
+  </p:clrMapOvr>
+</p:sld>
+</file>
+
+<file path=ppt/slides/slide12.xml><?xml version="1.0" encoding="utf-8"?>
+<p:sld xmlns:a="http://schemas.openxmlformats.org/drawingml/2006/main" xmlns:r="http://schemas.openxmlformats.org/officeDocument/2006/relationships" xmlns:p="http://schemas.openxmlformats.org/presentationml/2006/main">
+  <p:cSld>
+    <p:spTree>
+      <p:nvGrpSpPr>
+        <p:cNvPr id="1" name=""/>
+        <p:cNvGrpSpPr/>
+        <p:nvPr/>
+      </p:nvGrpSpPr>
+      <p:grpSpPr>
+        <a:xfrm>
+          <a:off x="0" y="0"/>
+          <a:ext cx="0" cy="0"/>
+          <a:chOff x="0" y="0"/>
+          <a:chExt cx="0" cy="0"/>
+        </a:xfrm>
+      </p:grpSpPr>
+      <p:sp>
+        <p:nvSpPr>
+          <p:cNvPr id="2" name="Tijdelijke aanduiding voor inhoud 1">
+            <a:extLst>
+              <a:ext uri="{FF2B5EF4-FFF2-40B4-BE49-F238E27FC236}">
+                <a16:creationId xmlns:a16="http://schemas.microsoft.com/office/drawing/2014/main" id="{C79333D8-4E56-48D2-8BC5-D836CD92E7F5}"/>
+              </a:ext>
+            </a:extLst>
+          </p:cNvPr>
+          <p:cNvSpPr>
+            <a:spLocks noGrp="1"/>
+          </p:cNvSpPr>
+          <p:nvPr>
+            <p:ph idx="1"/>
+          </p:nvPr>
+        </p:nvSpPr>
+        <p:spPr/>
+        <p:txBody>
+          <a:bodyPr/>
+          <a:lstStyle/>
+          <a:p>
+            <a:r>
+              <a:rPr lang="nl-BE" dirty="0"/>
+              <a:t>Telkens 1 punt nemen:</a:t>
+            </a:r>
+          </a:p>
+          <a:p>
+            <a:pPr marL="0" indent="0">
+              <a:buNone/>
+            </a:pPr>
+            <a:endParaRPr lang="nl-BE" dirty="0"/>
+          </a:p>
+          <a:p>
+            <a:pPr marL="0" indent="0">
+              <a:buNone/>
+            </a:pPr>
+            <a:endParaRPr lang="nl-BE" dirty="0"/>
+          </a:p>
+          <a:p>
+            <a:r>
+              <a:rPr lang="nl-BE" dirty="0"/>
+              <a:t>Telkens m &lt;&lt; N punten nemen:</a:t>
+            </a:r>
+          </a:p>
+          <a:p>
+            <a:pPr lvl="1"/>
+            <a:r>
+              <a:rPr lang="nl-BE" dirty="0"/>
+              <a:t>Minibatch</a:t>
+            </a:r>
+          </a:p>
+          <a:p>
+            <a:endParaRPr lang="nl-BE" dirty="0"/>
+          </a:p>
+          <a:p>
+            <a:endParaRPr lang="nl-BE" dirty="0"/>
+          </a:p>
+          <a:p>
+            <a:r>
+              <a:rPr lang="nl-BE" dirty="0"/>
+              <a:t>Met/zonder vervanging</a:t>
+            </a:r>
+          </a:p>
+        </p:txBody>
+      </p:sp>
+      <p:sp>
+        <p:nvSpPr>
+          <p:cNvPr id="3" name="Tijdelijke aanduiding voor voettekst 2">
+            <a:extLst>
+              <a:ext uri="{FF2B5EF4-FFF2-40B4-BE49-F238E27FC236}">
+                <a16:creationId xmlns:a16="http://schemas.microsoft.com/office/drawing/2014/main" id="{70CB2AD9-04AF-4EA4-BA1E-3377F6E0748D}"/>
+              </a:ext>
+            </a:extLst>
+          </p:cNvPr>
+          <p:cNvSpPr>
+            <a:spLocks noGrp="1"/>
+          </p:cNvSpPr>
+          <p:nvPr>
+            <p:ph type="ftr" sz="quarter" idx="11"/>
+          </p:nvPr>
+        </p:nvSpPr>
+        <p:spPr/>
+        <p:txBody>
+          <a:bodyPr/>
+          <a:lstStyle/>
+          <a:p>
+            <a:r>
+              <a:rPr lang="nl-NL"/>
+              <a:t>Faculteit wetenschappen</a:t>
+            </a:r>
+          </a:p>
+        </p:txBody>
+      </p:sp>
+      <p:sp>
+        <p:nvSpPr>
+          <p:cNvPr id="4" name="Tijdelijke aanduiding voor dianummer 3">
+            <a:extLst>
+              <a:ext uri="{FF2B5EF4-FFF2-40B4-BE49-F238E27FC236}">
+                <a16:creationId xmlns:a16="http://schemas.microsoft.com/office/drawing/2014/main" id="{86C94A12-C2C6-4355-AAC4-5D2C3F4A327F}"/>
+              </a:ext>
+            </a:extLst>
+          </p:cNvPr>
+          <p:cNvSpPr>
+            <a:spLocks noGrp="1"/>
+          </p:cNvSpPr>
+          <p:nvPr>
+            <p:ph type="sldNum" sz="quarter" idx="12"/>
+          </p:nvPr>
+        </p:nvSpPr>
+        <p:spPr/>
+        <p:txBody>
+          <a:bodyPr/>
+          <a:lstStyle/>
+          <a:p>
+            <a:fld id="{0A297500-7527-634B-90F4-69D0994C32B4}" type="slidenum">
+              <a:rPr lang="nl-NL" smtClean="0"/>
+              <a:t>12</a:t>
+            </a:fld>
+            <a:endParaRPr lang="nl-NL"/>
+          </a:p>
+        </p:txBody>
+      </p:sp>
+      <p:sp>
+        <p:nvSpPr>
+          <p:cNvPr id="5" name="Titel 4">
+            <a:extLst>
+              <a:ext uri="{FF2B5EF4-FFF2-40B4-BE49-F238E27FC236}">
+                <a16:creationId xmlns:a16="http://schemas.microsoft.com/office/drawing/2014/main" id="{8A8BAFB1-02E4-4847-A573-784E02115F7B}"/>
+              </a:ext>
+            </a:extLst>
+          </p:cNvPr>
+          <p:cNvSpPr>
+            <a:spLocks noGrp="1"/>
+          </p:cNvSpPr>
+          <p:nvPr>
+            <p:ph type="title"/>
+          </p:nvPr>
+        </p:nvSpPr>
+        <p:spPr/>
+        <p:txBody>
+          <a:bodyPr/>
+          <a:lstStyle/>
+          <a:p>
+            <a:r>
+              <a:rPr lang="nl-BE" dirty="0" err="1"/>
+              <a:t>Stochastic</a:t>
+            </a:r>
+            <a:r>
+              <a:rPr lang="nl-BE" dirty="0"/>
+              <a:t> </a:t>
+            </a:r>
+            <a:r>
+              <a:rPr lang="nl-BE" dirty="0" err="1"/>
+              <a:t>gradient</a:t>
+            </a:r>
+            <a:r>
+              <a:rPr lang="nl-BE" dirty="0"/>
+              <a:t> </a:t>
+            </a:r>
+            <a:r>
+              <a:rPr lang="nl-BE" dirty="0" err="1"/>
+              <a:t>descent</a:t>
+            </a:r>
+            <a:endParaRPr lang="nl-BE" dirty="0"/>
+          </a:p>
+        </p:txBody>
+      </p:sp>
+      <p:pic>
+        <p:nvPicPr>
+          <p:cNvPr id="7" name="Afbeelding 6" descr="Afbeelding met object, klok&#10;&#10;Automatisch gegenereerde beschrijving">
+            <a:extLst>
+              <a:ext uri="{FF2B5EF4-FFF2-40B4-BE49-F238E27FC236}">
+                <a16:creationId xmlns:a16="http://schemas.microsoft.com/office/drawing/2014/main" id="{1499888D-4D2D-48AA-822E-E73E59823143}"/>
+              </a:ext>
+            </a:extLst>
+          </p:cNvPr>
+          <p:cNvPicPr>
+            <a:picLocks noChangeAspect="1"/>
+          </p:cNvPicPr>
+          <p:nvPr/>
+        </p:nvPicPr>
+        <p:blipFill>
+          <a:blip r:embed="rId2"/>
+          <a:stretch>
+            <a:fillRect/>
+          </a:stretch>
+        </p:blipFill>
+        <p:spPr>
+          <a:xfrm>
+            <a:off x="6598362" y="1505304"/>
+            <a:ext cx="2827265" cy="640135"/>
+          </a:xfrm>
+          <a:prstGeom prst="rect">
+            <a:avLst/>
+          </a:prstGeom>
+        </p:spPr>
+      </p:pic>
+      <p:pic>
+        <p:nvPicPr>
+          <p:cNvPr id="9" name="Afbeelding 8" descr="Afbeelding met object, klok&#10;&#10;Automatisch gegenereerde beschrijving">
+            <a:extLst>
+              <a:ext uri="{FF2B5EF4-FFF2-40B4-BE49-F238E27FC236}">
+                <a16:creationId xmlns:a16="http://schemas.microsoft.com/office/drawing/2014/main" id="{7A770CCF-297A-49CB-A7AB-C9200BD735D8}"/>
+              </a:ext>
+            </a:extLst>
+          </p:cNvPr>
+          <p:cNvPicPr>
+            <a:picLocks noChangeAspect="1"/>
+          </p:cNvPicPr>
+          <p:nvPr/>
+        </p:nvPicPr>
+        <p:blipFill>
+          <a:blip r:embed="rId3"/>
+          <a:stretch>
+            <a:fillRect/>
+          </a:stretch>
+        </p:blipFill>
+        <p:spPr>
+          <a:xfrm>
+            <a:off x="6598362" y="2813005"/>
+            <a:ext cx="3863675" cy="1005927"/>
+          </a:xfrm>
+          <a:prstGeom prst="rect">
+            <a:avLst/>
+          </a:prstGeom>
+        </p:spPr>
+      </p:pic>
+    </p:spTree>
+    <p:extLst>
+      <p:ext uri="{BB962C8B-B14F-4D97-AF65-F5344CB8AC3E}">
+        <p14:creationId xmlns:p14="http://schemas.microsoft.com/office/powerpoint/2010/main" val="1225278259"/>
+      </p:ext>
+    </p:extLst>
+  </p:cSld>
+  <p:clrMapOvr>
+    <a:masterClrMapping/>
+  </p:clrMapOvr>
+</p:sld>
+</file>
+
+<file path=ppt/slides/slide13.xml><?xml version="1.0" encoding="utf-8"?>
+<p:sld xmlns:a="http://schemas.openxmlformats.org/drawingml/2006/main" xmlns:r="http://schemas.openxmlformats.org/officeDocument/2006/relationships" xmlns:p="http://schemas.openxmlformats.org/presentationml/2006/main">
+  <p:cSld>
+    <p:spTree>
+      <p:nvGrpSpPr>
+        <p:cNvPr id="1" name=""/>
+        <p:cNvGrpSpPr/>
+        <p:nvPr/>
+      </p:nvGrpSpPr>
+      <p:grpSpPr>
+        <a:xfrm>
+          <a:off x="0" y="0"/>
+          <a:ext cx="0" cy="0"/>
+          <a:chOff x="0" y="0"/>
+          <a:chExt cx="0" cy="0"/>
+        </a:xfrm>
+      </p:grpSpPr>
       <p:sp>
         <p:nvSpPr>
           <p:cNvPr id="18" name="Rechthoek 8">
@@ -5416,7 +6614,7 @@
           <a:p>
             <a:fld id="{0A297500-7527-634B-90F4-69D0994C32B4}" type="slidenum">
               <a:rPr lang="nl-NL" smtClean="0"/>
-              <a:t>10</a:t>
+              <a:t>13</a:t>
             </a:fld>
             <a:endParaRPr lang="nl-NL"/>
           </a:p>
@@ -5608,7 +6806,7 @@
 </p:sld>
 </file>
 
-<file path=ppt/slides/slide11.xml><?xml version="1.0" encoding="utf-8"?>
+<file path=ppt/slides/slide14.xml><?xml version="1.0" encoding="utf-8"?>
 <p:sld xmlns:a="http://schemas.openxmlformats.org/drawingml/2006/main" xmlns:r="http://schemas.openxmlformats.org/officeDocument/2006/relationships" xmlns:p="http://schemas.openxmlformats.org/presentationml/2006/main">
   <p:cSld>
     <p:spTree>
@@ -5774,7 +6972,7 @@
           <a:p>
             <a:fld id="{0A297500-7527-634B-90F4-69D0994C32B4}" type="slidenum">
               <a:rPr lang="nl-NL" smtClean="0"/>
-              <a:t>11</a:t>
+              <a:t>14</a:t>
             </a:fld>
             <a:endParaRPr lang="nl-NL"/>
           </a:p>
@@ -5890,7 +7088,7 @@
 </p:sld>
 </file>
 
-<file path=ppt/slides/slide12.xml><?xml version="1.0" encoding="utf-8"?>
+<file path=ppt/slides/slide15.xml><?xml version="1.0" encoding="utf-8"?>
 <p:sld xmlns:a="http://schemas.openxmlformats.org/drawingml/2006/main" xmlns:r="http://schemas.openxmlformats.org/officeDocument/2006/relationships" xmlns:p="http://schemas.openxmlformats.org/presentationml/2006/main">
   <p:cSld>
     <p:spTree>
@@ -6228,7 +7426,7 @@
           <a:p>
             <a:fld id="{0A297500-7527-634B-90F4-69D0994C32B4}" type="slidenum">
               <a:rPr lang="nl-NL" smtClean="0"/>
-              <a:t>12</a:t>
+              <a:t>15</a:t>
             </a:fld>
             <a:endParaRPr lang="nl-NL"/>
           </a:p>
@@ -6374,7 +7572,7 @@
 </p:sld>
 </file>
 
-<file path=ppt/slides/slide13.xml><?xml version="1.0" encoding="utf-8"?>
+<file path=ppt/slides/slide16.xml><?xml version="1.0" encoding="utf-8"?>
 <p:sld xmlns:a="http://schemas.openxmlformats.org/drawingml/2006/main" xmlns:r="http://schemas.openxmlformats.org/officeDocument/2006/relationships" xmlns:p="http://schemas.openxmlformats.org/presentationml/2006/main">
   <p:cSld>
     <p:spTree>
@@ -6488,7 +7686,7 @@
           <a:p>
             <a:fld id="{0A297500-7527-634B-90F4-69D0994C32B4}" type="slidenum">
               <a:rPr lang="nl-NL" smtClean="0"/>
-              <a:t>13</a:t>
+              <a:t>16</a:t>
             </a:fld>
             <a:endParaRPr lang="nl-NL"/>
           </a:p>
@@ -6565,7 +7763,7 @@
 </p:sld>
 </file>
 
-<file path=ppt/slides/slide14.xml><?xml version="1.0" encoding="utf-8"?>
+<file path=ppt/slides/slide17.xml><?xml version="1.0" encoding="utf-8"?>
 <p:sld xmlns:a="http://schemas.openxmlformats.org/drawingml/2006/main" xmlns:r="http://schemas.openxmlformats.org/officeDocument/2006/relationships" xmlns:p="http://schemas.openxmlformats.org/presentationml/2006/main">
   <p:cSld>
     <p:spTree>
@@ -7082,7 +8280,7 @@
           <a:p>
             <a:fld id="{0A297500-7527-634B-90F4-69D0994C32B4}" type="slidenum">
               <a:rPr lang="nl-NL" smtClean="0"/>
-              <a:t>14</a:t>
+              <a:t>17</a:t>
             </a:fld>
             <a:endParaRPr lang="nl-NL" dirty="0"/>
           </a:p>
@@ -7247,7 +8445,7 @@
 </p:sld>
 </file>
 
-<file path=ppt/slides/slide15.xml><?xml version="1.0" encoding="utf-8"?>
+<file path=ppt/slides/slide18.xml><?xml version="1.0" encoding="utf-8"?>
 <p:sld xmlns:a="http://schemas.openxmlformats.org/drawingml/2006/main" xmlns:r="http://schemas.openxmlformats.org/officeDocument/2006/relationships" xmlns:p="http://schemas.openxmlformats.org/presentationml/2006/main">
   <p:cSld>
     <p:spTree>
@@ -7378,7 +8576,7 @@
           <a:p>
             <a:fld id="{0A297500-7527-634B-90F4-69D0994C32B4}" type="slidenum">
               <a:rPr lang="nl-NL" smtClean="0"/>
-              <a:t>15</a:t>
+              <a:t>18</a:t>
             </a:fld>
             <a:endParaRPr lang="nl-NL"/>
           </a:p>
@@ -7470,7 +8668,7 @@
 </p:sld>
 </file>
 
-<file path=ppt/slides/slide16.xml><?xml version="1.0" encoding="utf-8"?>
+<file path=ppt/slides/slide19.xml><?xml version="1.0" encoding="utf-8"?>
 <p:sld xmlns:a="http://schemas.openxmlformats.org/drawingml/2006/main" xmlns:r="http://schemas.openxmlformats.org/officeDocument/2006/relationships" xmlns:p="http://schemas.openxmlformats.org/presentationml/2006/main">
   <p:cSld>
     <p:spTree>
@@ -7521,455 +8719,6 @@
     <p:extLst>
       <p:ext uri="{BB962C8B-B14F-4D97-AF65-F5344CB8AC3E}">
         <p14:creationId xmlns:p14="http://schemas.microsoft.com/office/powerpoint/2010/main" val="2576386695"/>
-      </p:ext>
-    </p:extLst>
-  </p:cSld>
-  <p:clrMapOvr>
-    <a:masterClrMapping/>
-  </p:clrMapOvr>
-</p:sld>
-</file>
-
-<file path=ppt/slides/slide17.xml><?xml version="1.0" encoding="utf-8"?>
-<p:sld xmlns:a="http://schemas.openxmlformats.org/drawingml/2006/main" xmlns:r="http://schemas.openxmlformats.org/officeDocument/2006/relationships" xmlns:p="http://schemas.openxmlformats.org/presentationml/2006/main">
-  <p:cSld>
-    <p:spTree>
-      <p:nvGrpSpPr>
-        <p:cNvPr id="1" name=""/>
-        <p:cNvGrpSpPr/>
-        <p:nvPr/>
-      </p:nvGrpSpPr>
-      <p:grpSpPr>
-        <a:xfrm>
-          <a:off x="0" y="0"/>
-          <a:ext cx="0" cy="0"/>
-          <a:chOff x="0" y="0"/>
-          <a:chExt cx="0" cy="0"/>
-        </a:xfrm>
-      </p:grpSpPr>
-      <p:sp>
-        <p:nvSpPr>
-          <p:cNvPr id="2" name="Tijdelijke aanduiding voor inhoud 1">
-            <a:extLst>
-              <a:ext uri="{FF2B5EF4-FFF2-40B4-BE49-F238E27FC236}">
-                <a16:creationId xmlns:a16="http://schemas.microsoft.com/office/drawing/2014/main" id="{2C6876EB-E2E6-4A77-B914-D1624EA2BB16}"/>
-              </a:ext>
-            </a:extLst>
-          </p:cNvPr>
-          <p:cNvSpPr>
-            <a:spLocks noGrp="1"/>
-          </p:cNvSpPr>
-          <p:nvPr>
-            <p:ph idx="1"/>
-          </p:nvPr>
-        </p:nvSpPr>
-        <p:spPr/>
-        <p:txBody>
-          <a:bodyPr>
-            <a:normAutofit lnSpcReduction="10000"/>
-          </a:bodyPr>
-          <a:lstStyle/>
-          <a:p>
-            <a:r>
-              <a:rPr lang="en-US" sz="2000" b="0" i="0" dirty="0">
-                <a:solidFill>
-                  <a:srgbClr val="252525"/>
-                </a:solidFill>
-                <a:effectLst/>
-                <a:latin typeface="Arial" panose="020B0604020202020204" pitchFamily="34" charset="0"/>
-              </a:rPr>
-              <a:t>C. </a:t>
-            </a:r>
-            <a:r>
-              <a:rPr lang="en-US" sz="2000" b="0" i="0" dirty="0" err="1">
-                <a:solidFill>
-                  <a:srgbClr val="252525"/>
-                </a:solidFill>
-                <a:effectLst/>
-                <a:latin typeface="Arial" panose="020B0604020202020204" pitchFamily="34" charset="0"/>
-              </a:rPr>
-              <a:t>Higham</a:t>
-            </a:r>
-            <a:r>
-              <a:rPr lang="en-US" sz="2000" b="0" i="0" dirty="0">
-                <a:solidFill>
-                  <a:srgbClr val="252525"/>
-                </a:solidFill>
-                <a:effectLst/>
-                <a:latin typeface="Arial" panose="020B0604020202020204" pitchFamily="34" charset="0"/>
-              </a:rPr>
-              <a:t> and D. </a:t>
-            </a:r>
-            <a:r>
-              <a:rPr lang="en-US" sz="2000" b="0" i="0" dirty="0" err="1">
-                <a:solidFill>
-                  <a:srgbClr val="252525"/>
-                </a:solidFill>
-                <a:effectLst/>
-                <a:latin typeface="Arial" panose="020B0604020202020204" pitchFamily="34" charset="0"/>
-              </a:rPr>
-              <a:t>Higham</a:t>
-            </a:r>
-            <a:r>
-              <a:rPr lang="en-US" sz="2000" b="0" i="0" dirty="0">
-                <a:solidFill>
-                  <a:srgbClr val="252525"/>
-                </a:solidFill>
-                <a:effectLst/>
-                <a:latin typeface="Arial" panose="020B0604020202020204" pitchFamily="34" charset="0"/>
-              </a:rPr>
-              <a:t> (2019). Deep Learning: An Introduction for Applied Mathematicians. SIAM Review Vol. 61, No. 4, pp. 860–891</a:t>
-            </a:r>
-          </a:p>
-          <a:p>
-            <a:pPr marL="0" indent="0">
-              <a:buNone/>
-            </a:pPr>
-            <a:r>
-              <a:rPr lang="nl-BE" sz="2000" dirty="0">
-                <a:hlinkClick r:id="rId2"/>
-              </a:rPr>
-              <a:t>https://epubs.siam.org/doi/pdf/10.1137/18M1165748</a:t>
-            </a:r>
-            <a:endParaRPr lang="nl-BE" sz="2000" dirty="0"/>
-          </a:p>
-          <a:p>
-            <a:pPr marL="0" indent="0">
-              <a:buNone/>
-            </a:pPr>
-            <a:endParaRPr lang="nl-BE" sz="2000" dirty="0"/>
-          </a:p>
-          <a:p>
-            <a:r>
-              <a:rPr lang="nl-BE" sz="2000" dirty="0">
-                <a:solidFill>
-                  <a:schemeClr val="bg2">
-                    <a:lumMod val="10000"/>
-                  </a:schemeClr>
-                </a:solidFill>
-              </a:rPr>
-              <a:t>L. </a:t>
-            </a:r>
-            <a:r>
-              <a:rPr lang="nl-BE" sz="2000" dirty="0" err="1">
-                <a:solidFill>
-                  <a:schemeClr val="bg2">
-                    <a:lumMod val="10000"/>
-                  </a:schemeClr>
-                </a:solidFill>
-              </a:rPr>
-              <a:t>Valentin</a:t>
-            </a:r>
-            <a:r>
-              <a:rPr lang="nl-BE" sz="2000" dirty="0">
-                <a:solidFill>
-                  <a:schemeClr val="bg2">
-                    <a:lumMod val="10000"/>
-                  </a:schemeClr>
-                </a:solidFill>
-              </a:rPr>
-              <a:t> </a:t>
-            </a:r>
-            <a:r>
-              <a:rPr lang="nl-BE" sz="2000" dirty="0" err="1">
-                <a:solidFill>
-                  <a:schemeClr val="bg2">
-                    <a:lumMod val="10000"/>
-                  </a:schemeClr>
-                </a:solidFill>
-              </a:rPr>
-              <a:t>Jopsin</a:t>
-            </a:r>
-            <a:r>
-              <a:rPr lang="nl-BE" sz="2000" dirty="0">
-                <a:solidFill>
-                  <a:schemeClr val="bg2">
-                    <a:lumMod val="10000"/>
-                  </a:schemeClr>
-                </a:solidFill>
-              </a:rPr>
-              <a:t>, W. </a:t>
-            </a:r>
-            <a:r>
-              <a:rPr lang="nl-BE" sz="2000" dirty="0" err="1">
-                <a:solidFill>
-                  <a:schemeClr val="bg2">
-                    <a:lumMod val="10000"/>
-                  </a:schemeClr>
-                </a:solidFill>
-              </a:rPr>
-              <a:t>Buntine</a:t>
-            </a:r>
-            <a:r>
-              <a:rPr lang="nl-BE" sz="2000" dirty="0">
-                <a:solidFill>
-                  <a:schemeClr val="bg2">
-                    <a:lumMod val="10000"/>
-                  </a:schemeClr>
-                </a:solidFill>
-              </a:rPr>
-              <a:t>, F. </a:t>
-            </a:r>
-            <a:r>
-              <a:rPr lang="nl-BE" sz="2000" dirty="0" err="1">
-                <a:solidFill>
-                  <a:schemeClr val="bg2">
-                    <a:lumMod val="10000"/>
-                  </a:schemeClr>
-                </a:solidFill>
-              </a:rPr>
-              <a:t>Boussaid</a:t>
-            </a:r>
-            <a:r>
-              <a:rPr lang="nl-BE" sz="2000" dirty="0">
-                <a:solidFill>
-                  <a:schemeClr val="bg2">
-                    <a:lumMod val="10000"/>
-                  </a:schemeClr>
-                </a:solidFill>
-              </a:rPr>
-              <a:t>, H. </a:t>
-            </a:r>
-            <a:r>
-              <a:rPr lang="nl-BE" sz="2000" dirty="0" err="1">
-                <a:solidFill>
-                  <a:schemeClr val="bg2">
-                    <a:lumMod val="10000"/>
-                  </a:schemeClr>
-                </a:solidFill>
-              </a:rPr>
-              <a:t>Laga</a:t>
-            </a:r>
-            <a:r>
-              <a:rPr lang="nl-BE" sz="2000" dirty="0">
-                <a:solidFill>
-                  <a:schemeClr val="bg2">
-                    <a:lumMod val="10000"/>
-                  </a:schemeClr>
-                </a:solidFill>
-              </a:rPr>
-              <a:t>, M. </a:t>
-            </a:r>
-            <a:r>
-              <a:rPr lang="nl-BE" sz="2000" dirty="0" err="1">
-                <a:solidFill>
-                  <a:schemeClr val="bg2">
-                    <a:lumMod val="10000"/>
-                  </a:schemeClr>
-                </a:solidFill>
-              </a:rPr>
-              <a:t>Bennamoun</a:t>
-            </a:r>
-            <a:r>
-              <a:rPr lang="nl-BE" sz="2000" dirty="0">
-                <a:solidFill>
-                  <a:schemeClr val="bg2">
-                    <a:lumMod val="10000"/>
-                  </a:schemeClr>
-                </a:solidFill>
-              </a:rPr>
-              <a:t> (2020), </a:t>
-            </a:r>
-            <a:r>
-              <a:rPr lang="en-US" sz="2000" dirty="0">
-                <a:solidFill>
-                  <a:schemeClr val="bg2">
-                    <a:lumMod val="10000"/>
-                  </a:schemeClr>
-                </a:solidFill>
-              </a:rPr>
-              <a:t>Hands-on Bayesian Neural Networks - a Tutorial for Deep Learning Users</a:t>
-            </a:r>
-            <a:endParaRPr lang="nl-BE" sz="2000" dirty="0">
-              <a:solidFill>
-                <a:schemeClr val="bg2">
-                  <a:lumMod val="10000"/>
-                </a:schemeClr>
-              </a:solidFill>
-            </a:endParaRPr>
-          </a:p>
-          <a:p>
-            <a:pPr marL="0" indent="0">
-              <a:buNone/>
-            </a:pPr>
-            <a:r>
-              <a:rPr lang="nl-BE" sz="2000" dirty="0"/>
-              <a:t> https://arxiv.org/pdf/2007.06823.pdf</a:t>
-            </a:r>
-          </a:p>
-          <a:p>
-            <a:endParaRPr lang="nl-BE" sz="2000" dirty="0"/>
-          </a:p>
-          <a:p>
-            <a:r>
-              <a:rPr lang="en-US" sz="2000" dirty="0">
-                <a:solidFill>
-                  <a:schemeClr val="bg2">
-                    <a:lumMod val="10000"/>
-                  </a:schemeClr>
-                </a:solidFill>
-              </a:rPr>
-              <a:t>M. Hardt, B. </a:t>
-            </a:r>
-            <a:r>
-              <a:rPr lang="en-US" sz="2000" dirty="0" err="1">
-                <a:solidFill>
-                  <a:schemeClr val="bg2">
-                    <a:lumMod val="10000"/>
-                  </a:schemeClr>
-                </a:solidFill>
-              </a:rPr>
-              <a:t>Recht</a:t>
-            </a:r>
-            <a:r>
-              <a:rPr lang="en-US" sz="2000" dirty="0">
-                <a:solidFill>
-                  <a:schemeClr val="bg2">
-                    <a:lumMod val="10000"/>
-                  </a:schemeClr>
-                </a:solidFill>
-              </a:rPr>
-              <a:t>, and Y. Singer, Train faster, generalize better: Stability of stochastic gradient descent, in Proceedings of the 33rd International Conference on Machine Learning, 2016, pp. 1225-1234</a:t>
-            </a:r>
-          </a:p>
-          <a:p>
-            <a:pPr marL="0" indent="0">
-              <a:buNone/>
-            </a:pPr>
-            <a:r>
-              <a:rPr lang="en-US" sz="2000" dirty="0">
-                <a:solidFill>
-                  <a:schemeClr val="bg2">
-                    <a:lumMod val="10000"/>
-                  </a:schemeClr>
-                </a:solidFill>
-              </a:rPr>
-              <a:t> </a:t>
-            </a:r>
-            <a:r>
-              <a:rPr lang="en-US" sz="2000" dirty="0">
-                <a:solidFill>
-                  <a:srgbClr val="333333"/>
-                </a:solidFill>
-                <a:effectLst/>
-                <a:latin typeface="+mj-lt"/>
-                <a:hlinkClick r:id="rId3"/>
-              </a:rPr>
-              <a:t>http://proceedings.mlr.press/v48/hardt16.pdf</a:t>
-            </a:r>
-            <a:endParaRPr lang="en-US" sz="2000" dirty="0">
-              <a:solidFill>
-                <a:srgbClr val="333333"/>
-              </a:solidFill>
-              <a:latin typeface="+mj-lt"/>
-            </a:endParaRPr>
-          </a:p>
-          <a:p>
-            <a:pPr marL="0" indent="0">
-              <a:buNone/>
-            </a:pPr>
-            <a:endParaRPr lang="en-US" sz="2000" dirty="0">
-              <a:solidFill>
-                <a:srgbClr val="333333"/>
-              </a:solidFill>
-              <a:effectLst/>
-              <a:latin typeface="+mj-lt"/>
-            </a:endParaRPr>
-          </a:p>
-          <a:p>
-            <a:endParaRPr lang="nl-BE" sz="2000" dirty="0"/>
-          </a:p>
-        </p:txBody>
-      </p:sp>
-      <p:sp>
-        <p:nvSpPr>
-          <p:cNvPr id="3" name="Tijdelijke aanduiding voor voettekst 2">
-            <a:extLst>
-              <a:ext uri="{FF2B5EF4-FFF2-40B4-BE49-F238E27FC236}">
-                <a16:creationId xmlns:a16="http://schemas.microsoft.com/office/drawing/2014/main" id="{F04AA1BA-CCFE-4C5A-9A04-C76A7F373F7D}"/>
-              </a:ext>
-            </a:extLst>
-          </p:cNvPr>
-          <p:cNvSpPr>
-            <a:spLocks noGrp="1"/>
-          </p:cNvSpPr>
-          <p:nvPr>
-            <p:ph type="ftr" sz="quarter" idx="11"/>
-          </p:nvPr>
-        </p:nvSpPr>
-        <p:spPr/>
-        <p:txBody>
-          <a:bodyPr/>
-          <a:lstStyle/>
-          <a:p>
-            <a:r>
-              <a:rPr lang="nl-NL"/>
-              <a:t>Faculteit wetenschappen</a:t>
-            </a:r>
-          </a:p>
-        </p:txBody>
-      </p:sp>
-      <p:sp>
-        <p:nvSpPr>
-          <p:cNvPr id="4" name="Tijdelijke aanduiding voor dianummer 3">
-            <a:extLst>
-              <a:ext uri="{FF2B5EF4-FFF2-40B4-BE49-F238E27FC236}">
-                <a16:creationId xmlns:a16="http://schemas.microsoft.com/office/drawing/2014/main" id="{C486396D-403B-4F6B-9286-7BF893D4DC2E}"/>
-              </a:ext>
-            </a:extLst>
-          </p:cNvPr>
-          <p:cNvSpPr>
-            <a:spLocks noGrp="1"/>
-          </p:cNvSpPr>
-          <p:nvPr>
-            <p:ph type="sldNum" sz="quarter" idx="12"/>
-          </p:nvPr>
-        </p:nvSpPr>
-        <p:spPr/>
-        <p:txBody>
-          <a:bodyPr/>
-          <a:lstStyle/>
-          <a:p>
-            <a:fld id="{0A297500-7527-634B-90F4-69D0994C32B4}" type="slidenum">
-              <a:rPr lang="nl-NL" smtClean="0"/>
-              <a:t>17</a:t>
-            </a:fld>
-            <a:endParaRPr lang="nl-NL"/>
-          </a:p>
-        </p:txBody>
-      </p:sp>
-      <p:sp>
-        <p:nvSpPr>
-          <p:cNvPr id="5" name="Titel 4">
-            <a:extLst>
-              <a:ext uri="{FF2B5EF4-FFF2-40B4-BE49-F238E27FC236}">
-                <a16:creationId xmlns:a16="http://schemas.microsoft.com/office/drawing/2014/main" id="{91ABC8BA-CEA1-4E23-B8C0-1B622F1BAED1}"/>
-              </a:ext>
-            </a:extLst>
-          </p:cNvPr>
-          <p:cNvSpPr>
-            <a:spLocks noGrp="1"/>
-          </p:cNvSpPr>
-          <p:nvPr>
-            <p:ph type="title"/>
-          </p:nvPr>
-        </p:nvSpPr>
-        <p:spPr/>
-        <p:txBody>
-          <a:bodyPr/>
-          <a:lstStyle/>
-          <a:p>
-            <a:r>
-              <a:rPr lang="nl-BE" dirty="0"/>
-              <a:t>Referenties</a:t>
-            </a:r>
-          </a:p>
-        </p:txBody>
-      </p:sp>
-    </p:spTree>
-    <p:extLst>
-      <p:ext uri="{BB962C8B-B14F-4D97-AF65-F5344CB8AC3E}">
-        <p14:creationId xmlns:p14="http://schemas.microsoft.com/office/powerpoint/2010/main" val="1949206879"/>
       </p:ext>
     </p:extLst>
   </p:cSld>
@@ -8525,6 +9274,455 @@
 </p:sld>
 </file>
 
+<file path=ppt/slides/slide20.xml><?xml version="1.0" encoding="utf-8"?>
+<p:sld xmlns:a="http://schemas.openxmlformats.org/drawingml/2006/main" xmlns:r="http://schemas.openxmlformats.org/officeDocument/2006/relationships" xmlns:p="http://schemas.openxmlformats.org/presentationml/2006/main">
+  <p:cSld>
+    <p:spTree>
+      <p:nvGrpSpPr>
+        <p:cNvPr id="1" name=""/>
+        <p:cNvGrpSpPr/>
+        <p:nvPr/>
+      </p:nvGrpSpPr>
+      <p:grpSpPr>
+        <a:xfrm>
+          <a:off x="0" y="0"/>
+          <a:ext cx="0" cy="0"/>
+          <a:chOff x="0" y="0"/>
+          <a:chExt cx="0" cy="0"/>
+        </a:xfrm>
+      </p:grpSpPr>
+      <p:sp>
+        <p:nvSpPr>
+          <p:cNvPr id="2" name="Tijdelijke aanduiding voor inhoud 1">
+            <a:extLst>
+              <a:ext uri="{FF2B5EF4-FFF2-40B4-BE49-F238E27FC236}">
+                <a16:creationId xmlns:a16="http://schemas.microsoft.com/office/drawing/2014/main" id="{2C6876EB-E2E6-4A77-B914-D1624EA2BB16}"/>
+              </a:ext>
+            </a:extLst>
+          </p:cNvPr>
+          <p:cNvSpPr>
+            <a:spLocks noGrp="1"/>
+          </p:cNvSpPr>
+          <p:nvPr>
+            <p:ph idx="1"/>
+          </p:nvPr>
+        </p:nvSpPr>
+        <p:spPr/>
+        <p:txBody>
+          <a:bodyPr>
+            <a:normAutofit lnSpcReduction="10000"/>
+          </a:bodyPr>
+          <a:lstStyle/>
+          <a:p>
+            <a:r>
+              <a:rPr lang="en-US" sz="2000" b="0" i="0" dirty="0">
+                <a:solidFill>
+                  <a:srgbClr val="252525"/>
+                </a:solidFill>
+                <a:effectLst/>
+                <a:latin typeface="Arial" panose="020B0604020202020204" pitchFamily="34" charset="0"/>
+              </a:rPr>
+              <a:t>C. </a:t>
+            </a:r>
+            <a:r>
+              <a:rPr lang="en-US" sz="2000" b="0" i="0" dirty="0" err="1">
+                <a:solidFill>
+                  <a:srgbClr val="252525"/>
+                </a:solidFill>
+                <a:effectLst/>
+                <a:latin typeface="Arial" panose="020B0604020202020204" pitchFamily="34" charset="0"/>
+              </a:rPr>
+              <a:t>Higham</a:t>
+            </a:r>
+            <a:r>
+              <a:rPr lang="en-US" sz="2000" b="0" i="0" dirty="0">
+                <a:solidFill>
+                  <a:srgbClr val="252525"/>
+                </a:solidFill>
+                <a:effectLst/>
+                <a:latin typeface="Arial" panose="020B0604020202020204" pitchFamily="34" charset="0"/>
+              </a:rPr>
+              <a:t> and D. </a:t>
+            </a:r>
+            <a:r>
+              <a:rPr lang="en-US" sz="2000" b="0" i="0" dirty="0" err="1">
+                <a:solidFill>
+                  <a:srgbClr val="252525"/>
+                </a:solidFill>
+                <a:effectLst/>
+                <a:latin typeface="Arial" panose="020B0604020202020204" pitchFamily="34" charset="0"/>
+              </a:rPr>
+              <a:t>Higham</a:t>
+            </a:r>
+            <a:r>
+              <a:rPr lang="en-US" sz="2000" b="0" i="0" dirty="0">
+                <a:solidFill>
+                  <a:srgbClr val="252525"/>
+                </a:solidFill>
+                <a:effectLst/>
+                <a:latin typeface="Arial" panose="020B0604020202020204" pitchFamily="34" charset="0"/>
+              </a:rPr>
+              <a:t> (2019). Deep Learning: An Introduction for Applied Mathematicians. SIAM Review Vol. 61, No. 4, pp. 860–891</a:t>
+            </a:r>
+          </a:p>
+          <a:p>
+            <a:pPr marL="0" indent="0">
+              <a:buNone/>
+            </a:pPr>
+            <a:r>
+              <a:rPr lang="nl-BE" sz="2000" dirty="0">
+                <a:hlinkClick r:id="rId2"/>
+              </a:rPr>
+              <a:t>https://epubs.siam.org/doi/pdf/10.1137/18M1165748</a:t>
+            </a:r>
+            <a:endParaRPr lang="nl-BE" sz="2000" dirty="0"/>
+          </a:p>
+          <a:p>
+            <a:pPr marL="0" indent="0">
+              <a:buNone/>
+            </a:pPr>
+            <a:endParaRPr lang="nl-BE" sz="2000" dirty="0"/>
+          </a:p>
+          <a:p>
+            <a:r>
+              <a:rPr lang="nl-BE" sz="2000" dirty="0">
+                <a:solidFill>
+                  <a:schemeClr val="bg2">
+                    <a:lumMod val="10000"/>
+                  </a:schemeClr>
+                </a:solidFill>
+              </a:rPr>
+              <a:t>L. </a:t>
+            </a:r>
+            <a:r>
+              <a:rPr lang="nl-BE" sz="2000" dirty="0" err="1">
+                <a:solidFill>
+                  <a:schemeClr val="bg2">
+                    <a:lumMod val="10000"/>
+                  </a:schemeClr>
+                </a:solidFill>
+              </a:rPr>
+              <a:t>Valentin</a:t>
+            </a:r>
+            <a:r>
+              <a:rPr lang="nl-BE" sz="2000" dirty="0">
+                <a:solidFill>
+                  <a:schemeClr val="bg2">
+                    <a:lumMod val="10000"/>
+                  </a:schemeClr>
+                </a:solidFill>
+              </a:rPr>
+              <a:t> </a:t>
+            </a:r>
+            <a:r>
+              <a:rPr lang="nl-BE" sz="2000" dirty="0" err="1">
+                <a:solidFill>
+                  <a:schemeClr val="bg2">
+                    <a:lumMod val="10000"/>
+                  </a:schemeClr>
+                </a:solidFill>
+              </a:rPr>
+              <a:t>Jopsin</a:t>
+            </a:r>
+            <a:r>
+              <a:rPr lang="nl-BE" sz="2000" dirty="0">
+                <a:solidFill>
+                  <a:schemeClr val="bg2">
+                    <a:lumMod val="10000"/>
+                  </a:schemeClr>
+                </a:solidFill>
+              </a:rPr>
+              <a:t>, W. </a:t>
+            </a:r>
+            <a:r>
+              <a:rPr lang="nl-BE" sz="2000" dirty="0" err="1">
+                <a:solidFill>
+                  <a:schemeClr val="bg2">
+                    <a:lumMod val="10000"/>
+                  </a:schemeClr>
+                </a:solidFill>
+              </a:rPr>
+              <a:t>Buntine</a:t>
+            </a:r>
+            <a:r>
+              <a:rPr lang="nl-BE" sz="2000" dirty="0">
+                <a:solidFill>
+                  <a:schemeClr val="bg2">
+                    <a:lumMod val="10000"/>
+                  </a:schemeClr>
+                </a:solidFill>
+              </a:rPr>
+              <a:t>, F. </a:t>
+            </a:r>
+            <a:r>
+              <a:rPr lang="nl-BE" sz="2000" dirty="0" err="1">
+                <a:solidFill>
+                  <a:schemeClr val="bg2">
+                    <a:lumMod val="10000"/>
+                  </a:schemeClr>
+                </a:solidFill>
+              </a:rPr>
+              <a:t>Boussaid</a:t>
+            </a:r>
+            <a:r>
+              <a:rPr lang="nl-BE" sz="2000" dirty="0">
+                <a:solidFill>
+                  <a:schemeClr val="bg2">
+                    <a:lumMod val="10000"/>
+                  </a:schemeClr>
+                </a:solidFill>
+              </a:rPr>
+              <a:t>, H. </a:t>
+            </a:r>
+            <a:r>
+              <a:rPr lang="nl-BE" sz="2000" dirty="0" err="1">
+                <a:solidFill>
+                  <a:schemeClr val="bg2">
+                    <a:lumMod val="10000"/>
+                  </a:schemeClr>
+                </a:solidFill>
+              </a:rPr>
+              <a:t>Laga</a:t>
+            </a:r>
+            <a:r>
+              <a:rPr lang="nl-BE" sz="2000" dirty="0">
+                <a:solidFill>
+                  <a:schemeClr val="bg2">
+                    <a:lumMod val="10000"/>
+                  </a:schemeClr>
+                </a:solidFill>
+              </a:rPr>
+              <a:t>, M. </a:t>
+            </a:r>
+            <a:r>
+              <a:rPr lang="nl-BE" sz="2000" dirty="0" err="1">
+                <a:solidFill>
+                  <a:schemeClr val="bg2">
+                    <a:lumMod val="10000"/>
+                  </a:schemeClr>
+                </a:solidFill>
+              </a:rPr>
+              <a:t>Bennamoun</a:t>
+            </a:r>
+            <a:r>
+              <a:rPr lang="nl-BE" sz="2000" dirty="0">
+                <a:solidFill>
+                  <a:schemeClr val="bg2">
+                    <a:lumMod val="10000"/>
+                  </a:schemeClr>
+                </a:solidFill>
+              </a:rPr>
+              <a:t> (2020), </a:t>
+            </a:r>
+            <a:r>
+              <a:rPr lang="en-US" sz="2000" dirty="0">
+                <a:solidFill>
+                  <a:schemeClr val="bg2">
+                    <a:lumMod val="10000"/>
+                  </a:schemeClr>
+                </a:solidFill>
+              </a:rPr>
+              <a:t>Hands-on Bayesian Neural Networks - a Tutorial for Deep Learning Users</a:t>
+            </a:r>
+            <a:endParaRPr lang="nl-BE" sz="2000" dirty="0">
+              <a:solidFill>
+                <a:schemeClr val="bg2">
+                  <a:lumMod val="10000"/>
+                </a:schemeClr>
+              </a:solidFill>
+            </a:endParaRPr>
+          </a:p>
+          <a:p>
+            <a:pPr marL="0" indent="0">
+              <a:buNone/>
+            </a:pPr>
+            <a:r>
+              <a:rPr lang="nl-BE" sz="2000" dirty="0"/>
+              <a:t> https://arxiv.org/pdf/2007.06823.pdf</a:t>
+            </a:r>
+          </a:p>
+          <a:p>
+            <a:endParaRPr lang="nl-BE" sz="2000" dirty="0"/>
+          </a:p>
+          <a:p>
+            <a:r>
+              <a:rPr lang="en-US" sz="2000" dirty="0">
+                <a:solidFill>
+                  <a:schemeClr val="bg2">
+                    <a:lumMod val="10000"/>
+                  </a:schemeClr>
+                </a:solidFill>
+              </a:rPr>
+              <a:t>M. Hardt, B. </a:t>
+            </a:r>
+            <a:r>
+              <a:rPr lang="en-US" sz="2000" dirty="0" err="1">
+                <a:solidFill>
+                  <a:schemeClr val="bg2">
+                    <a:lumMod val="10000"/>
+                  </a:schemeClr>
+                </a:solidFill>
+              </a:rPr>
+              <a:t>Recht</a:t>
+            </a:r>
+            <a:r>
+              <a:rPr lang="en-US" sz="2000" dirty="0">
+                <a:solidFill>
+                  <a:schemeClr val="bg2">
+                    <a:lumMod val="10000"/>
+                  </a:schemeClr>
+                </a:solidFill>
+              </a:rPr>
+              <a:t>, and Y. Singer, Train faster, generalize better: Stability of stochastic gradient descent, in Proceedings of the 33rd International Conference on Machine Learning, 2016, pp. 1225-1234</a:t>
+            </a:r>
+          </a:p>
+          <a:p>
+            <a:pPr marL="0" indent="0">
+              <a:buNone/>
+            </a:pPr>
+            <a:r>
+              <a:rPr lang="en-US" sz="2000" dirty="0">
+                <a:solidFill>
+                  <a:schemeClr val="bg2">
+                    <a:lumMod val="10000"/>
+                  </a:schemeClr>
+                </a:solidFill>
+              </a:rPr>
+              <a:t> </a:t>
+            </a:r>
+            <a:r>
+              <a:rPr lang="en-US" sz="2000" dirty="0">
+                <a:solidFill>
+                  <a:srgbClr val="333333"/>
+                </a:solidFill>
+                <a:effectLst/>
+                <a:latin typeface="+mj-lt"/>
+                <a:hlinkClick r:id="rId3"/>
+              </a:rPr>
+              <a:t>http://proceedings.mlr.press/v48/hardt16.pdf</a:t>
+            </a:r>
+            <a:endParaRPr lang="en-US" sz="2000" dirty="0">
+              <a:solidFill>
+                <a:srgbClr val="333333"/>
+              </a:solidFill>
+              <a:latin typeface="+mj-lt"/>
+            </a:endParaRPr>
+          </a:p>
+          <a:p>
+            <a:pPr marL="0" indent="0">
+              <a:buNone/>
+            </a:pPr>
+            <a:endParaRPr lang="en-US" sz="2000" dirty="0">
+              <a:solidFill>
+                <a:srgbClr val="333333"/>
+              </a:solidFill>
+              <a:effectLst/>
+              <a:latin typeface="+mj-lt"/>
+            </a:endParaRPr>
+          </a:p>
+          <a:p>
+            <a:endParaRPr lang="nl-BE" sz="2000" dirty="0"/>
+          </a:p>
+        </p:txBody>
+      </p:sp>
+      <p:sp>
+        <p:nvSpPr>
+          <p:cNvPr id="3" name="Tijdelijke aanduiding voor voettekst 2">
+            <a:extLst>
+              <a:ext uri="{FF2B5EF4-FFF2-40B4-BE49-F238E27FC236}">
+                <a16:creationId xmlns:a16="http://schemas.microsoft.com/office/drawing/2014/main" id="{F04AA1BA-CCFE-4C5A-9A04-C76A7F373F7D}"/>
+              </a:ext>
+            </a:extLst>
+          </p:cNvPr>
+          <p:cNvSpPr>
+            <a:spLocks noGrp="1"/>
+          </p:cNvSpPr>
+          <p:nvPr>
+            <p:ph type="ftr" sz="quarter" idx="11"/>
+          </p:nvPr>
+        </p:nvSpPr>
+        <p:spPr/>
+        <p:txBody>
+          <a:bodyPr/>
+          <a:lstStyle/>
+          <a:p>
+            <a:r>
+              <a:rPr lang="nl-NL"/>
+              <a:t>Faculteit wetenschappen</a:t>
+            </a:r>
+          </a:p>
+        </p:txBody>
+      </p:sp>
+      <p:sp>
+        <p:nvSpPr>
+          <p:cNvPr id="4" name="Tijdelijke aanduiding voor dianummer 3">
+            <a:extLst>
+              <a:ext uri="{FF2B5EF4-FFF2-40B4-BE49-F238E27FC236}">
+                <a16:creationId xmlns:a16="http://schemas.microsoft.com/office/drawing/2014/main" id="{C486396D-403B-4F6B-9286-7BF893D4DC2E}"/>
+              </a:ext>
+            </a:extLst>
+          </p:cNvPr>
+          <p:cNvSpPr>
+            <a:spLocks noGrp="1"/>
+          </p:cNvSpPr>
+          <p:nvPr>
+            <p:ph type="sldNum" sz="quarter" idx="12"/>
+          </p:nvPr>
+        </p:nvSpPr>
+        <p:spPr/>
+        <p:txBody>
+          <a:bodyPr/>
+          <a:lstStyle/>
+          <a:p>
+            <a:fld id="{0A297500-7527-634B-90F4-69D0994C32B4}" type="slidenum">
+              <a:rPr lang="nl-NL" smtClean="0"/>
+              <a:t>20</a:t>
+            </a:fld>
+            <a:endParaRPr lang="nl-NL"/>
+          </a:p>
+        </p:txBody>
+      </p:sp>
+      <p:sp>
+        <p:nvSpPr>
+          <p:cNvPr id="5" name="Titel 4">
+            <a:extLst>
+              <a:ext uri="{FF2B5EF4-FFF2-40B4-BE49-F238E27FC236}">
+                <a16:creationId xmlns:a16="http://schemas.microsoft.com/office/drawing/2014/main" id="{91ABC8BA-CEA1-4E23-B8C0-1B622F1BAED1}"/>
+              </a:ext>
+            </a:extLst>
+          </p:cNvPr>
+          <p:cNvSpPr>
+            <a:spLocks noGrp="1"/>
+          </p:cNvSpPr>
+          <p:nvPr>
+            <p:ph type="title"/>
+          </p:nvPr>
+        </p:nvSpPr>
+        <p:spPr/>
+        <p:txBody>
+          <a:bodyPr/>
+          <a:lstStyle/>
+          <a:p>
+            <a:r>
+              <a:rPr lang="nl-BE" dirty="0"/>
+              <a:t>Referenties</a:t>
+            </a:r>
+          </a:p>
+        </p:txBody>
+      </p:sp>
+    </p:spTree>
+    <p:extLst>
+      <p:ext uri="{BB962C8B-B14F-4D97-AF65-F5344CB8AC3E}">
+        <p14:creationId xmlns:p14="http://schemas.microsoft.com/office/powerpoint/2010/main" val="1949206879"/>
+      </p:ext>
+    </p:extLst>
+  </p:cSld>
+  <p:clrMapOvr>
+    <a:masterClrMapping/>
+  </p:clrMapOvr>
+</p:sld>
+</file>
+
 <file path=ppt/slides/slide3.xml><?xml version="1.0" encoding="utf-8"?>
 <p:sld xmlns:a="http://schemas.openxmlformats.org/drawingml/2006/main" xmlns:r="http://schemas.openxmlformats.org/officeDocument/2006/relationships" xmlns:p="http://schemas.openxmlformats.org/presentationml/2006/main">
   <p:cSld>
@@ -8708,7 +9906,7 @@
           <a:p>
             <a:r>
               <a:rPr lang="nl-BE" dirty="0"/>
-              <a:t>Neurale netwerken</a:t>
+              <a:t>Neurale netwerken (old)</a:t>
             </a:r>
           </a:p>
         </p:txBody>
@@ -8821,6 +10019,357 @@
       </p:grpSpPr>
       <p:sp>
         <p:nvSpPr>
+          <p:cNvPr id="2" name="Content Placeholder 1">
+            <a:extLst>
+              <a:ext uri="{FF2B5EF4-FFF2-40B4-BE49-F238E27FC236}">
+                <a16:creationId xmlns:a16="http://schemas.microsoft.com/office/drawing/2014/main" id="{EC4E1B74-3FCB-48B7-BCF3-C82AFD60B138}"/>
+              </a:ext>
+            </a:extLst>
+          </p:cNvPr>
+          <p:cNvSpPr>
+            <a:spLocks noGrp="1"/>
+          </p:cNvSpPr>
+          <p:nvPr>
+            <p:ph idx="1"/>
+          </p:nvPr>
+        </p:nvSpPr>
+        <p:spPr/>
+        <p:txBody>
+          <a:bodyPr/>
+          <a:lstStyle/>
+          <a:p>
+            <a:r>
+              <a:rPr lang="en-GB" dirty="0" err="1"/>
+              <a:t>Vergelijkbaar</a:t>
+            </a:r>
+            <a:r>
+              <a:rPr lang="en-GB" dirty="0"/>
+              <a:t> met hoe </a:t>
+            </a:r>
+            <a:r>
+              <a:rPr lang="en-GB" dirty="0" err="1"/>
+              <a:t>een</a:t>
+            </a:r>
+            <a:r>
+              <a:rPr lang="en-GB" dirty="0"/>
+              <a:t> </a:t>
+            </a:r>
+            <a:r>
+              <a:rPr lang="en-GB" dirty="0" err="1"/>
+              <a:t>brein</a:t>
+            </a:r>
+            <a:r>
+              <a:rPr lang="en-GB" dirty="0"/>
+              <a:t> </a:t>
+            </a:r>
+            <a:r>
+              <a:rPr lang="en-GB" dirty="0" err="1"/>
+              <a:t>werkt</a:t>
+            </a:r>
+            <a:endParaRPr lang="en-GB" dirty="0"/>
+          </a:p>
+          <a:p>
+            <a:r>
+              <a:rPr lang="en-GB" dirty="0" err="1"/>
+              <a:t>Signalen</a:t>
+            </a:r>
+            <a:r>
+              <a:rPr lang="en-GB" dirty="0"/>
+              <a:t> van </a:t>
+            </a:r>
+            <a:r>
+              <a:rPr lang="en-GB" dirty="0" err="1"/>
+              <a:t>varierende</a:t>
+            </a:r>
+            <a:r>
+              <a:rPr lang="en-GB" dirty="0"/>
+              <a:t> </a:t>
+            </a:r>
+            <a:r>
+              <a:rPr lang="en-GB" dirty="0" err="1"/>
+              <a:t>grootte</a:t>
+            </a:r>
+            <a:r>
+              <a:rPr lang="en-GB" dirty="0"/>
+              <a:t> </a:t>
+            </a:r>
+            <a:r>
+              <a:rPr lang="en-GB" dirty="0" err="1"/>
+              <a:t>uitzenden</a:t>
+            </a:r>
+            <a:endParaRPr lang="en-GB" dirty="0"/>
+          </a:p>
+          <a:p>
+            <a:r>
+              <a:rPr lang="en-GB" dirty="0" err="1"/>
+              <a:t>Gelaagde</a:t>
+            </a:r>
+            <a:r>
+              <a:rPr lang="en-GB" dirty="0"/>
+              <a:t> </a:t>
+            </a:r>
+            <a:r>
+              <a:rPr lang="en-GB" dirty="0" err="1"/>
+              <a:t>structuur</a:t>
+            </a:r>
+            <a:endParaRPr lang="en-GB" dirty="0"/>
+          </a:p>
+          <a:p>
+            <a:r>
+              <a:rPr lang="en-GB" dirty="0" err="1"/>
+              <a:t>Onderliggende</a:t>
+            </a:r>
+            <a:r>
+              <a:rPr lang="en-GB" dirty="0"/>
+              <a:t> </a:t>
+            </a:r>
+            <a:r>
+              <a:rPr lang="en-GB" dirty="0" err="1"/>
+              <a:t>wiskunde</a:t>
+            </a:r>
+            <a:r>
+              <a:rPr lang="en-GB" dirty="0"/>
+              <a:t>: Matrix-vector </a:t>
+            </a:r>
+            <a:r>
+              <a:rPr lang="en-GB" dirty="0" err="1"/>
+              <a:t>operaties</a:t>
+            </a:r>
+            <a:r>
+              <a:rPr lang="en-GB" dirty="0"/>
+              <a:t> </a:t>
+            </a:r>
+            <a:r>
+              <a:rPr lang="en-GB" dirty="0" err="1"/>
+              <a:t>en</a:t>
+            </a:r>
+            <a:r>
+              <a:rPr lang="en-GB" dirty="0"/>
+              <a:t> </a:t>
+            </a:r>
+            <a:r>
+              <a:rPr lang="en-GB" dirty="0" err="1"/>
+              <a:t>transformatiefuncties</a:t>
+            </a:r>
+            <a:endParaRPr lang="en-GB" dirty="0"/>
+          </a:p>
+          <a:p>
+            <a:endParaRPr lang="en-GB" dirty="0"/>
+          </a:p>
+        </p:txBody>
+      </p:sp>
+      <p:sp>
+        <p:nvSpPr>
+          <p:cNvPr id="3" name="Footer Placeholder 2">
+            <a:extLst>
+              <a:ext uri="{FF2B5EF4-FFF2-40B4-BE49-F238E27FC236}">
+                <a16:creationId xmlns:a16="http://schemas.microsoft.com/office/drawing/2014/main" id="{2D8EAB31-F917-4B4A-ADCD-49A37B3F5F45}"/>
+              </a:ext>
+            </a:extLst>
+          </p:cNvPr>
+          <p:cNvSpPr>
+            <a:spLocks noGrp="1"/>
+          </p:cNvSpPr>
+          <p:nvPr>
+            <p:ph type="ftr" sz="quarter" idx="11"/>
+          </p:nvPr>
+        </p:nvSpPr>
+        <p:spPr/>
+        <p:txBody>
+          <a:bodyPr/>
+          <a:lstStyle/>
+          <a:p>
+            <a:r>
+              <a:rPr lang="nl-NL"/>
+              <a:t>Faculteit wetenschappen</a:t>
+            </a:r>
+          </a:p>
+        </p:txBody>
+      </p:sp>
+      <p:sp>
+        <p:nvSpPr>
+          <p:cNvPr id="4" name="Slide Number Placeholder 3">
+            <a:extLst>
+              <a:ext uri="{FF2B5EF4-FFF2-40B4-BE49-F238E27FC236}">
+                <a16:creationId xmlns:a16="http://schemas.microsoft.com/office/drawing/2014/main" id="{F5E46B07-1DBA-45AC-A050-F49E3FFDDCA9}"/>
+              </a:ext>
+            </a:extLst>
+          </p:cNvPr>
+          <p:cNvSpPr>
+            <a:spLocks noGrp="1"/>
+          </p:cNvSpPr>
+          <p:nvPr>
+            <p:ph type="sldNum" sz="quarter" idx="12"/>
+          </p:nvPr>
+        </p:nvSpPr>
+        <p:spPr/>
+        <p:txBody>
+          <a:bodyPr/>
+          <a:lstStyle/>
+          <a:p>
+            <a:fld id="{0A297500-7527-634B-90F4-69D0994C32B4}" type="slidenum">
+              <a:rPr lang="nl-NL" smtClean="0"/>
+              <a:t>4</a:t>
+            </a:fld>
+            <a:endParaRPr lang="nl-NL"/>
+          </a:p>
+        </p:txBody>
+      </p:sp>
+      <p:sp>
+        <p:nvSpPr>
+          <p:cNvPr id="5" name="Title 4">
+            <a:extLst>
+              <a:ext uri="{FF2B5EF4-FFF2-40B4-BE49-F238E27FC236}">
+                <a16:creationId xmlns:a16="http://schemas.microsoft.com/office/drawing/2014/main" id="{29968D02-AD86-483E-B518-F0B5A760F2F4}"/>
+              </a:ext>
+            </a:extLst>
+          </p:cNvPr>
+          <p:cNvSpPr>
+            <a:spLocks noGrp="1"/>
+          </p:cNvSpPr>
+          <p:nvPr>
+            <p:ph type="title"/>
+          </p:nvPr>
+        </p:nvSpPr>
+        <p:spPr/>
+        <p:txBody>
+          <a:bodyPr/>
+          <a:lstStyle/>
+          <a:p>
+            <a:r>
+              <a:rPr lang="nl-BE" dirty="0"/>
+              <a:t>Neurale netwerken</a:t>
+            </a:r>
+            <a:endParaRPr lang="en-GB" dirty="0"/>
+          </a:p>
+        </p:txBody>
+      </p:sp>
+      <p:pic>
+        <p:nvPicPr>
+          <p:cNvPr id="1026" name="Picture 2" descr="From Fiction to Reality: A Beginner's Guide to Artificial Neural Networks |  by Jason Roell | Towards Data Science">
+            <a:extLst>
+              <a:ext uri="{FF2B5EF4-FFF2-40B4-BE49-F238E27FC236}">
+                <a16:creationId xmlns:a16="http://schemas.microsoft.com/office/drawing/2014/main" id="{B0989E2A-3DB5-4483-BB4F-8632C9E63197}"/>
+              </a:ext>
+            </a:extLst>
+          </p:cNvPr>
+          <p:cNvPicPr>
+            <a:picLocks noChangeAspect="1" noChangeArrowheads="1"/>
+          </p:cNvPicPr>
+          <p:nvPr/>
+        </p:nvPicPr>
+        <p:blipFill>
+          <a:blip r:embed="rId2">
+            <a:extLst>
+              <a:ext uri="{28A0092B-C50C-407E-A947-70E740481C1C}">
+                <a14:useLocalDpi xmlns:a14="http://schemas.microsoft.com/office/drawing/2010/main" val="0"/>
+              </a:ext>
+            </a:extLst>
+          </a:blip>
+          <a:srcRect/>
+          <a:stretch>
+            <a:fillRect/>
+          </a:stretch>
+        </p:blipFill>
+        <p:spPr bwMode="auto">
+          <a:xfrm>
+            <a:off x="1968389" y="3550562"/>
+            <a:ext cx="8255222" cy="2569438"/>
+          </a:xfrm>
+          <a:prstGeom prst="rect">
+            <a:avLst/>
+          </a:prstGeom>
+          <a:noFill/>
+          <a:extLst>
+            <a:ext uri="{909E8E84-426E-40DD-AFC4-6F175D3DCCD1}">
+              <a14:hiddenFill xmlns:a14="http://schemas.microsoft.com/office/drawing/2010/main">
+                <a:solidFill>
+                  <a:srgbClr val="FFFFFF"/>
+                </a:solidFill>
+              </a14:hiddenFill>
+            </a:ext>
+          </a:extLst>
+        </p:spPr>
+      </p:pic>
+      <p:pic>
+        <p:nvPicPr>
+          <p:cNvPr id="8" name="Picture 4" descr="Neural Network Models in R | Machine learning tutorial, Machine learning  book, Deep learning">
+            <a:extLst>
+              <a:ext uri="{FF2B5EF4-FFF2-40B4-BE49-F238E27FC236}">
+                <a16:creationId xmlns:a16="http://schemas.microsoft.com/office/drawing/2014/main" id="{C2BF3E2B-B8BA-4E22-8B6D-2CBD47BDC113}"/>
+              </a:ext>
+            </a:extLst>
+          </p:cNvPr>
+          <p:cNvPicPr>
+            <a:picLocks noChangeAspect="1" noChangeArrowheads="1"/>
+          </p:cNvPicPr>
+          <p:nvPr/>
+        </p:nvPicPr>
+        <p:blipFill>
+          <a:blip r:embed="rId3">
+            <a:extLst>
+              <a:ext uri="{28A0092B-C50C-407E-A947-70E740481C1C}">
+                <a14:useLocalDpi xmlns:a14="http://schemas.microsoft.com/office/drawing/2010/main" val="0"/>
+              </a:ext>
+            </a:extLst>
+          </a:blip>
+          <a:srcRect/>
+          <a:stretch>
+            <a:fillRect/>
+          </a:stretch>
+        </p:blipFill>
+        <p:spPr bwMode="auto">
+          <a:xfrm>
+            <a:off x="7005357" y="551787"/>
+            <a:ext cx="4610643" cy="2271252"/>
+          </a:xfrm>
+          <a:prstGeom prst="rect">
+            <a:avLst/>
+          </a:prstGeom>
+          <a:noFill/>
+          <a:extLst>
+            <a:ext uri="{909E8E84-426E-40DD-AFC4-6F175D3DCCD1}">
+              <a14:hiddenFill xmlns:a14="http://schemas.microsoft.com/office/drawing/2010/main">
+                <a:solidFill>
+                  <a:srgbClr val="FFFFFF"/>
+                </a:solidFill>
+              </a14:hiddenFill>
+            </a:ext>
+          </a:extLst>
+        </p:spPr>
+      </p:pic>
+    </p:spTree>
+    <p:extLst>
+      <p:ext uri="{BB962C8B-B14F-4D97-AF65-F5344CB8AC3E}">
+        <p14:creationId xmlns:p14="http://schemas.microsoft.com/office/powerpoint/2010/main" val="2759411344"/>
+      </p:ext>
+    </p:extLst>
+  </p:cSld>
+  <p:clrMapOvr>
+    <a:masterClrMapping/>
+  </p:clrMapOvr>
+</p:sld>
+</file>
+
+<file path=ppt/slides/slide5.xml><?xml version="1.0" encoding="utf-8"?>
+<p:sld xmlns:a="http://schemas.openxmlformats.org/drawingml/2006/main" xmlns:r="http://schemas.openxmlformats.org/officeDocument/2006/relationships" xmlns:p="http://schemas.openxmlformats.org/presentationml/2006/main">
+  <p:cSld>
+    <p:spTree>
+      <p:nvGrpSpPr>
+        <p:cNvPr id="1" name=""/>
+        <p:cNvGrpSpPr/>
+        <p:nvPr/>
+      </p:nvGrpSpPr>
+      <p:grpSpPr>
+        <a:xfrm>
+          <a:off x="0" y="0"/>
+          <a:ext cx="0" cy="0"/>
+          <a:chOff x="0" y="0"/>
+          <a:chExt cx="0" cy="0"/>
+        </a:xfrm>
+      </p:grpSpPr>
+      <p:sp>
+        <p:nvSpPr>
           <p:cNvPr id="3" name="Footer Placeholder 2">
             <a:extLst>
               <a:ext uri="{FF2B5EF4-FFF2-40B4-BE49-F238E27FC236}">
@@ -8870,7 +10419,7 @@
           <a:p>
             <a:fld id="{0A297500-7527-634B-90F4-69D0994C32B4}" type="slidenum">
               <a:rPr lang="nl-NL" smtClean="0"/>
-              <a:t>4</a:t>
+              <a:t>5</a:t>
             </a:fld>
             <a:endParaRPr lang="nl-NL"/>
           </a:p>
@@ -9167,7 +10716,7 @@
 </p:sld>
 </file>
 
-<file path=ppt/slides/slide5.xml><?xml version="1.0" encoding="utf-8"?>
+<file path=ppt/slides/slide6.xml><?xml version="1.0" encoding="utf-8"?>
 <p:sld xmlns:a="http://schemas.openxmlformats.org/drawingml/2006/main" xmlns:r="http://schemas.openxmlformats.org/officeDocument/2006/relationships" xmlns:p="http://schemas.openxmlformats.org/presentationml/2006/main">
   <p:cSld>
     <p:spTree>
@@ -9202,12 +10751,7 @@
                 <p:ph idx="1"/>
               </p:nvPr>
             </p:nvSpPr>
-            <p:spPr>
-              <a:xfrm>
-                <a:off x="576000" y="1550167"/>
-                <a:ext cx="11041200" cy="4464000"/>
-              </a:xfrm>
-            </p:spPr>
+            <p:spPr/>
             <p:txBody>
               <a:bodyPr/>
               <a:lstStyle/>
@@ -9258,7 +10802,15 @@
                 </a:pPr>
                 <a:r>
                   <a:rPr lang="nl-BE" dirty="0" err="1"/>
-                  <a:t>Gradient</a:t>
+                  <a:t>Stochastic</a:t>
+                </a:r>
+                <a:r>
+                  <a:rPr lang="nl-BE" dirty="0"/>
+                  <a:t> </a:t>
+                </a:r>
+                <a:r>
+                  <a:rPr lang="nl-BE" dirty="0" err="1"/>
+                  <a:t>gradient</a:t>
                 </a:r>
                 <a:r>
                   <a:rPr lang="nl-BE" dirty="0"/>
@@ -9419,14 +10971,10 @@
               </p:nvPr>
             </p:nvSpPr>
             <p:spPr>
-              <a:xfrm>
-                <a:off x="576000" y="1550167"/>
-                <a:ext cx="11041200" cy="4464000"/>
-              </a:xfrm>
               <a:blipFill>
                 <a:blip r:embed="rId2"/>
                 <a:stretch>
-                  <a:fillRect l="-828" t="-955" b="-1637"/>
+                  <a:fillRect l="-828" t="-956" b="-1776"/>
                 </a:stretch>
               </a:blipFill>
             </p:spPr>
@@ -9496,7 +11044,7 @@
           <a:p>
             <a:fld id="{0A297500-7527-634B-90F4-69D0994C32B4}" type="slidenum">
               <a:rPr lang="nl-NL" smtClean="0"/>
-              <a:t>5</a:t>
+              <a:t>6</a:t>
             </a:fld>
             <a:endParaRPr lang="nl-NL"/>
           </a:p>
@@ -9525,7 +11073,7 @@
           <a:p>
             <a:r>
               <a:rPr lang="nl-BE" dirty="0"/>
-              <a:t>Hoe kan het netwerk leren?</a:t>
+              <a:t>Hoe kan het netwerk leren? (old)</a:t>
             </a:r>
           </a:p>
         </p:txBody>
@@ -9585,7 +11133,7 @@
     </p:spTree>
     <p:extLst>
       <p:ext uri="{BB962C8B-B14F-4D97-AF65-F5344CB8AC3E}">
-        <p14:creationId xmlns:p14="http://schemas.microsoft.com/office/powerpoint/2010/main" val="3211812153"/>
+        <p14:creationId xmlns:p14="http://schemas.microsoft.com/office/powerpoint/2010/main" val="3671640486"/>
       </p:ext>
     </p:extLst>
   </p:cSld>
@@ -9595,7 +11143,7 @@
 </p:sld>
 </file>
 
-<file path=ppt/slides/slide6.xml><?xml version="1.0" encoding="utf-8"?>
+<file path=ppt/slides/slide7.xml><?xml version="1.0" encoding="utf-8"?>
 <p:sld xmlns:a="http://schemas.openxmlformats.org/drawingml/2006/main" xmlns:r="http://schemas.openxmlformats.org/officeDocument/2006/relationships" xmlns:p="http://schemas.openxmlformats.org/presentationml/2006/main">
   <p:cSld>
     <p:spTree>
@@ -9612,8 +11160,447 @@
           <a:chExt cx="0" cy="0"/>
         </a:xfrm>
       </p:grpSpPr>
-      <mc:AlternateContent xmlns:mc="http://schemas.openxmlformats.org/markup-compatibility/2006" xmlns:a14="http://schemas.microsoft.com/office/drawing/2010/main">
-        <mc:Choice Requires="a14">
+      <mc:AlternateContent xmlns:mc="http://schemas.openxmlformats.org/markup-compatibility/2006">
+        <mc:Choice xmlns:a14="http://schemas.microsoft.com/office/drawing/2010/main" Requires="a14">
+          <p:sp>
+            <p:nvSpPr>
+              <p:cNvPr id="2" name="Tijdelijke aanduiding voor inhoud 1">
+                <a:extLst>
+                  <a:ext uri="{FF2B5EF4-FFF2-40B4-BE49-F238E27FC236}">
+                    <a16:creationId xmlns:a16="http://schemas.microsoft.com/office/drawing/2014/main" id="{791F80F6-7C99-40AA-9E6A-1079D32855E1}"/>
+                  </a:ext>
+                </a:extLst>
+              </p:cNvPr>
+              <p:cNvSpPr>
+                <a:spLocks noGrp="1"/>
+              </p:cNvSpPr>
+              <p:nvPr>
+                <p:ph idx="1"/>
+              </p:nvPr>
+            </p:nvSpPr>
+            <p:spPr>
+              <a:xfrm>
+                <a:off x="576000" y="1550167"/>
+                <a:ext cx="11041200" cy="4464000"/>
+              </a:xfrm>
+            </p:spPr>
+            <p:txBody>
+              <a:bodyPr>
+                <a:noAutofit/>
+              </a:bodyPr>
+              <a:lstStyle/>
+              <a:p>
+                <a:pPr>
+                  <a:lnSpc>
+                    <a:spcPct val="120000"/>
+                  </a:lnSpc>
+                </a:pPr>
+                <a:r>
+                  <a:rPr lang="nl-BE" dirty="0"/>
+                  <a:t>Gekende trainingsoutput vergelijken met werkelijke output</a:t>
+                </a:r>
+              </a:p>
+              <a:p>
+                <a:pPr>
+                  <a:lnSpc>
+                    <a:spcPct val="120000"/>
+                  </a:lnSpc>
+                </a:pPr>
+                <a:r>
+                  <a:rPr lang="nl-BE" dirty="0"/>
+                  <a:t>Verschil geeft kostfunctie</a:t>
+                </a:r>
+              </a:p>
+              <a:p>
+                <a:pPr>
+                  <a:lnSpc>
+                    <a:spcPct val="120000"/>
+                  </a:lnSpc>
+                </a:pPr>
+                <a:r>
+                  <a:rPr lang="nl-BE" dirty="0"/>
+                  <a:t>Deze minimaliseren door gewichten en biases aan te passen</a:t>
+                </a:r>
+              </a:p>
+              <a:p>
+                <a:pPr>
+                  <a:lnSpc>
+                    <a:spcPct val="120000"/>
+                  </a:lnSpc>
+                </a:pPr>
+                <a:r>
+                  <a:rPr lang="nl-BE" dirty="0"/>
+                  <a:t>Simpel algoritme: gradient descent</a:t>
+                </a:r>
+              </a:p>
+              <a:p>
+                <a:pPr marL="0" indent="0">
+                  <a:buNone/>
+                </a:pPr>
+                <a:endParaRPr lang="nl-BE" dirty="0"/>
+              </a:p>
+              <a:p>
+                <a:pPr marL="0" indent="0">
+                  <a:buNone/>
+                </a:pPr>
+                <a:r>
+                  <a:rPr lang="nl-BE" dirty="0" err="1"/>
+                  <a:t>Gradient</a:t>
+                </a:r>
+                <a:r>
+                  <a:rPr lang="nl-BE" dirty="0"/>
+                  <a:t> </a:t>
+                </a:r>
+                <a:r>
+                  <a:rPr lang="nl-BE" dirty="0" err="1"/>
+                  <a:t>descent</a:t>
+                </a:r>
+                <a:r>
+                  <a:rPr lang="nl-BE" dirty="0"/>
+                  <a:t>:</a:t>
+                </a:r>
+              </a:p>
+              <a:p>
+                <a14:m>
+                  <m:oMath xmlns:m="http://schemas.openxmlformats.org/officeDocument/2006/math">
+                    <m:r>
+                      <a:rPr lang="nl-BE" b="0" i="1" smtClean="0">
+                        <a:latin typeface="Cambria Math" panose="02040503050406030204" pitchFamily="18" charset="0"/>
+                      </a:rPr>
+                      <m:t>𝐶𝑜𝑠𝑡</m:t>
+                    </m:r>
+                    <m:r>
+                      <a:rPr lang="nl-BE" b="0" i="1" smtClean="0">
+                        <a:latin typeface="Cambria Math" panose="02040503050406030204" pitchFamily="18" charset="0"/>
+                      </a:rPr>
+                      <m:t>(</m:t>
+                    </m:r>
+                    <m:r>
+                      <a:rPr lang="nl-BE" b="0" i="1" smtClean="0">
+                        <a:latin typeface="Cambria Math" panose="02040503050406030204" pitchFamily="18" charset="0"/>
+                      </a:rPr>
+                      <m:t>𝑝</m:t>
+                    </m:r>
+                    <m:r>
+                      <a:rPr lang="nl-BE" b="0" i="1" smtClean="0">
+                        <a:latin typeface="Cambria Math" panose="02040503050406030204" pitchFamily="18" charset="0"/>
+                      </a:rPr>
+                      <m:t>)</m:t>
+                    </m:r>
+                  </m:oMath>
+                </a14:m>
+                <a:endParaRPr lang="nl-BE" dirty="0"/>
+              </a:p>
+              <a:p>
+                <a14:m>
+                  <m:oMath xmlns:m="http://schemas.openxmlformats.org/officeDocument/2006/math">
+                    <m:r>
+                      <a:rPr lang="nl-BE" b="0" i="1" smtClean="0">
+                        <a:latin typeface="Cambria Math" panose="02040503050406030204" pitchFamily="18" charset="0"/>
+                      </a:rPr>
+                      <m:t>𝑝</m:t>
+                    </m:r>
+                    <m:r>
+                      <a:rPr lang="nl-BE" b="0" i="1" smtClean="0">
+                        <a:latin typeface="Cambria Math" panose="02040503050406030204" pitchFamily="18" charset="0"/>
+                      </a:rPr>
+                      <m:t> →</m:t>
+                    </m:r>
+                    <m:r>
+                      <a:rPr lang="nl-BE" b="0" i="1" smtClean="0">
+                        <a:latin typeface="Cambria Math" panose="02040503050406030204" pitchFamily="18" charset="0"/>
+                      </a:rPr>
+                      <m:t>𝑝</m:t>
+                    </m:r>
+                    <m:r>
+                      <a:rPr lang="nl-BE" b="0" i="1" smtClean="0">
+                        <a:latin typeface="Cambria Math" panose="02040503050406030204" pitchFamily="18" charset="0"/>
+                      </a:rPr>
+                      <m:t> − </m:t>
+                    </m:r>
+                    <m:r>
+                      <a:rPr lang="nl-BE" b="0" i="1" smtClean="0">
+                        <a:latin typeface="Cambria Math" panose="02040503050406030204" pitchFamily="18" charset="0"/>
+                        <a:ea typeface="Cambria Math" panose="02040503050406030204" pitchFamily="18" charset="0"/>
+                      </a:rPr>
+                      <m:t>𝛼</m:t>
+                    </m:r>
+                    <m:r>
+                      <m:rPr>
+                        <m:sty m:val="p"/>
+                      </m:rPr>
+                      <a:rPr lang="nl-BE" b="0" i="1" smtClean="0">
+                        <a:latin typeface="Cambria Math" panose="02040503050406030204" pitchFamily="18" charset="0"/>
+                        <a:ea typeface="Cambria Math" panose="02040503050406030204" pitchFamily="18" charset="0"/>
+                      </a:rPr>
+                      <m:t>∇</m:t>
+                    </m:r>
+                    <m:r>
+                      <a:rPr lang="nl-BE" b="0" i="1" smtClean="0">
+                        <a:latin typeface="Cambria Math" panose="02040503050406030204" pitchFamily="18" charset="0"/>
+                        <a:ea typeface="Cambria Math" panose="02040503050406030204" pitchFamily="18" charset="0"/>
+                      </a:rPr>
+                      <m:t>𝐶𝑜𝑠𝑡</m:t>
+                    </m:r>
+                    <m:r>
+                      <a:rPr lang="nl-BE" b="0" i="1" smtClean="0">
+                        <a:latin typeface="Cambria Math" panose="02040503050406030204" pitchFamily="18" charset="0"/>
+                        <a:ea typeface="Cambria Math" panose="02040503050406030204" pitchFamily="18" charset="0"/>
+                      </a:rPr>
+                      <m:t>(</m:t>
+                    </m:r>
+                    <m:r>
+                      <a:rPr lang="nl-BE" b="0" i="1" smtClean="0">
+                        <a:latin typeface="Cambria Math" panose="02040503050406030204" pitchFamily="18" charset="0"/>
+                        <a:ea typeface="Cambria Math" panose="02040503050406030204" pitchFamily="18" charset="0"/>
+                      </a:rPr>
+                      <m:t>𝑝</m:t>
+                    </m:r>
+                    <m:r>
+                      <a:rPr lang="nl-BE" b="0" i="1" smtClean="0">
+                        <a:latin typeface="Cambria Math" panose="02040503050406030204" pitchFamily="18" charset="0"/>
+                        <a:ea typeface="Cambria Math" panose="02040503050406030204" pitchFamily="18" charset="0"/>
+                      </a:rPr>
+                      <m:t>)</m:t>
+                    </m:r>
+                  </m:oMath>
+                </a14:m>
+                <a:r>
+                  <a:rPr lang="nl-BE" dirty="0"/>
+                  <a:t>, </a:t>
+                </a:r>
+                <a14:m>
+                  <m:oMath xmlns:m="http://schemas.openxmlformats.org/officeDocument/2006/math">
+                    <m:r>
+                      <a:rPr lang="nl-BE" i="1">
+                        <a:latin typeface="Cambria Math" panose="02040503050406030204" pitchFamily="18" charset="0"/>
+                        <a:ea typeface="Cambria Math" panose="02040503050406030204" pitchFamily="18" charset="0"/>
+                      </a:rPr>
+                      <m:t>𝛼</m:t>
+                    </m:r>
+                  </m:oMath>
+                </a14:m>
+                <a:r>
+                  <a:rPr lang="nl-BE" dirty="0"/>
+                  <a:t> = stap-grootte</a:t>
+                </a:r>
+              </a:p>
+            </p:txBody>
+          </p:sp>
+        </mc:Choice>
+        <mc:Fallback>
+          <p:sp>
+            <p:nvSpPr>
+              <p:cNvPr id="2" name="Tijdelijke aanduiding voor inhoud 1">
+                <a:extLst>
+                  <a:ext uri="{FF2B5EF4-FFF2-40B4-BE49-F238E27FC236}">
+                    <a16:creationId xmlns:a16="http://schemas.microsoft.com/office/drawing/2014/main" id="{791F80F6-7C99-40AA-9E6A-1079D32855E1}"/>
+                  </a:ext>
+                </a:extLst>
+              </p:cNvPr>
+              <p:cNvSpPr>
+                <a:spLocks noGrp="1" noRot="1" noChangeAspect="1" noMove="1" noResize="1" noEditPoints="1" noAdjustHandles="1" noChangeArrowheads="1" noChangeShapeType="1" noTextEdit="1"/>
+              </p:cNvSpPr>
+              <p:nvPr>
+                <p:ph idx="1"/>
+              </p:nvPr>
+            </p:nvSpPr>
+            <p:spPr>
+              <a:xfrm>
+                <a:off x="576000" y="1550167"/>
+                <a:ext cx="11041200" cy="4464000"/>
+              </a:xfrm>
+              <a:blipFill>
+                <a:blip r:embed="rId2"/>
+                <a:stretch>
+                  <a:fillRect l="-828" t="-273"/>
+                </a:stretch>
+              </a:blipFill>
+            </p:spPr>
+            <p:txBody>
+              <a:bodyPr/>
+              <a:lstStyle/>
+              <a:p>
+                <a:r>
+                  <a:rPr lang="en-GB">
+                    <a:noFill/>
+                  </a:rPr>
+                  <a:t> </a:t>
+                </a:r>
+              </a:p>
+            </p:txBody>
+          </p:sp>
+        </mc:Fallback>
+      </mc:AlternateContent>
+      <p:sp>
+        <p:nvSpPr>
+          <p:cNvPr id="3" name="Tijdelijke aanduiding voor voettekst 2">
+            <a:extLst>
+              <a:ext uri="{FF2B5EF4-FFF2-40B4-BE49-F238E27FC236}">
+                <a16:creationId xmlns:a16="http://schemas.microsoft.com/office/drawing/2014/main" id="{AC20FBC6-81D6-44AD-8B6B-BDC5979550B0}"/>
+              </a:ext>
+            </a:extLst>
+          </p:cNvPr>
+          <p:cNvSpPr>
+            <a:spLocks noGrp="1"/>
+          </p:cNvSpPr>
+          <p:nvPr>
+            <p:ph type="ftr" sz="quarter" idx="11"/>
+          </p:nvPr>
+        </p:nvSpPr>
+        <p:spPr/>
+        <p:txBody>
+          <a:bodyPr/>
+          <a:lstStyle/>
+          <a:p>
+            <a:r>
+              <a:rPr lang="nl-NL" dirty="0"/>
+              <a:t>Faculteit wetenschappen</a:t>
+            </a:r>
+          </a:p>
+        </p:txBody>
+      </p:sp>
+      <p:sp>
+        <p:nvSpPr>
+          <p:cNvPr id="4" name="Tijdelijke aanduiding voor dianummer 3">
+            <a:extLst>
+              <a:ext uri="{FF2B5EF4-FFF2-40B4-BE49-F238E27FC236}">
+                <a16:creationId xmlns:a16="http://schemas.microsoft.com/office/drawing/2014/main" id="{E7643AC6-B745-443E-BE95-B35603B681BD}"/>
+              </a:ext>
+            </a:extLst>
+          </p:cNvPr>
+          <p:cNvSpPr>
+            <a:spLocks noGrp="1"/>
+          </p:cNvSpPr>
+          <p:nvPr>
+            <p:ph type="sldNum" sz="quarter" idx="12"/>
+          </p:nvPr>
+        </p:nvSpPr>
+        <p:spPr/>
+        <p:txBody>
+          <a:bodyPr/>
+          <a:lstStyle/>
+          <a:p>
+            <a:fld id="{0A297500-7527-634B-90F4-69D0994C32B4}" type="slidenum">
+              <a:rPr lang="nl-NL" smtClean="0"/>
+              <a:t>7</a:t>
+            </a:fld>
+            <a:endParaRPr lang="nl-NL"/>
+          </a:p>
+        </p:txBody>
+      </p:sp>
+      <p:sp>
+        <p:nvSpPr>
+          <p:cNvPr id="5" name="Titel 4">
+            <a:extLst>
+              <a:ext uri="{FF2B5EF4-FFF2-40B4-BE49-F238E27FC236}">
+                <a16:creationId xmlns:a16="http://schemas.microsoft.com/office/drawing/2014/main" id="{B43412E4-AA0D-4F9A-96B0-400C649D8A5C}"/>
+              </a:ext>
+            </a:extLst>
+          </p:cNvPr>
+          <p:cNvSpPr>
+            <a:spLocks noGrp="1"/>
+          </p:cNvSpPr>
+          <p:nvPr>
+            <p:ph type="title"/>
+          </p:nvPr>
+        </p:nvSpPr>
+        <p:spPr/>
+        <p:txBody>
+          <a:bodyPr/>
+          <a:lstStyle/>
+          <a:p>
+            <a:r>
+              <a:rPr lang="nl-BE" dirty="0"/>
+              <a:t>Hoe kan het netwerk leren?</a:t>
+            </a:r>
+          </a:p>
+        </p:txBody>
+      </p:sp>
+      <p:pic>
+        <p:nvPicPr>
+          <p:cNvPr id="2052" name="Picture 4" descr="AI researchers allege that machine learning is alchemy | Science | AAAS">
+            <a:extLst>
+              <a:ext uri="{FF2B5EF4-FFF2-40B4-BE49-F238E27FC236}">
+                <a16:creationId xmlns:a16="http://schemas.microsoft.com/office/drawing/2014/main" id="{4390AB37-4252-4B1F-AC1A-08E985B39A91}"/>
+              </a:ext>
+            </a:extLst>
+          </p:cNvPr>
+          <p:cNvPicPr>
+            <a:picLocks noChangeAspect="1" noChangeArrowheads="1"/>
+          </p:cNvPicPr>
+          <p:nvPr/>
+        </p:nvPicPr>
+        <p:blipFill>
+          <a:blip r:embed="rId3">
+            <a:extLst>
+              <a:ext uri="{28A0092B-C50C-407E-A947-70E740481C1C}">
+                <a14:useLocalDpi xmlns:a14="http://schemas.microsoft.com/office/drawing/2010/main" val="0"/>
+              </a:ext>
+            </a:extLst>
+          </a:blip>
+          <a:srcRect/>
+          <a:stretch>
+            <a:fillRect/>
+          </a:stretch>
+        </p:blipFill>
+        <p:spPr bwMode="auto">
+          <a:xfrm>
+            <a:off x="8053234" y="3702258"/>
+            <a:ext cx="4286250" cy="2409825"/>
+          </a:xfrm>
+          <a:prstGeom prst="ellipse">
+            <a:avLst/>
+          </a:prstGeom>
+          <a:ln>
+            <a:noFill/>
+          </a:ln>
+          <a:effectLst>
+            <a:softEdge rad="112500"/>
+          </a:effectLst>
+          <a:extLst>
+            <a:ext uri="{909E8E84-426E-40DD-AFC4-6F175D3DCCD1}">
+              <a14:hiddenFill xmlns:a14="http://schemas.microsoft.com/office/drawing/2010/main">
+                <a:solidFill>
+                  <a:srgbClr val="FFFFFF"/>
+                </a:solidFill>
+              </a14:hiddenFill>
+            </a:ext>
+          </a:extLst>
+        </p:spPr>
+      </p:pic>
+    </p:spTree>
+    <p:extLst>
+      <p:ext uri="{BB962C8B-B14F-4D97-AF65-F5344CB8AC3E}">
+        <p14:creationId xmlns:p14="http://schemas.microsoft.com/office/powerpoint/2010/main" val="3211812153"/>
+      </p:ext>
+    </p:extLst>
+  </p:cSld>
+  <p:clrMapOvr>
+    <a:masterClrMapping/>
+  </p:clrMapOvr>
+</p:sld>
+</file>
+
+<file path=ppt/slides/slide8.xml><?xml version="1.0" encoding="utf-8"?>
+<p:sld xmlns:a="http://schemas.openxmlformats.org/drawingml/2006/main" xmlns:r="http://schemas.openxmlformats.org/officeDocument/2006/relationships" xmlns:p="http://schemas.openxmlformats.org/presentationml/2006/main">
+  <p:cSld>
+    <p:spTree>
+      <p:nvGrpSpPr>
+        <p:cNvPr id="1" name=""/>
+        <p:cNvGrpSpPr/>
+        <p:nvPr/>
+      </p:nvGrpSpPr>
+      <p:grpSpPr>
+        <a:xfrm>
+          <a:off x="0" y="0"/>
+          <a:ext cx="0" cy="0"/>
+          <a:chOff x="0" y="0"/>
+          <a:chExt cx="0" cy="0"/>
+        </a:xfrm>
+      </p:grpSpPr>
+      <mc:AlternateContent xmlns:mc="http://schemas.openxmlformats.org/markup-compatibility/2006">
+        <mc:Choice xmlns:a14="http://schemas.microsoft.com/office/drawing/2010/main" Requires="a14">
           <p:sp>
             <p:nvSpPr>
               <p:cNvPr id="2" name="Tijdelijke aanduiding voor inhoud 1">
@@ -9713,7 +11700,7 @@
               <a:p>
                 <a:r>
                   <a:rPr lang="nl-BE" dirty="0"/>
-                  <a:t>Stap-grootte </a:t>
+                  <a:t>Stap-grootte: </a:t>
                 </a:r>
                 <a14:m>
                   <m:oMath xmlns:m="http://schemas.openxmlformats.org/officeDocument/2006/math">
@@ -9781,6 +11768,15 @@
                 <a:pPr marL="0" indent="0">
                   <a:buNone/>
                 </a:pPr>
+                <a:endParaRPr lang="nl-BE" dirty="0"/>
+              </a:p>
+              <a:p>
+                <a:endParaRPr lang="nl-BE" dirty="0"/>
+              </a:p>
+              <a:p>
+                <a:pPr marL="0" indent="0">
+                  <a:buNone/>
+                </a:pPr>
                 <a:r>
                   <a:rPr lang="nl-BE" dirty="0"/>
                   <a:t> </a:t>
@@ -9789,7 +11785,7 @@
             </p:txBody>
           </p:sp>
         </mc:Choice>
-        <mc:Fallback xmlns="">
+        <mc:Fallback>
           <p:sp>
             <p:nvSpPr>
               <p:cNvPr id="2" name="Tijdelijke aanduiding voor inhoud 1">
@@ -9819,7 +11815,7 @@
               <a:lstStyle/>
               <a:p>
                 <a:r>
-                  <a:rPr lang="nl-BE">
+                  <a:rPr lang="en-GB">
                     <a:noFill/>
                   </a:rPr>
                   <a:t> </a:t>
@@ -9880,7 +11876,7 @@
           <a:p>
             <a:fld id="{0A297500-7527-634B-90F4-69D0994C32B4}" type="slidenum">
               <a:rPr lang="nl-NL" smtClean="0"/>
-              <a:t>6</a:t>
+              <a:t>8</a:t>
             </a:fld>
             <a:endParaRPr lang="nl-NL"/>
           </a:p>
@@ -9908,18 +11904,9 @@
           <a:lstStyle/>
           <a:p>
             <a:r>
-              <a:rPr lang="nl-BE" dirty="0" err="1"/>
-              <a:t>Gradient</a:t>
-            </a:r>
-            <a:r>
               <a:rPr lang="nl-BE" dirty="0"/>
-              <a:t> </a:t>
-            </a:r>
-            <a:r>
-              <a:rPr lang="nl-BE" dirty="0" err="1"/>
-              <a:t>descent</a:t>
-            </a:r>
-            <a:endParaRPr lang="nl-BE" dirty="0"/>
+              <a:t>Gradient descent (old)</a:t>
+            </a:r>
           </a:p>
         </p:txBody>
       </p:sp>
@@ -9950,7 +11937,7 @@
         </p:blipFill>
         <p:spPr bwMode="auto">
           <a:xfrm>
-            <a:off x="6096000" y="1449036"/>
+            <a:off x="6645353" y="1311768"/>
             <a:ext cx="5546647" cy="4234464"/>
           </a:xfrm>
           <a:prstGeom prst="rect">
@@ -9981,7 +11968,7 @@
 </p:sld>
 </file>
 
-<file path=ppt/slides/slide7.xml><?xml version="1.0" encoding="utf-8"?>
+<file path=ppt/slides/slide9.xml><?xml version="1.0" encoding="utf-8"?>
 <p:sld xmlns:a="http://schemas.openxmlformats.org/drawingml/2006/main" xmlns:r="http://schemas.openxmlformats.org/officeDocument/2006/relationships" xmlns:p="http://schemas.openxmlformats.org/presentationml/2006/main">
   <p:cSld>
     <p:spTree>
@@ -9998,41 +11985,355 @@
           <a:chExt cx="0" cy="0"/>
         </a:xfrm>
       </p:grpSpPr>
-      <p:pic>
-        <p:nvPicPr>
-          <p:cNvPr id="7" name="Tijdelijke aanduiding voor inhoud 6" descr="Afbeelding met object, klok&#10;&#10;Automatisch gegenereerde beschrijving">
+      <mc:AlternateContent xmlns:mc="http://schemas.openxmlformats.org/markup-compatibility/2006">
+        <mc:Choice xmlns:a14="http://schemas.microsoft.com/office/drawing/2010/main" Requires="a14">
+          <p:sp>
+            <p:nvSpPr>
+              <p:cNvPr id="2" name="Tijdelijke aanduiding voor inhoud 1">
+                <a:extLst>
+                  <a:ext uri="{FF2B5EF4-FFF2-40B4-BE49-F238E27FC236}">
+                    <a16:creationId xmlns:a16="http://schemas.microsoft.com/office/drawing/2014/main" id="{FAD5BCBE-B7FB-4D4B-94CB-CC236D9B6C93}"/>
+                  </a:ext>
+                </a:extLst>
+              </p:cNvPr>
+              <p:cNvSpPr>
+                <a:spLocks noGrp="1"/>
+              </p:cNvSpPr>
+              <p:nvPr>
+                <p:ph idx="1"/>
+              </p:nvPr>
+            </p:nvSpPr>
+            <p:spPr/>
+            <p:txBody>
+              <a:bodyPr>
+                <a:normAutofit fontScale="55000" lnSpcReduction="20000"/>
+              </a:bodyPr>
+              <a:lstStyle/>
+              <a:p>
+                <a14:m>
+                  <m:oMath xmlns:m="http://schemas.openxmlformats.org/officeDocument/2006/math">
+                    <m:r>
+                      <a:rPr lang="nl-BE" sz="3800" b="0" i="1" smtClean="0">
+                        <a:latin typeface="Cambria Math" panose="02040503050406030204" pitchFamily="18" charset="0"/>
+                      </a:rPr>
+                      <m:t>𝑝</m:t>
+                    </m:r>
+                    <m:r>
+                      <a:rPr lang="nl-BE" sz="3800" b="0" i="1" smtClean="0">
+                        <a:latin typeface="Cambria Math" panose="02040503050406030204" pitchFamily="18" charset="0"/>
+                      </a:rPr>
+                      <m:t> →</m:t>
+                    </m:r>
+                    <m:r>
+                      <a:rPr lang="nl-BE" sz="3800" b="0" i="1" smtClean="0">
+                        <a:latin typeface="Cambria Math" panose="02040503050406030204" pitchFamily="18" charset="0"/>
+                      </a:rPr>
+                      <m:t>𝑝</m:t>
+                    </m:r>
+                    <m:r>
+                      <a:rPr lang="nl-BE" sz="3800" b="0" i="1" smtClean="0">
+                        <a:latin typeface="Cambria Math" panose="02040503050406030204" pitchFamily="18" charset="0"/>
+                      </a:rPr>
+                      <m:t> − </m:t>
+                    </m:r>
+                    <m:r>
+                      <a:rPr lang="nl-BE" sz="3800" b="0" i="1" smtClean="0">
+                        <a:latin typeface="Cambria Math" panose="02040503050406030204" pitchFamily="18" charset="0"/>
+                        <a:ea typeface="Cambria Math" panose="02040503050406030204" pitchFamily="18" charset="0"/>
+                      </a:rPr>
+                      <m:t>𝛼</m:t>
+                    </m:r>
+                    <m:r>
+                      <m:rPr>
+                        <m:sty m:val="p"/>
+                      </m:rPr>
+                      <a:rPr lang="nl-BE" sz="3800" b="0" i="1" smtClean="0">
+                        <a:latin typeface="Cambria Math" panose="02040503050406030204" pitchFamily="18" charset="0"/>
+                        <a:ea typeface="Cambria Math" panose="02040503050406030204" pitchFamily="18" charset="0"/>
+                      </a:rPr>
+                      <m:t>∇</m:t>
+                    </m:r>
+                    <m:r>
+                      <a:rPr lang="nl-BE" sz="3800" b="0" i="1" smtClean="0">
+                        <a:latin typeface="Cambria Math" panose="02040503050406030204" pitchFamily="18" charset="0"/>
+                        <a:ea typeface="Cambria Math" panose="02040503050406030204" pitchFamily="18" charset="0"/>
+                      </a:rPr>
+                      <m:t>𝐶𝑜𝑠𝑡</m:t>
+                    </m:r>
+                    <m:r>
+                      <a:rPr lang="nl-BE" sz="3800" b="0" i="1" smtClean="0">
+                        <a:latin typeface="Cambria Math" panose="02040503050406030204" pitchFamily="18" charset="0"/>
+                        <a:ea typeface="Cambria Math" panose="02040503050406030204" pitchFamily="18" charset="0"/>
+                      </a:rPr>
+                      <m:t>(</m:t>
+                    </m:r>
+                    <m:r>
+                      <a:rPr lang="nl-BE" sz="3800" b="0" i="1" smtClean="0">
+                        <a:latin typeface="Cambria Math" panose="02040503050406030204" pitchFamily="18" charset="0"/>
+                        <a:ea typeface="Cambria Math" panose="02040503050406030204" pitchFamily="18" charset="0"/>
+                      </a:rPr>
+                      <m:t>𝑝</m:t>
+                    </m:r>
+                    <m:r>
+                      <a:rPr lang="nl-BE" sz="3800" b="0" i="1" smtClean="0">
+                        <a:latin typeface="Cambria Math" panose="02040503050406030204" pitchFamily="18" charset="0"/>
+                        <a:ea typeface="Cambria Math" panose="02040503050406030204" pitchFamily="18" charset="0"/>
+                      </a:rPr>
+                      <m:t>)</m:t>
+                    </m:r>
+                  </m:oMath>
+                </a14:m>
+                <a:endParaRPr lang="nl-BE" sz="3800" dirty="0"/>
+              </a:p>
+              <a:p>
+                <a:pPr marL="0" indent="0">
+                  <a:buNone/>
+                </a:pPr>
+                <a:r>
+                  <a:rPr lang="nl-BE" sz="3800" dirty="0"/>
+                  <a:t>Stap-grootte: </a:t>
+                </a:r>
+                <a14:m>
+                  <m:oMath xmlns:m="http://schemas.openxmlformats.org/officeDocument/2006/math">
+                    <m:r>
+                      <a:rPr lang="nl-BE" sz="3800" b="0" i="1" smtClean="0">
+                        <a:latin typeface="Cambria Math" panose="02040503050406030204" pitchFamily="18" charset="0"/>
+                        <a:ea typeface="Cambria Math" panose="02040503050406030204" pitchFamily="18" charset="0"/>
+                      </a:rPr>
+                      <m:t>𝛼</m:t>
+                    </m:r>
+                  </m:oMath>
+                </a14:m>
+                <a:endParaRPr lang="nl-BE" sz="3800" dirty="0"/>
+              </a:p>
+              <a:p>
+                <a:pPr marL="0" indent="0">
+                  <a:buNone/>
+                </a:pPr>
+                <a:r>
+                  <a:rPr lang="nl-BE" sz="3800" dirty="0"/>
+                  <a:t>Gradiënt van kostfunctie: </a:t>
+                </a:r>
+                <a14:m>
+                  <m:oMath xmlns:m="http://schemas.openxmlformats.org/officeDocument/2006/math">
+                    <m:r>
+                      <m:rPr>
+                        <m:sty m:val="p"/>
+                      </m:rPr>
+                      <a:rPr lang="nl-BE" sz="3800" b="0" i="1" smtClean="0">
+                        <a:latin typeface="Cambria Math" panose="02040503050406030204" pitchFamily="18" charset="0"/>
+                        <a:ea typeface="Cambria Math" panose="02040503050406030204" pitchFamily="18" charset="0"/>
+                      </a:rPr>
+                      <m:t>∇</m:t>
+                    </m:r>
+                    <m:r>
+                      <a:rPr lang="nl-BE" sz="3800" b="0" i="1" smtClean="0">
+                        <a:latin typeface="Cambria Math" panose="02040503050406030204" pitchFamily="18" charset="0"/>
+                        <a:ea typeface="Cambria Math" panose="02040503050406030204" pitchFamily="18" charset="0"/>
+                      </a:rPr>
+                      <m:t>𝐶𝑜𝑠𝑡</m:t>
+                    </m:r>
+                    <m:r>
+                      <a:rPr lang="nl-BE" sz="3800" b="0" i="1" smtClean="0">
+                        <a:latin typeface="Cambria Math" panose="02040503050406030204" pitchFamily="18" charset="0"/>
+                        <a:ea typeface="Cambria Math" panose="02040503050406030204" pitchFamily="18" charset="0"/>
+                      </a:rPr>
+                      <m:t>(</m:t>
+                    </m:r>
+                    <m:r>
+                      <a:rPr lang="nl-BE" sz="3800" b="0" i="1" smtClean="0">
+                        <a:latin typeface="Cambria Math" panose="02040503050406030204" pitchFamily="18" charset="0"/>
+                        <a:ea typeface="Cambria Math" panose="02040503050406030204" pitchFamily="18" charset="0"/>
+                      </a:rPr>
+                      <m:t>𝑝</m:t>
+                    </m:r>
+                    <m:r>
+                      <a:rPr lang="nl-BE" sz="3800" b="0" i="1" smtClean="0">
+                        <a:latin typeface="Cambria Math" panose="02040503050406030204" pitchFamily="18" charset="0"/>
+                        <a:ea typeface="Cambria Math" panose="02040503050406030204" pitchFamily="18" charset="0"/>
+                      </a:rPr>
+                      <m:t>)</m:t>
+                    </m:r>
+                  </m:oMath>
+                </a14:m>
+                <a:endParaRPr lang="nl-BE" sz="3800" dirty="0"/>
+              </a:p>
+              <a:p>
+                <a:endParaRPr lang="nl-BE" sz="3800" dirty="0"/>
+              </a:p>
+              <a:p>
+                <a14:m>
+                  <m:oMath xmlns:m="http://schemas.openxmlformats.org/officeDocument/2006/math">
+                    <m:r>
+                      <a:rPr lang="nl-BE" sz="3800" i="1">
+                        <a:latin typeface="Cambria Math" panose="02040503050406030204" pitchFamily="18" charset="0"/>
+                      </a:rPr>
+                      <m:t>−</m:t>
+                    </m:r>
+                    <m:r>
+                      <m:rPr>
+                        <m:sty m:val="p"/>
+                      </m:rPr>
+                      <a:rPr lang="nl-BE" sz="3800" b="0" i="1" smtClean="0">
+                        <a:latin typeface="Cambria Math" panose="02040503050406030204" pitchFamily="18" charset="0"/>
+                        <a:ea typeface="Cambria Math" panose="02040503050406030204" pitchFamily="18" charset="0"/>
+                      </a:rPr>
+                      <m:t>∇</m:t>
+                    </m:r>
+                    <m:r>
+                      <a:rPr lang="nl-BE" sz="3800" b="0" i="1" smtClean="0">
+                        <a:latin typeface="Cambria Math" panose="02040503050406030204" pitchFamily="18" charset="0"/>
+                        <a:ea typeface="Cambria Math" panose="02040503050406030204" pitchFamily="18" charset="0"/>
+                      </a:rPr>
+                      <m:t>𝐶𝑜𝑠𝑡</m:t>
+                    </m:r>
+                    <m:r>
+                      <a:rPr lang="nl-BE" sz="3800" b="0" i="1" smtClean="0">
+                        <a:latin typeface="Cambria Math" panose="02040503050406030204" pitchFamily="18" charset="0"/>
+                        <a:ea typeface="Cambria Math" panose="02040503050406030204" pitchFamily="18" charset="0"/>
+                      </a:rPr>
+                      <m:t>(</m:t>
+                    </m:r>
+                    <m:r>
+                      <a:rPr lang="nl-BE" sz="3800" b="0" i="1" smtClean="0">
+                        <a:latin typeface="Cambria Math" panose="02040503050406030204" pitchFamily="18" charset="0"/>
+                        <a:ea typeface="Cambria Math" panose="02040503050406030204" pitchFamily="18" charset="0"/>
+                      </a:rPr>
+                      <m:t>𝑝</m:t>
+                    </m:r>
+                    <m:r>
+                      <a:rPr lang="nl-BE" sz="3800" b="0" i="1" smtClean="0">
+                        <a:latin typeface="Cambria Math" panose="02040503050406030204" pitchFamily="18" charset="0"/>
+                        <a:ea typeface="Cambria Math" panose="02040503050406030204" pitchFamily="18" charset="0"/>
+                      </a:rPr>
+                      <m:t>)</m:t>
+                    </m:r>
+                  </m:oMath>
+                </a14:m>
+                <a:r>
+                  <a:rPr lang="nl-BE" sz="3800" dirty="0"/>
+                  <a:t> is de richting waar de functie</a:t>
+                </a:r>
+              </a:p>
+              <a:p>
+                <a:pPr marL="0" indent="0">
+                  <a:buNone/>
+                </a:pPr>
+                <a:r>
+                  <a:rPr lang="nl-BE" sz="3800" dirty="0"/>
+                  <a:t>   het hardste daalt</a:t>
+                </a:r>
+              </a:p>
+              <a:p>
+                <a:r>
+                  <a:rPr lang="nl-BE" sz="3800" dirty="0"/>
+                  <a:t>Stap te groot: mogelijk om over minimum te springen</a:t>
+                </a:r>
+              </a:p>
+              <a:p>
+                <a:r>
+                  <a:rPr lang="nl-BE" sz="3800" dirty="0"/>
+                  <a:t>Stap te klein: algoritme te traag</a:t>
+                </a:r>
+              </a:p>
+              <a:p>
+                <a:endParaRPr lang="nl-BE" dirty="0"/>
+              </a:p>
+              <a:p>
+                <a:pPr marL="0" indent="0">
+                  <a:buNone/>
+                </a:pPr>
+                <a:endParaRPr lang="nl-BE" dirty="0"/>
+              </a:p>
+              <a:p>
+                <a:endParaRPr lang="nl-BE" dirty="0"/>
+              </a:p>
+              <a:p>
+                <a:pPr marL="0" indent="0">
+                  <a:buNone/>
+                </a:pPr>
+                <a:r>
+                  <a:rPr lang="nl-BE" dirty="0"/>
+                  <a:t> </a:t>
+                </a:r>
+              </a:p>
+            </p:txBody>
+          </p:sp>
+        </mc:Choice>
+        <mc:Fallback>
+          <p:sp>
+            <p:nvSpPr>
+              <p:cNvPr id="2" name="Tijdelijke aanduiding voor inhoud 1">
+                <a:extLst>
+                  <a:ext uri="{FF2B5EF4-FFF2-40B4-BE49-F238E27FC236}">
+                    <a16:creationId xmlns:a16="http://schemas.microsoft.com/office/drawing/2014/main" id="{FAD5BCBE-B7FB-4D4B-94CB-CC236D9B6C93}"/>
+                  </a:ext>
+                </a:extLst>
+              </p:cNvPr>
+              <p:cNvSpPr>
+                <a:spLocks noGrp="1" noRot="1" noChangeAspect="1" noMove="1" noResize="1" noEditPoints="1" noAdjustHandles="1" noChangeArrowheads="1" noChangeShapeType="1" noTextEdit="1"/>
+              </p:cNvSpPr>
+              <p:nvPr>
+                <p:ph idx="1"/>
+              </p:nvPr>
+            </p:nvSpPr>
+            <p:spPr>
+              <a:blipFill>
+                <a:blip r:embed="rId2"/>
+                <a:stretch>
+                  <a:fillRect l="-662" t="-410"/>
+                </a:stretch>
+              </a:blipFill>
+            </p:spPr>
+            <p:txBody>
+              <a:bodyPr/>
+              <a:lstStyle/>
+              <a:p>
+                <a:r>
+                  <a:rPr lang="en-GB">
+                    <a:noFill/>
+                  </a:rPr>
+                  <a:t> </a:t>
+                </a:r>
+              </a:p>
+            </p:txBody>
+          </p:sp>
+        </mc:Fallback>
+      </mc:AlternateContent>
+      <p:sp>
+        <p:nvSpPr>
+          <p:cNvPr id="3" name="Tijdelijke aanduiding voor voettekst 2">
             <a:extLst>
               <a:ext uri="{FF2B5EF4-FFF2-40B4-BE49-F238E27FC236}">
-                <a16:creationId xmlns:a16="http://schemas.microsoft.com/office/drawing/2014/main" id="{098C9996-9859-4907-8AB3-D6C9AAD11B3B}"/>
+                <a16:creationId xmlns:a16="http://schemas.microsoft.com/office/drawing/2014/main" id="{C05A2471-57E6-4C06-A9AA-8F2D2956480A}"/>
               </a:ext>
             </a:extLst>
           </p:cNvPr>
-          <p:cNvPicPr>
-            <a:picLocks noGrp="1" noChangeAspect="1"/>
-          </p:cNvPicPr>
-          <p:nvPr>
-            <p:ph idx="1"/>
-          </p:nvPr>
-        </p:nvPicPr>
-        <p:blipFill>
-          <a:blip r:embed="rId2"/>
-          <a:stretch>
-            <a:fillRect/>
-          </a:stretch>
-        </p:blipFill>
-        <p:spPr>
-          <a:xfrm>
-            <a:off x="4387537" y="1359036"/>
-            <a:ext cx="4282811" cy="876376"/>
-          </a:xfrm>
-        </p:spPr>
-      </p:pic>
-      <p:sp>
-        <p:nvSpPr>
-          <p:cNvPr id="3" name="Footer Placeholder 2">
+          <p:cNvSpPr>
+            <a:spLocks noGrp="1"/>
+          </p:cNvSpPr>
+          <p:nvPr>
+            <p:ph type="ftr" sz="quarter" idx="11"/>
+          </p:nvPr>
+        </p:nvSpPr>
+        <p:spPr/>
+        <p:txBody>
+          <a:bodyPr/>
+          <a:lstStyle/>
+          <a:p>
+            <a:r>
+              <a:rPr lang="nl-NL"/>
+              <a:t>Faculteit wetenschappen</a:t>
+            </a:r>
+          </a:p>
+        </p:txBody>
+      </p:sp>
+      <p:sp>
+        <p:nvSpPr>
+          <p:cNvPr id="4" name="Tijdelijke aanduiding voor dianummer 3">
             <a:extLst>
               <a:ext uri="{FF2B5EF4-FFF2-40B4-BE49-F238E27FC236}">
-                <a16:creationId xmlns:a16="http://schemas.microsoft.com/office/drawing/2014/main" id="{AD4A58AD-6893-4457-9C08-36D3A74E64CF}"/>
+                <a16:creationId xmlns:a16="http://schemas.microsoft.com/office/drawing/2014/main" id="{A3FDD983-CE06-4B5A-8CF6-6B08FA5FA3E5}"/>
               </a:ext>
             </a:extLst>
           </p:cNvPr>
@@ -10040,7 +12341,7 @@
             <a:spLocks noGrp="1"/>
           </p:cNvSpPr>
           <p:nvPr>
-            <p:ph type="ftr" sz="quarter" idx="11"/>
+            <p:ph type="sldNum" sz="quarter" idx="12"/>
           </p:nvPr>
         </p:nvSpPr>
         <p:spPr/>
@@ -10048,19 +12349,20 @@
           <a:bodyPr/>
           <a:lstStyle/>
           <a:p>
-            <a:r>
-              <a:rPr lang="nl-NL"/>
-              <a:t>Faculteit wetenschappen</a:t>
-            </a:r>
-          </a:p>
-        </p:txBody>
-      </p:sp>
-      <p:sp>
-        <p:nvSpPr>
-          <p:cNvPr id="4" name="Slide Number Placeholder 3">
+            <a:fld id="{0A297500-7527-634B-90F4-69D0994C32B4}" type="slidenum">
+              <a:rPr lang="nl-NL" smtClean="0"/>
+              <a:t>9</a:t>
+            </a:fld>
+            <a:endParaRPr lang="nl-NL"/>
+          </a:p>
+        </p:txBody>
+      </p:sp>
+      <p:sp>
+        <p:nvSpPr>
+          <p:cNvPr id="5" name="Titel 4">
             <a:extLst>
               <a:ext uri="{FF2B5EF4-FFF2-40B4-BE49-F238E27FC236}">
-                <a16:creationId xmlns:a16="http://schemas.microsoft.com/office/drawing/2014/main" id="{DD83837B-2251-47C6-BE10-838E9BD61BB3}"/>
+                <a16:creationId xmlns:a16="http://schemas.microsoft.com/office/drawing/2014/main" id="{0215D0C6-793C-48F6-8C66-872907A593B7}"/>
               </a:ext>
             </a:extLst>
           </p:cNvPr>
@@ -10068,7 +12370,7 @@
             <a:spLocks noGrp="1"/>
           </p:cNvSpPr>
           <p:nvPr>
-            <p:ph type="sldNum" sz="quarter" idx="12"/>
+            <p:ph type="title"/>
           </p:nvPr>
         </p:nvSpPr>
         <p:spPr/>
@@ -10076,617 +12378,28 @@
           <a:bodyPr/>
           <a:lstStyle/>
           <a:p>
-            <a:fld id="{0A297500-7527-634B-90F4-69D0994C32B4}" type="slidenum">
-              <a:rPr lang="nl-NL" smtClean="0"/>
-              <a:t>7</a:t>
-            </a:fld>
-            <a:endParaRPr lang="nl-NL"/>
-          </a:p>
-        </p:txBody>
-      </p:sp>
-      <p:sp>
-        <p:nvSpPr>
-          <p:cNvPr id="5" name="Title 4">
+            <a:r>
+              <a:rPr lang="nl-BE" dirty="0" err="1"/>
+              <a:t>Gradient</a:t>
+            </a:r>
+            <a:r>
+              <a:rPr lang="nl-BE" dirty="0"/>
+              <a:t> </a:t>
+            </a:r>
+            <a:r>
+              <a:rPr lang="nl-BE" dirty="0" err="1"/>
+              <a:t>descent</a:t>
+            </a:r>
+            <a:endParaRPr lang="nl-BE" dirty="0"/>
+          </a:p>
+        </p:txBody>
+      </p:sp>
+      <p:pic>
+        <p:nvPicPr>
+          <p:cNvPr id="2050" name="Picture 2" descr="Intro to optimization in deep learning: Gradient Descent">
             <a:extLst>
               <a:ext uri="{FF2B5EF4-FFF2-40B4-BE49-F238E27FC236}">
-                <a16:creationId xmlns:a16="http://schemas.microsoft.com/office/drawing/2014/main" id="{B94175B6-911A-4751-85AD-91F81DF2E2A7}"/>
-              </a:ext>
-            </a:extLst>
-          </p:cNvPr>
-          <p:cNvSpPr>
-            <a:spLocks noGrp="1"/>
-          </p:cNvSpPr>
-          <p:nvPr>
-            <p:ph type="title"/>
-          </p:nvPr>
-        </p:nvSpPr>
-        <p:spPr/>
-        <p:txBody>
-          <a:bodyPr/>
-          <a:lstStyle/>
-          <a:p>
-            <a:r>
-              <a:rPr lang="en-US" dirty="0">
-                <a:latin typeface="Arial"/>
-                <a:cs typeface="Arial"/>
-              </a:rPr>
-              <a:t>Gradient descent</a:t>
-            </a:r>
-            <a:endParaRPr lang="en-US" dirty="0"/>
-          </a:p>
-        </p:txBody>
-      </p:sp>
-      <p:pic>
-        <p:nvPicPr>
-          <p:cNvPr id="9" name="Afbeelding 8" descr="Afbeelding met object, klok&#10;&#10;Automatisch gegenereerde beschrijving">
-            <a:extLst>
-              <a:ext uri="{FF2B5EF4-FFF2-40B4-BE49-F238E27FC236}">
-                <a16:creationId xmlns:a16="http://schemas.microsoft.com/office/drawing/2014/main" id="{2A20A3EC-82E5-4072-A66D-1906084E9BD8}"/>
-              </a:ext>
-            </a:extLst>
-          </p:cNvPr>
-          <p:cNvPicPr>
-            <a:picLocks noChangeAspect="1"/>
-          </p:cNvPicPr>
-          <p:nvPr/>
-        </p:nvPicPr>
-        <p:blipFill>
-          <a:blip r:embed="rId3"/>
-          <a:stretch>
-            <a:fillRect/>
-          </a:stretch>
-        </p:blipFill>
-        <p:spPr>
-          <a:xfrm>
-            <a:off x="4387537" y="4518507"/>
-            <a:ext cx="3543607" cy="533446"/>
-          </a:xfrm>
-          <a:prstGeom prst="rect">
-            <a:avLst/>
-          </a:prstGeom>
-        </p:spPr>
-      </p:pic>
-      <p:pic>
-        <p:nvPicPr>
-          <p:cNvPr id="11" name="Afbeelding 10" descr="Afbeelding met object, klok&#10;&#10;Automatisch gegenereerde beschrijving">
-            <a:extLst>
-              <a:ext uri="{FF2B5EF4-FFF2-40B4-BE49-F238E27FC236}">
-                <a16:creationId xmlns:a16="http://schemas.microsoft.com/office/drawing/2014/main" id="{35197AA6-FF6A-407F-A098-A08B1BFF58C1}"/>
-              </a:ext>
-            </a:extLst>
-          </p:cNvPr>
-          <p:cNvPicPr>
-            <a:picLocks noChangeAspect="1"/>
-          </p:cNvPicPr>
-          <p:nvPr/>
-        </p:nvPicPr>
-        <p:blipFill>
-          <a:blip r:embed="rId4"/>
-          <a:stretch>
-            <a:fillRect/>
-          </a:stretch>
-        </p:blipFill>
-        <p:spPr>
-          <a:xfrm>
-            <a:off x="4387537" y="5326727"/>
-            <a:ext cx="3292125" cy="838273"/>
-          </a:xfrm>
-          <a:prstGeom prst="rect">
-            <a:avLst/>
-          </a:prstGeom>
-        </p:spPr>
-      </p:pic>
-      <p:sp>
-        <p:nvSpPr>
-          <p:cNvPr id="16" name="Tijdelijke aanduiding voor inhoud 1">
-            <a:extLst>
-              <a:ext uri="{FF2B5EF4-FFF2-40B4-BE49-F238E27FC236}">
-                <a16:creationId xmlns:a16="http://schemas.microsoft.com/office/drawing/2014/main" id="{31B9B699-3D60-45C2-BCEB-88ED7797CECE}"/>
-              </a:ext>
-            </a:extLst>
-          </p:cNvPr>
-          <p:cNvSpPr txBox="1">
-            <a:spLocks/>
-          </p:cNvSpPr>
-          <p:nvPr/>
-        </p:nvSpPr>
-        <p:spPr>
-          <a:xfrm>
-            <a:off x="576000" y="1656000"/>
-            <a:ext cx="11041200" cy="4464000"/>
-          </a:xfrm>
-          <a:prstGeom prst="rect">
-            <a:avLst/>
-          </a:prstGeom>
-        </p:spPr>
-        <p:txBody>
-          <a:bodyPr vert="horz" lIns="91440" tIns="45720" rIns="91440" bIns="45720" rtlCol="0">
-            <a:normAutofit fontScale="92500" lnSpcReduction="10000"/>
-          </a:bodyPr>
-          <a:lstStyle>
-            <a:lvl1pPr marL="228600" indent="-228600" algn="l" defTabSz="914400" rtl="0" eaLnBrk="1" latinLnBrk="0" hangingPunct="1">
-              <a:lnSpc>
-                <a:spcPct val="100000"/>
-              </a:lnSpc>
-              <a:spcBef>
-                <a:spcPts val="1000"/>
-              </a:spcBef>
-              <a:buFont typeface="Arial"/>
-              <a:buChar char="•"/>
-              <a:defRPr sz="2400" kern="1200" baseline="0">
-                <a:solidFill>
-                  <a:schemeClr val="tx1"/>
-                </a:solidFill>
-                <a:latin typeface="Arial" charset="0"/>
-                <a:ea typeface="+mn-ea"/>
-                <a:cs typeface="+mn-cs"/>
-              </a:defRPr>
-            </a:lvl1pPr>
-            <a:lvl2pPr marL="685800" indent="-228600" algn="l" defTabSz="914400" rtl="0" eaLnBrk="1" latinLnBrk="0" hangingPunct="1">
-              <a:lnSpc>
-                <a:spcPct val="100000"/>
-              </a:lnSpc>
-              <a:spcBef>
-                <a:spcPts val="500"/>
-              </a:spcBef>
-              <a:buFont typeface="Arial"/>
-              <a:buChar char="•"/>
-              <a:defRPr sz="2400" kern="1200" baseline="0">
-                <a:solidFill>
-                  <a:schemeClr val="tx1"/>
-                </a:solidFill>
-                <a:latin typeface="Arial" charset="0"/>
-                <a:ea typeface="+mn-ea"/>
-                <a:cs typeface="+mn-cs"/>
-              </a:defRPr>
-            </a:lvl2pPr>
-            <a:lvl3pPr marL="1143000" indent="-228600" algn="l" defTabSz="914400" rtl="0" eaLnBrk="1" latinLnBrk="0" hangingPunct="1">
-              <a:lnSpc>
-                <a:spcPct val="100000"/>
-              </a:lnSpc>
-              <a:spcBef>
-                <a:spcPts val="500"/>
-              </a:spcBef>
-              <a:buFont typeface="Arial"/>
-              <a:buChar char="•"/>
-              <a:defRPr sz="2000" kern="1200" baseline="0">
-                <a:solidFill>
-                  <a:schemeClr val="tx1"/>
-                </a:solidFill>
-                <a:latin typeface="Arial" charset="0"/>
-                <a:ea typeface="+mn-ea"/>
-                <a:cs typeface="+mn-cs"/>
-              </a:defRPr>
-            </a:lvl3pPr>
-            <a:lvl4pPr marL="1600200" indent="-228600" algn="l" defTabSz="914400" rtl="0" eaLnBrk="1" latinLnBrk="0" hangingPunct="1">
-              <a:lnSpc>
-                <a:spcPct val="100000"/>
-              </a:lnSpc>
-              <a:spcBef>
-                <a:spcPts val="500"/>
-              </a:spcBef>
-              <a:buFont typeface="Arial"/>
-              <a:buChar char="•"/>
-              <a:defRPr sz="1800" kern="1200" baseline="0">
-                <a:solidFill>
-                  <a:schemeClr val="tx1"/>
-                </a:solidFill>
-                <a:latin typeface="Arial" charset="0"/>
-                <a:ea typeface="+mn-ea"/>
-                <a:cs typeface="+mn-cs"/>
-              </a:defRPr>
-            </a:lvl4pPr>
-            <a:lvl5pPr marL="2057400" indent="-228600" algn="l" defTabSz="914400" rtl="0" eaLnBrk="1" latinLnBrk="0" hangingPunct="1">
-              <a:lnSpc>
-                <a:spcPct val="100000"/>
-              </a:lnSpc>
-              <a:spcBef>
-                <a:spcPts val="500"/>
-              </a:spcBef>
-              <a:buFont typeface="Arial"/>
-              <a:buChar char="•"/>
-              <a:defRPr sz="1800" kern="1200" baseline="0">
-                <a:solidFill>
-                  <a:schemeClr val="tx1"/>
-                </a:solidFill>
-                <a:latin typeface="Arial" charset="0"/>
-                <a:ea typeface="+mn-ea"/>
-                <a:cs typeface="+mn-cs"/>
-              </a:defRPr>
-            </a:lvl5pPr>
-            <a:lvl6pPr marL="2514600" indent="-228600" algn="l" defTabSz="914400" rtl="0" eaLnBrk="1" latinLnBrk="0" hangingPunct="1">
-              <a:lnSpc>
-                <a:spcPct val="90000"/>
-              </a:lnSpc>
-              <a:spcBef>
-                <a:spcPts val="500"/>
-              </a:spcBef>
-              <a:buFont typeface="Arial"/>
-              <a:buChar char="•"/>
-              <a:defRPr sz="1800" kern="1200">
-                <a:solidFill>
-                  <a:schemeClr val="tx1"/>
-                </a:solidFill>
-                <a:latin typeface="+mn-lt"/>
-                <a:ea typeface="+mn-ea"/>
-                <a:cs typeface="+mn-cs"/>
-              </a:defRPr>
-            </a:lvl6pPr>
-            <a:lvl7pPr marL="2971800" indent="-228600" algn="l" defTabSz="914400" rtl="0" eaLnBrk="1" latinLnBrk="0" hangingPunct="1">
-              <a:lnSpc>
-                <a:spcPct val="90000"/>
-              </a:lnSpc>
-              <a:spcBef>
-                <a:spcPts val="500"/>
-              </a:spcBef>
-              <a:buFont typeface="Arial"/>
-              <a:buChar char="•"/>
-              <a:defRPr sz="1800" kern="1200">
-                <a:solidFill>
-                  <a:schemeClr val="tx1"/>
-                </a:solidFill>
-                <a:latin typeface="+mn-lt"/>
-                <a:ea typeface="+mn-ea"/>
-                <a:cs typeface="+mn-cs"/>
-              </a:defRPr>
-            </a:lvl7pPr>
-            <a:lvl8pPr marL="3429000" indent="-228600" algn="l" defTabSz="914400" rtl="0" eaLnBrk="1" latinLnBrk="0" hangingPunct="1">
-              <a:lnSpc>
-                <a:spcPct val="90000"/>
-              </a:lnSpc>
-              <a:spcBef>
-                <a:spcPts val="500"/>
-              </a:spcBef>
-              <a:buFont typeface="Arial"/>
-              <a:buChar char="•"/>
-              <a:defRPr sz="1800" kern="1200">
-                <a:solidFill>
-                  <a:schemeClr val="tx1"/>
-                </a:solidFill>
-                <a:latin typeface="+mn-lt"/>
-                <a:ea typeface="+mn-ea"/>
-                <a:cs typeface="+mn-cs"/>
-              </a:defRPr>
-            </a:lvl8pPr>
-            <a:lvl9pPr marL="3886200" indent="-228600" algn="l" defTabSz="914400" rtl="0" eaLnBrk="1" latinLnBrk="0" hangingPunct="1">
-              <a:lnSpc>
-                <a:spcPct val="90000"/>
-              </a:lnSpc>
-              <a:spcBef>
-                <a:spcPts val="500"/>
-              </a:spcBef>
-              <a:buFont typeface="Arial"/>
-              <a:buChar char="•"/>
-              <a:defRPr sz="1800" kern="1200">
-                <a:solidFill>
-                  <a:schemeClr val="tx1"/>
-                </a:solidFill>
-                <a:latin typeface="+mn-lt"/>
-                <a:ea typeface="+mn-ea"/>
-                <a:cs typeface="+mn-cs"/>
-              </a:defRPr>
-            </a:lvl9pPr>
-          </a:lstStyle>
-          <a:p>
-            <a:r>
-              <a:rPr lang="nl-BE" dirty="0"/>
-              <a:t>Mogelijke kostfunctie:</a:t>
-            </a:r>
-          </a:p>
-          <a:p>
-            <a:endParaRPr lang="nl-BE" dirty="0"/>
-          </a:p>
-          <a:p>
-            <a:r>
-              <a:rPr lang="nl-BE" dirty="0"/>
-              <a:t>Datapunten: x</a:t>
-            </a:r>
-            <a:r>
-              <a:rPr lang="nl-BE" baseline="30000" dirty="0"/>
-              <a:t>{i}</a:t>
-            </a:r>
-          </a:p>
-          <a:p>
-            <a:r>
-              <a:rPr lang="nl-BE" dirty="0"/>
-              <a:t>Correct resultaat: y(x</a:t>
-            </a:r>
-            <a:r>
-              <a:rPr lang="nl-BE" baseline="30000" dirty="0"/>
-              <a:t>{i}</a:t>
-            </a:r>
-            <a:r>
-              <a:rPr lang="nl-BE" dirty="0"/>
-              <a:t>)</a:t>
-            </a:r>
-          </a:p>
-          <a:p>
-            <a:r>
-              <a:rPr lang="nl-BE" dirty="0"/>
-              <a:t>Resultaat model: a</a:t>
-            </a:r>
-            <a:r>
-              <a:rPr lang="nl-BE" baseline="30000" dirty="0"/>
-              <a:t>[L]</a:t>
-            </a:r>
-            <a:r>
-              <a:rPr lang="nl-BE" dirty="0"/>
-              <a:t>(x</a:t>
-            </a:r>
-            <a:r>
-              <a:rPr lang="nl-BE" baseline="30000" dirty="0"/>
-              <a:t>{i}</a:t>
-            </a:r>
-            <a:r>
-              <a:rPr lang="nl-BE" dirty="0"/>
-              <a:t>)</a:t>
-            </a:r>
-          </a:p>
-          <a:p>
-            <a:endParaRPr lang="nl-BE" dirty="0"/>
-          </a:p>
-          <a:p>
-            <a:endParaRPr lang="nl-BE" dirty="0"/>
-          </a:p>
-          <a:p>
-            <a:r>
-              <a:rPr lang="nl-BE" dirty="0"/>
-              <a:t>Deel-functies: </a:t>
-            </a:r>
-          </a:p>
-          <a:p>
-            <a:endParaRPr lang="nl-BE" dirty="0"/>
-          </a:p>
-          <a:p>
-            <a:r>
-              <a:rPr lang="nl-BE" dirty="0"/>
-              <a:t>Berekening gradiënt:</a:t>
-            </a:r>
-          </a:p>
-          <a:p>
-            <a:endParaRPr lang="nl-BE" dirty="0"/>
-          </a:p>
-        </p:txBody>
-      </p:sp>
-    </p:spTree>
-    <p:extLst>
-      <p:ext uri="{BB962C8B-B14F-4D97-AF65-F5344CB8AC3E}">
-        <p14:creationId xmlns:p14="http://schemas.microsoft.com/office/powerpoint/2010/main" val="2014040813"/>
-      </p:ext>
-    </p:extLst>
-  </p:cSld>
-  <p:clrMapOvr>
-    <a:masterClrMapping/>
-  </p:clrMapOvr>
-</p:sld>
-</file>
-
-<file path=ppt/slides/slide8.xml><?xml version="1.0" encoding="utf-8"?>
-<p:sld xmlns:a="http://schemas.openxmlformats.org/drawingml/2006/main" xmlns:r="http://schemas.openxmlformats.org/officeDocument/2006/relationships" xmlns:p="http://schemas.openxmlformats.org/presentationml/2006/main">
-  <p:cSld>
-    <p:spTree>
-      <p:nvGrpSpPr>
-        <p:cNvPr id="1" name=""/>
-        <p:cNvGrpSpPr/>
-        <p:nvPr/>
-      </p:nvGrpSpPr>
-      <p:grpSpPr>
-        <a:xfrm>
-          <a:off x="0" y="0"/>
-          <a:ext cx="0" cy="0"/>
-          <a:chOff x="0" y="0"/>
-          <a:chExt cx="0" cy="0"/>
-        </a:xfrm>
-      </p:grpSpPr>
-      <p:sp>
-        <p:nvSpPr>
-          <p:cNvPr id="2" name="Tijdelijke aanduiding voor inhoud 1">
-            <a:extLst>
-              <a:ext uri="{FF2B5EF4-FFF2-40B4-BE49-F238E27FC236}">
-                <a16:creationId xmlns:a16="http://schemas.microsoft.com/office/drawing/2014/main" id="{FDB9BA6B-C0B2-4928-93B9-B7D845242D12}"/>
-              </a:ext>
-            </a:extLst>
-          </p:cNvPr>
-          <p:cNvSpPr>
-            <a:spLocks noGrp="1"/>
-          </p:cNvSpPr>
-          <p:nvPr>
-            <p:ph idx="1"/>
-          </p:nvPr>
-        </p:nvSpPr>
-        <p:spPr/>
-        <p:txBody>
-          <a:bodyPr/>
-          <a:lstStyle/>
-          <a:p>
-            <a:r>
-              <a:rPr lang="nl-BE" dirty="0"/>
-              <a:t>Veel parameters</a:t>
-            </a:r>
-          </a:p>
-          <a:p>
-            <a:r>
-              <a:rPr lang="nl-BE" dirty="0"/>
-              <a:t>Veel datapunten</a:t>
-            </a:r>
-          </a:p>
-          <a:p>
-            <a:r>
-              <a:rPr lang="nl-BE" dirty="0"/>
-              <a:t>Oplossing?</a:t>
-            </a:r>
-          </a:p>
-        </p:txBody>
-      </p:sp>
-      <p:sp>
-        <p:nvSpPr>
-          <p:cNvPr id="3" name="Tijdelijke aanduiding voor voettekst 2">
-            <a:extLst>
-              <a:ext uri="{FF2B5EF4-FFF2-40B4-BE49-F238E27FC236}">
-                <a16:creationId xmlns:a16="http://schemas.microsoft.com/office/drawing/2014/main" id="{F4FE6DA4-8F7B-48E6-A543-4DE1B81EAC7A}"/>
-              </a:ext>
-            </a:extLst>
-          </p:cNvPr>
-          <p:cNvSpPr>
-            <a:spLocks noGrp="1"/>
-          </p:cNvSpPr>
-          <p:nvPr>
-            <p:ph type="ftr" sz="quarter" idx="11"/>
-          </p:nvPr>
-        </p:nvSpPr>
-        <p:spPr/>
-        <p:txBody>
-          <a:bodyPr/>
-          <a:lstStyle/>
-          <a:p>
-            <a:r>
-              <a:rPr lang="nl-NL"/>
-              <a:t>Faculteit wetenschappen</a:t>
-            </a:r>
-          </a:p>
-        </p:txBody>
-      </p:sp>
-      <p:sp>
-        <p:nvSpPr>
-          <p:cNvPr id="4" name="Tijdelijke aanduiding voor dianummer 3">
-            <a:extLst>
-              <a:ext uri="{FF2B5EF4-FFF2-40B4-BE49-F238E27FC236}">
-                <a16:creationId xmlns:a16="http://schemas.microsoft.com/office/drawing/2014/main" id="{52346FD5-4FAE-40BE-B96D-DA5F7B838F8B}"/>
-              </a:ext>
-            </a:extLst>
-          </p:cNvPr>
-          <p:cNvSpPr>
-            <a:spLocks noGrp="1"/>
-          </p:cNvSpPr>
-          <p:nvPr>
-            <p:ph type="sldNum" sz="quarter" idx="12"/>
-          </p:nvPr>
-        </p:nvSpPr>
-        <p:spPr/>
-        <p:txBody>
-          <a:bodyPr/>
-          <a:lstStyle/>
-          <a:p>
-            <a:fld id="{0A297500-7527-634B-90F4-69D0994C32B4}" type="slidenum">
-              <a:rPr lang="nl-NL" smtClean="0"/>
-              <a:t>8</a:t>
-            </a:fld>
-            <a:endParaRPr lang="nl-NL"/>
-          </a:p>
-        </p:txBody>
-      </p:sp>
-      <p:sp>
-        <p:nvSpPr>
-          <p:cNvPr id="5" name="Titel 4">
-            <a:extLst>
-              <a:ext uri="{FF2B5EF4-FFF2-40B4-BE49-F238E27FC236}">
-                <a16:creationId xmlns:a16="http://schemas.microsoft.com/office/drawing/2014/main" id="{2226A8D9-1F0C-461B-8683-0631BAE5856D}"/>
-              </a:ext>
-            </a:extLst>
-          </p:cNvPr>
-          <p:cNvSpPr>
-            <a:spLocks noGrp="1"/>
-          </p:cNvSpPr>
-          <p:nvPr>
-            <p:ph type="title"/>
-          </p:nvPr>
-        </p:nvSpPr>
-        <p:spPr/>
-        <p:txBody>
-          <a:bodyPr/>
-          <a:lstStyle/>
-          <a:p>
-            <a:r>
-              <a:rPr lang="nl-BE" dirty="0" err="1"/>
-              <a:t>Gradient</a:t>
-            </a:r>
-            <a:r>
-              <a:rPr lang="nl-BE" dirty="0"/>
-              <a:t> </a:t>
-            </a:r>
-            <a:r>
-              <a:rPr lang="nl-BE" dirty="0" err="1"/>
-              <a:t>descent</a:t>
-            </a:r>
-            <a:endParaRPr lang="nl-BE" dirty="0"/>
-          </a:p>
-        </p:txBody>
-      </p:sp>
-      <p:pic>
-        <p:nvPicPr>
-          <p:cNvPr id="7" name="Afbeelding 6" descr="Afbeelding met object, klok&#10;&#10;Automatisch gegenereerde beschrijving">
-            <a:extLst>
-              <a:ext uri="{FF2B5EF4-FFF2-40B4-BE49-F238E27FC236}">
-                <a16:creationId xmlns:a16="http://schemas.microsoft.com/office/drawing/2014/main" id="{FF13E501-C5E3-4FD7-8D51-A9E8829362CF}"/>
-              </a:ext>
-            </a:extLst>
-          </p:cNvPr>
-          <p:cNvPicPr>
-            <a:picLocks noChangeAspect="1"/>
-          </p:cNvPicPr>
-          <p:nvPr/>
-        </p:nvPicPr>
-        <p:blipFill>
-          <a:blip r:embed="rId2"/>
-          <a:stretch>
-            <a:fillRect/>
-          </a:stretch>
-        </p:blipFill>
-        <p:spPr>
-          <a:xfrm>
-            <a:off x="900000" y="3439481"/>
-            <a:ext cx="4464638" cy="1136830"/>
-          </a:xfrm>
-          <a:prstGeom prst="rect">
-            <a:avLst/>
-          </a:prstGeom>
-        </p:spPr>
-      </p:pic>
-      <p:cxnSp>
-        <p:nvCxnSpPr>
-          <p:cNvPr id="9" name="Rechte verbindingslijn met pijl 8">
-            <a:extLst>
-              <a:ext uri="{FF2B5EF4-FFF2-40B4-BE49-F238E27FC236}">
-                <a16:creationId xmlns:a16="http://schemas.microsoft.com/office/drawing/2014/main" id="{54F13279-6BE0-4BB5-9263-FB56909DC4B5}"/>
-              </a:ext>
-            </a:extLst>
-          </p:cNvPr>
-          <p:cNvCxnSpPr/>
-          <p:nvPr/>
-        </p:nvCxnSpPr>
-        <p:spPr>
-          <a:xfrm>
-            <a:off x="5671595" y="4007896"/>
-            <a:ext cx="2280213" cy="0"/>
-          </a:xfrm>
-          <a:prstGeom prst="straightConnector1">
-            <a:avLst/>
-          </a:prstGeom>
-          <a:ln>
-            <a:tailEnd type="triangle"/>
-          </a:ln>
-        </p:spPr>
-        <p:style>
-          <a:lnRef idx="3">
-            <a:schemeClr val="accent2"/>
-          </a:lnRef>
-          <a:fillRef idx="0">
-            <a:schemeClr val="accent2"/>
-          </a:fillRef>
-          <a:effectRef idx="2">
-            <a:schemeClr val="accent2"/>
-          </a:effectRef>
-          <a:fontRef idx="minor">
-            <a:schemeClr val="tx1"/>
-          </a:fontRef>
-        </p:style>
-      </p:cxnSp>
-      <p:pic>
-        <p:nvPicPr>
-          <p:cNvPr id="1026" name="Picture 2" descr="Computer Fire Isolated. Burning Computer. Data Processor Vector Stock  Vector - Illustration of flame, fire: 143629275">
-            <a:extLst>
-              <a:ext uri="{FF2B5EF4-FFF2-40B4-BE49-F238E27FC236}">
-                <a16:creationId xmlns:a16="http://schemas.microsoft.com/office/drawing/2014/main" id="{D887E6EC-1C19-442A-906B-C69D0C29C224}"/>
+                <a16:creationId xmlns:a16="http://schemas.microsoft.com/office/drawing/2014/main" id="{18C04BB7-6BC6-4166-8FD8-9DB4313B7EAD}"/>
               </a:ext>
             </a:extLst>
           </p:cNvPr>
@@ -10695,7 +12408,7 @@
           </p:cNvPicPr>
           <p:nvPr/>
         </p:nvPicPr>
-        <p:blipFill>
+        <p:blipFill rotWithShape="1">
           <a:blip r:embed="rId3">
             <a:extLst>
               <a:ext uri="{28A0092B-C50C-407E-A947-70E740481C1C}">
@@ -10703,15 +12416,13 @@
               </a:ext>
             </a:extLst>
           </a:blip>
-          <a:srcRect/>
-          <a:stretch>
-            <a:fillRect/>
-          </a:stretch>
+          <a:srcRect t="7276" b="1230"/>
+          <a:stretch/>
         </p:blipFill>
         <p:spPr bwMode="auto">
           <a:xfrm>
-            <a:off x="8070004" y="1989399"/>
-            <a:ext cx="3429000" cy="3429000"/>
+            <a:off x="7167716" y="0"/>
+            <a:ext cx="5024284" cy="3784793"/>
           </a:xfrm>
           <a:prstGeom prst="rect">
             <a:avLst/>
@@ -10731,264 +12442,7 @@
     </p:spTree>
     <p:extLst>
       <p:ext uri="{BB962C8B-B14F-4D97-AF65-F5344CB8AC3E}">
-        <p14:creationId xmlns:p14="http://schemas.microsoft.com/office/powerpoint/2010/main" val="649465542"/>
-      </p:ext>
-    </p:extLst>
-  </p:cSld>
-  <p:clrMapOvr>
-    <a:masterClrMapping/>
-  </p:clrMapOvr>
-</p:sld>
-</file>
-
-<file path=ppt/slides/slide9.xml><?xml version="1.0" encoding="utf-8"?>
-<p:sld xmlns:a="http://schemas.openxmlformats.org/drawingml/2006/main" xmlns:r="http://schemas.openxmlformats.org/officeDocument/2006/relationships" xmlns:p="http://schemas.openxmlformats.org/presentationml/2006/main">
-  <p:cSld>
-    <p:spTree>
-      <p:nvGrpSpPr>
-        <p:cNvPr id="1" name=""/>
-        <p:cNvGrpSpPr/>
-        <p:nvPr/>
-      </p:nvGrpSpPr>
-      <p:grpSpPr>
-        <a:xfrm>
-          <a:off x="0" y="0"/>
-          <a:ext cx="0" cy="0"/>
-          <a:chOff x="0" y="0"/>
-          <a:chExt cx="0" cy="0"/>
-        </a:xfrm>
-      </p:grpSpPr>
-      <p:sp>
-        <p:nvSpPr>
-          <p:cNvPr id="2" name="Tijdelijke aanduiding voor inhoud 1">
-            <a:extLst>
-              <a:ext uri="{FF2B5EF4-FFF2-40B4-BE49-F238E27FC236}">
-                <a16:creationId xmlns:a16="http://schemas.microsoft.com/office/drawing/2014/main" id="{C79333D8-4E56-48D2-8BC5-D836CD92E7F5}"/>
-              </a:ext>
-            </a:extLst>
-          </p:cNvPr>
-          <p:cNvSpPr>
-            <a:spLocks noGrp="1"/>
-          </p:cNvSpPr>
-          <p:nvPr>
-            <p:ph idx="1"/>
-          </p:nvPr>
-        </p:nvSpPr>
-        <p:spPr/>
-        <p:txBody>
-          <a:bodyPr/>
-          <a:lstStyle/>
-          <a:p>
-            <a:r>
-              <a:rPr lang="nl-BE" dirty="0"/>
-              <a:t>Telkens 1 punt nemen:</a:t>
-            </a:r>
-          </a:p>
-          <a:p>
-            <a:pPr marL="0" indent="0">
-              <a:buNone/>
-            </a:pPr>
-            <a:endParaRPr lang="nl-BE" dirty="0"/>
-          </a:p>
-          <a:p>
-            <a:pPr marL="0" indent="0">
-              <a:buNone/>
-            </a:pPr>
-            <a:endParaRPr lang="nl-BE" dirty="0"/>
-          </a:p>
-          <a:p>
-            <a:r>
-              <a:rPr lang="nl-BE" dirty="0"/>
-              <a:t>Telkens m &lt;&lt; N punten nemen:</a:t>
-            </a:r>
-          </a:p>
-          <a:p>
-            <a:pPr lvl="1"/>
-            <a:r>
-              <a:rPr lang="nl-BE" dirty="0"/>
-              <a:t>Minibatch</a:t>
-            </a:r>
-          </a:p>
-          <a:p>
-            <a:endParaRPr lang="nl-BE" dirty="0"/>
-          </a:p>
-          <a:p>
-            <a:endParaRPr lang="nl-BE" dirty="0"/>
-          </a:p>
-          <a:p>
-            <a:r>
-              <a:rPr lang="nl-BE" dirty="0"/>
-              <a:t>Met/zonder vervanging</a:t>
-            </a:r>
-          </a:p>
-        </p:txBody>
-      </p:sp>
-      <p:sp>
-        <p:nvSpPr>
-          <p:cNvPr id="3" name="Tijdelijke aanduiding voor voettekst 2">
-            <a:extLst>
-              <a:ext uri="{FF2B5EF4-FFF2-40B4-BE49-F238E27FC236}">
-                <a16:creationId xmlns:a16="http://schemas.microsoft.com/office/drawing/2014/main" id="{70CB2AD9-04AF-4EA4-BA1E-3377F6E0748D}"/>
-              </a:ext>
-            </a:extLst>
-          </p:cNvPr>
-          <p:cNvSpPr>
-            <a:spLocks noGrp="1"/>
-          </p:cNvSpPr>
-          <p:nvPr>
-            <p:ph type="ftr" sz="quarter" idx="11"/>
-          </p:nvPr>
-        </p:nvSpPr>
-        <p:spPr/>
-        <p:txBody>
-          <a:bodyPr/>
-          <a:lstStyle/>
-          <a:p>
-            <a:r>
-              <a:rPr lang="nl-NL"/>
-              <a:t>Faculteit wetenschappen</a:t>
-            </a:r>
-          </a:p>
-        </p:txBody>
-      </p:sp>
-      <p:sp>
-        <p:nvSpPr>
-          <p:cNvPr id="4" name="Tijdelijke aanduiding voor dianummer 3">
-            <a:extLst>
-              <a:ext uri="{FF2B5EF4-FFF2-40B4-BE49-F238E27FC236}">
-                <a16:creationId xmlns:a16="http://schemas.microsoft.com/office/drawing/2014/main" id="{86C94A12-C2C6-4355-AAC4-5D2C3F4A327F}"/>
-              </a:ext>
-            </a:extLst>
-          </p:cNvPr>
-          <p:cNvSpPr>
-            <a:spLocks noGrp="1"/>
-          </p:cNvSpPr>
-          <p:nvPr>
-            <p:ph type="sldNum" sz="quarter" idx="12"/>
-          </p:nvPr>
-        </p:nvSpPr>
-        <p:spPr/>
-        <p:txBody>
-          <a:bodyPr/>
-          <a:lstStyle/>
-          <a:p>
-            <a:fld id="{0A297500-7527-634B-90F4-69D0994C32B4}" type="slidenum">
-              <a:rPr lang="nl-NL" smtClean="0"/>
-              <a:t>9</a:t>
-            </a:fld>
-            <a:endParaRPr lang="nl-NL"/>
-          </a:p>
-        </p:txBody>
-      </p:sp>
-      <p:sp>
-        <p:nvSpPr>
-          <p:cNvPr id="5" name="Titel 4">
-            <a:extLst>
-              <a:ext uri="{FF2B5EF4-FFF2-40B4-BE49-F238E27FC236}">
-                <a16:creationId xmlns:a16="http://schemas.microsoft.com/office/drawing/2014/main" id="{8A8BAFB1-02E4-4847-A573-784E02115F7B}"/>
-              </a:ext>
-            </a:extLst>
-          </p:cNvPr>
-          <p:cNvSpPr>
-            <a:spLocks noGrp="1"/>
-          </p:cNvSpPr>
-          <p:nvPr>
-            <p:ph type="title"/>
-          </p:nvPr>
-        </p:nvSpPr>
-        <p:spPr/>
-        <p:txBody>
-          <a:bodyPr/>
-          <a:lstStyle/>
-          <a:p>
-            <a:r>
-              <a:rPr lang="nl-BE" dirty="0" err="1"/>
-              <a:t>Stochastic</a:t>
-            </a:r>
-            <a:r>
-              <a:rPr lang="nl-BE" dirty="0"/>
-              <a:t> </a:t>
-            </a:r>
-            <a:r>
-              <a:rPr lang="nl-BE" dirty="0" err="1"/>
-              <a:t>gradient</a:t>
-            </a:r>
-            <a:r>
-              <a:rPr lang="nl-BE" dirty="0"/>
-              <a:t> </a:t>
-            </a:r>
-            <a:r>
-              <a:rPr lang="nl-BE" dirty="0" err="1"/>
-              <a:t>descent</a:t>
-            </a:r>
-            <a:endParaRPr lang="nl-BE" dirty="0"/>
-          </a:p>
-        </p:txBody>
-      </p:sp>
-      <p:pic>
-        <p:nvPicPr>
-          <p:cNvPr id="7" name="Afbeelding 6" descr="Afbeelding met object, klok&#10;&#10;Automatisch gegenereerde beschrijving">
-            <a:extLst>
-              <a:ext uri="{FF2B5EF4-FFF2-40B4-BE49-F238E27FC236}">
-                <a16:creationId xmlns:a16="http://schemas.microsoft.com/office/drawing/2014/main" id="{1499888D-4D2D-48AA-822E-E73E59823143}"/>
-              </a:ext>
-            </a:extLst>
-          </p:cNvPr>
-          <p:cNvPicPr>
-            <a:picLocks noChangeAspect="1"/>
-          </p:cNvPicPr>
-          <p:nvPr/>
-        </p:nvPicPr>
-        <p:blipFill>
-          <a:blip r:embed="rId2"/>
-          <a:stretch>
-            <a:fillRect/>
-          </a:stretch>
-        </p:blipFill>
-        <p:spPr>
-          <a:xfrm>
-            <a:off x="6598362" y="1505304"/>
-            <a:ext cx="2827265" cy="640135"/>
-          </a:xfrm>
-          <a:prstGeom prst="rect">
-            <a:avLst/>
-          </a:prstGeom>
-        </p:spPr>
-      </p:pic>
-      <p:pic>
-        <p:nvPicPr>
-          <p:cNvPr id="9" name="Afbeelding 8" descr="Afbeelding met object, klok&#10;&#10;Automatisch gegenereerde beschrijving">
-            <a:extLst>
-              <a:ext uri="{FF2B5EF4-FFF2-40B4-BE49-F238E27FC236}">
-                <a16:creationId xmlns:a16="http://schemas.microsoft.com/office/drawing/2014/main" id="{7A770CCF-297A-49CB-A7AB-C9200BD735D8}"/>
-              </a:ext>
-            </a:extLst>
-          </p:cNvPr>
-          <p:cNvPicPr>
-            <a:picLocks noChangeAspect="1"/>
-          </p:cNvPicPr>
-          <p:nvPr/>
-        </p:nvPicPr>
-        <p:blipFill>
-          <a:blip r:embed="rId3"/>
-          <a:stretch>
-            <a:fillRect/>
-          </a:stretch>
-        </p:blipFill>
-        <p:spPr>
-          <a:xfrm>
-            <a:off x="6598362" y="2813005"/>
-            <a:ext cx="3863675" cy="1005927"/>
-          </a:xfrm>
-          <a:prstGeom prst="rect">
-            <a:avLst/>
-          </a:prstGeom>
-        </p:spPr>
-      </p:pic>
-    </p:spTree>
-    <p:extLst>
-      <p:ext uri="{BB962C8B-B14F-4D97-AF65-F5344CB8AC3E}">
-        <p14:creationId xmlns:p14="http://schemas.microsoft.com/office/powerpoint/2010/main" val="1225278259"/>
+        <p14:creationId xmlns:p14="http://schemas.microsoft.com/office/powerpoint/2010/main" val="3122855999"/>
       </p:ext>
     </p:extLst>
   </p:cSld>

</xml_diff>